<commit_message>
updated deck, corrected spelling mistake
</commit_message>
<xml_diff>
--- a/Deck/Testable ES2015 AngularJS 1.5.x Component-based Applications.pptx
+++ b/Deck/Testable ES2015 AngularJS 1.5.x Component-based Applications.pptx
@@ -5,10 +5,10 @@
     <p:sldMasterId id="2147483648" r:id="rId1"/>
   </p:sldMasterIdLst>
   <p:notesMasterIdLst>
-    <p:notesMasterId r:id="rId17"/>
+    <p:notesMasterId r:id="rId18"/>
   </p:notesMasterIdLst>
   <p:handoutMasterIdLst>
-    <p:handoutMasterId r:id="rId18"/>
+    <p:handoutMasterId r:id="rId19"/>
   </p:handoutMasterIdLst>
   <p:sldIdLst>
     <p:sldId id="265" r:id="rId2"/>
@@ -26,11 +26,12 @@
     <p:sldId id="298" r:id="rId14"/>
     <p:sldId id="299" r:id="rId15"/>
     <p:sldId id="300" r:id="rId16"/>
+    <p:sldId id="301" r:id="rId17"/>
   </p:sldIdLst>
   <p:sldSz cx="12192000" cy="6858000"/>
   <p:notesSz cx="6858000" cy="9144000"/>
   <p:custDataLst>
-    <p:tags r:id="rId19"/>
+    <p:tags r:id="rId20"/>
   </p:custDataLst>
   <p:defaultTextStyle>
     <a:defPPr>
@@ -147,6 +148,7 @@
             <p14:sldId id="298"/>
             <p14:sldId id="299"/>
             <p14:sldId id="300"/>
+            <p14:sldId id="301"/>
           </p14:sldIdLst>
         </p14:section>
       </p14:sectionLst>
@@ -170,6 +172,3225 @@
     </p:ext>
   </p:extLst>
 </p:presentation>
+</file>
+
+<file path=ppt/diagrams/colors1.xml><?xml version="1.0" encoding="utf-8"?>
+<dgm:colorsDef xmlns:dgm="http://schemas.openxmlformats.org/drawingml/2006/diagram" xmlns:a="http://schemas.openxmlformats.org/drawingml/2006/main" uniqueId="urn:microsoft.com/office/officeart/2005/8/colors/accent1_2">
+  <dgm:title val=""/>
+  <dgm:desc val=""/>
+  <dgm:catLst>
+    <dgm:cat type="accent1" pri="11200"/>
+  </dgm:catLst>
+  <dgm:styleLbl name="node0">
+    <dgm:fillClrLst meth="repeat">
+      <a:schemeClr val="accent1"/>
+    </dgm:fillClrLst>
+    <dgm:linClrLst meth="repeat">
+      <a:schemeClr val="lt1"/>
+    </dgm:linClrLst>
+    <dgm:effectClrLst/>
+    <dgm:txLinClrLst/>
+    <dgm:txFillClrLst/>
+    <dgm:txEffectClrLst/>
+  </dgm:styleLbl>
+  <dgm:styleLbl name="alignNode1">
+    <dgm:fillClrLst meth="repeat">
+      <a:schemeClr val="accent1"/>
+    </dgm:fillClrLst>
+    <dgm:linClrLst meth="repeat">
+      <a:schemeClr val="accent1"/>
+    </dgm:linClrLst>
+    <dgm:effectClrLst/>
+    <dgm:txLinClrLst/>
+    <dgm:txFillClrLst/>
+    <dgm:txEffectClrLst/>
+  </dgm:styleLbl>
+  <dgm:styleLbl name="node1">
+    <dgm:fillClrLst meth="repeat">
+      <a:schemeClr val="accent1"/>
+    </dgm:fillClrLst>
+    <dgm:linClrLst meth="repeat">
+      <a:schemeClr val="lt1"/>
+    </dgm:linClrLst>
+    <dgm:effectClrLst/>
+    <dgm:txLinClrLst/>
+    <dgm:txFillClrLst/>
+    <dgm:txEffectClrLst/>
+  </dgm:styleLbl>
+  <dgm:styleLbl name="lnNode1">
+    <dgm:fillClrLst meth="repeat">
+      <a:schemeClr val="accent1"/>
+    </dgm:fillClrLst>
+    <dgm:linClrLst meth="repeat">
+      <a:schemeClr val="lt1"/>
+    </dgm:linClrLst>
+    <dgm:effectClrLst/>
+    <dgm:txLinClrLst/>
+    <dgm:txFillClrLst/>
+    <dgm:txEffectClrLst/>
+  </dgm:styleLbl>
+  <dgm:styleLbl name="vennNode1">
+    <dgm:fillClrLst meth="repeat">
+      <a:schemeClr val="accent1">
+        <a:alpha val="50000"/>
+      </a:schemeClr>
+    </dgm:fillClrLst>
+    <dgm:linClrLst meth="repeat">
+      <a:schemeClr val="lt1"/>
+    </dgm:linClrLst>
+    <dgm:effectClrLst/>
+    <dgm:txLinClrLst/>
+    <dgm:txFillClrLst/>
+    <dgm:txEffectClrLst/>
+  </dgm:styleLbl>
+  <dgm:styleLbl name="node2">
+    <dgm:fillClrLst meth="repeat">
+      <a:schemeClr val="accent1"/>
+    </dgm:fillClrLst>
+    <dgm:linClrLst meth="repeat">
+      <a:schemeClr val="lt1"/>
+    </dgm:linClrLst>
+    <dgm:effectClrLst/>
+    <dgm:txLinClrLst/>
+    <dgm:txFillClrLst/>
+    <dgm:txEffectClrLst/>
+  </dgm:styleLbl>
+  <dgm:styleLbl name="node3">
+    <dgm:fillClrLst meth="repeat">
+      <a:schemeClr val="accent1"/>
+    </dgm:fillClrLst>
+    <dgm:linClrLst meth="repeat">
+      <a:schemeClr val="lt1"/>
+    </dgm:linClrLst>
+    <dgm:effectClrLst/>
+    <dgm:txLinClrLst/>
+    <dgm:txFillClrLst/>
+    <dgm:txEffectClrLst/>
+  </dgm:styleLbl>
+  <dgm:styleLbl name="node4">
+    <dgm:fillClrLst meth="repeat">
+      <a:schemeClr val="accent1"/>
+    </dgm:fillClrLst>
+    <dgm:linClrLst meth="repeat">
+      <a:schemeClr val="lt1"/>
+    </dgm:linClrLst>
+    <dgm:effectClrLst/>
+    <dgm:txLinClrLst/>
+    <dgm:txFillClrLst/>
+    <dgm:txEffectClrLst/>
+  </dgm:styleLbl>
+  <dgm:styleLbl name="fgImgPlace1">
+    <dgm:fillClrLst meth="repeat">
+      <a:schemeClr val="accent1">
+        <a:tint val="50000"/>
+      </a:schemeClr>
+    </dgm:fillClrLst>
+    <dgm:linClrLst meth="repeat">
+      <a:schemeClr val="lt1"/>
+    </dgm:linClrLst>
+    <dgm:effectClrLst/>
+    <dgm:txLinClrLst/>
+    <dgm:txFillClrLst meth="repeat">
+      <a:schemeClr val="lt1"/>
+    </dgm:txFillClrLst>
+    <dgm:txEffectClrLst/>
+  </dgm:styleLbl>
+  <dgm:styleLbl name="alignImgPlace1">
+    <dgm:fillClrLst meth="repeat">
+      <a:schemeClr val="accent1">
+        <a:tint val="50000"/>
+      </a:schemeClr>
+    </dgm:fillClrLst>
+    <dgm:linClrLst meth="repeat">
+      <a:schemeClr val="lt1"/>
+    </dgm:linClrLst>
+    <dgm:effectClrLst/>
+    <dgm:txLinClrLst/>
+    <dgm:txFillClrLst meth="repeat">
+      <a:schemeClr val="lt1"/>
+    </dgm:txFillClrLst>
+    <dgm:txEffectClrLst/>
+  </dgm:styleLbl>
+  <dgm:styleLbl name="bgImgPlace1">
+    <dgm:fillClrLst meth="repeat">
+      <a:schemeClr val="accent1">
+        <a:tint val="50000"/>
+      </a:schemeClr>
+    </dgm:fillClrLst>
+    <dgm:linClrLst meth="repeat">
+      <a:schemeClr val="lt1"/>
+    </dgm:linClrLst>
+    <dgm:effectClrLst/>
+    <dgm:txLinClrLst/>
+    <dgm:txFillClrLst meth="repeat">
+      <a:schemeClr val="lt1"/>
+    </dgm:txFillClrLst>
+    <dgm:txEffectClrLst/>
+  </dgm:styleLbl>
+  <dgm:styleLbl name="sibTrans2D1">
+    <dgm:fillClrLst meth="repeat">
+      <a:schemeClr val="accent1">
+        <a:tint val="60000"/>
+      </a:schemeClr>
+    </dgm:fillClrLst>
+    <dgm:linClrLst meth="repeat">
+      <a:schemeClr val="accent1">
+        <a:tint val="60000"/>
+      </a:schemeClr>
+    </dgm:linClrLst>
+    <dgm:effectClrLst/>
+    <dgm:txLinClrLst/>
+    <dgm:txFillClrLst/>
+    <dgm:txEffectClrLst/>
+  </dgm:styleLbl>
+  <dgm:styleLbl name="fgSibTrans2D1">
+    <dgm:fillClrLst meth="repeat">
+      <a:schemeClr val="accent1">
+        <a:tint val="60000"/>
+      </a:schemeClr>
+    </dgm:fillClrLst>
+    <dgm:linClrLst meth="repeat">
+      <a:schemeClr val="accent1">
+        <a:tint val="60000"/>
+      </a:schemeClr>
+    </dgm:linClrLst>
+    <dgm:effectClrLst/>
+    <dgm:txLinClrLst/>
+    <dgm:txFillClrLst/>
+    <dgm:txEffectClrLst/>
+  </dgm:styleLbl>
+  <dgm:styleLbl name="bgSibTrans2D1">
+    <dgm:fillClrLst meth="repeat">
+      <a:schemeClr val="accent1">
+        <a:tint val="60000"/>
+      </a:schemeClr>
+    </dgm:fillClrLst>
+    <dgm:linClrLst meth="repeat">
+      <a:schemeClr val="accent1">
+        <a:tint val="60000"/>
+      </a:schemeClr>
+    </dgm:linClrLst>
+    <dgm:effectClrLst/>
+    <dgm:txLinClrLst/>
+    <dgm:txFillClrLst/>
+    <dgm:txEffectClrLst/>
+  </dgm:styleLbl>
+  <dgm:styleLbl name="sibTrans1D1">
+    <dgm:fillClrLst meth="repeat">
+      <a:schemeClr val="accent1"/>
+    </dgm:fillClrLst>
+    <dgm:linClrLst meth="repeat">
+      <a:schemeClr val="accent1"/>
+    </dgm:linClrLst>
+    <dgm:effectClrLst/>
+    <dgm:txLinClrLst/>
+    <dgm:txFillClrLst meth="repeat">
+      <a:schemeClr val="tx1"/>
+    </dgm:txFillClrLst>
+    <dgm:txEffectClrLst/>
+  </dgm:styleLbl>
+  <dgm:styleLbl name="callout">
+    <dgm:fillClrLst meth="repeat">
+      <a:schemeClr val="accent1"/>
+    </dgm:fillClrLst>
+    <dgm:linClrLst meth="repeat">
+      <a:schemeClr val="accent1">
+        <a:tint val="50000"/>
+      </a:schemeClr>
+    </dgm:linClrLst>
+    <dgm:effectClrLst/>
+    <dgm:txLinClrLst/>
+    <dgm:txFillClrLst meth="repeat">
+      <a:schemeClr val="tx1"/>
+    </dgm:txFillClrLst>
+    <dgm:txEffectClrLst/>
+  </dgm:styleLbl>
+  <dgm:styleLbl name="asst0">
+    <dgm:fillClrLst meth="repeat">
+      <a:schemeClr val="accent1"/>
+    </dgm:fillClrLst>
+    <dgm:linClrLst meth="repeat">
+      <a:schemeClr val="lt1"/>
+    </dgm:linClrLst>
+    <dgm:effectClrLst/>
+    <dgm:txLinClrLst/>
+    <dgm:txFillClrLst/>
+    <dgm:txEffectClrLst/>
+  </dgm:styleLbl>
+  <dgm:styleLbl name="asst1">
+    <dgm:fillClrLst meth="repeat">
+      <a:schemeClr val="accent1"/>
+    </dgm:fillClrLst>
+    <dgm:linClrLst meth="repeat">
+      <a:schemeClr val="lt1"/>
+    </dgm:linClrLst>
+    <dgm:effectClrLst/>
+    <dgm:txLinClrLst/>
+    <dgm:txFillClrLst/>
+    <dgm:txEffectClrLst/>
+  </dgm:styleLbl>
+  <dgm:styleLbl name="asst2">
+    <dgm:fillClrLst meth="repeat">
+      <a:schemeClr val="accent1"/>
+    </dgm:fillClrLst>
+    <dgm:linClrLst meth="repeat">
+      <a:schemeClr val="lt1"/>
+    </dgm:linClrLst>
+    <dgm:effectClrLst/>
+    <dgm:txLinClrLst/>
+    <dgm:txFillClrLst/>
+    <dgm:txEffectClrLst/>
+  </dgm:styleLbl>
+  <dgm:styleLbl name="asst3">
+    <dgm:fillClrLst meth="repeat">
+      <a:schemeClr val="accent1"/>
+    </dgm:fillClrLst>
+    <dgm:linClrLst meth="repeat">
+      <a:schemeClr val="lt1"/>
+    </dgm:linClrLst>
+    <dgm:effectClrLst/>
+    <dgm:txLinClrLst/>
+    <dgm:txFillClrLst/>
+    <dgm:txEffectClrLst/>
+  </dgm:styleLbl>
+  <dgm:styleLbl name="asst4">
+    <dgm:fillClrLst meth="repeat">
+      <a:schemeClr val="accent1"/>
+    </dgm:fillClrLst>
+    <dgm:linClrLst meth="repeat">
+      <a:schemeClr val="lt1"/>
+    </dgm:linClrLst>
+    <dgm:effectClrLst/>
+    <dgm:txLinClrLst/>
+    <dgm:txFillClrLst/>
+    <dgm:txEffectClrLst/>
+  </dgm:styleLbl>
+  <dgm:styleLbl name="parChTrans2D1">
+    <dgm:fillClrLst meth="repeat">
+      <a:schemeClr val="accent1">
+        <a:tint val="60000"/>
+      </a:schemeClr>
+    </dgm:fillClrLst>
+    <dgm:linClrLst meth="repeat">
+      <a:schemeClr val="accent1">
+        <a:tint val="60000"/>
+      </a:schemeClr>
+    </dgm:linClrLst>
+    <dgm:effectClrLst/>
+    <dgm:txLinClrLst/>
+    <dgm:txFillClrLst meth="repeat">
+      <a:schemeClr val="lt1"/>
+    </dgm:txFillClrLst>
+    <dgm:txEffectClrLst/>
+  </dgm:styleLbl>
+  <dgm:styleLbl name="parChTrans2D2">
+    <dgm:fillClrLst meth="repeat">
+      <a:schemeClr val="accent1"/>
+    </dgm:fillClrLst>
+    <dgm:linClrLst meth="repeat">
+      <a:schemeClr val="accent1"/>
+    </dgm:linClrLst>
+    <dgm:effectClrLst/>
+    <dgm:txLinClrLst/>
+    <dgm:txFillClrLst meth="repeat">
+      <a:schemeClr val="lt1"/>
+    </dgm:txFillClrLst>
+    <dgm:txEffectClrLst/>
+  </dgm:styleLbl>
+  <dgm:styleLbl name="parChTrans2D3">
+    <dgm:fillClrLst meth="repeat">
+      <a:schemeClr val="accent1"/>
+    </dgm:fillClrLst>
+    <dgm:linClrLst meth="repeat">
+      <a:schemeClr val="accent1"/>
+    </dgm:linClrLst>
+    <dgm:effectClrLst/>
+    <dgm:txLinClrLst/>
+    <dgm:txFillClrLst meth="repeat">
+      <a:schemeClr val="lt1"/>
+    </dgm:txFillClrLst>
+    <dgm:txEffectClrLst/>
+  </dgm:styleLbl>
+  <dgm:styleLbl name="parChTrans2D4">
+    <dgm:fillClrLst meth="repeat">
+      <a:schemeClr val="accent1"/>
+    </dgm:fillClrLst>
+    <dgm:linClrLst meth="repeat">
+      <a:schemeClr val="accent1"/>
+    </dgm:linClrLst>
+    <dgm:effectClrLst/>
+    <dgm:txLinClrLst/>
+    <dgm:txFillClrLst meth="repeat">
+      <a:schemeClr val="lt1"/>
+    </dgm:txFillClrLst>
+    <dgm:txEffectClrLst/>
+  </dgm:styleLbl>
+  <dgm:styleLbl name="parChTrans1D1">
+    <dgm:fillClrLst meth="repeat">
+      <a:schemeClr val="accent1"/>
+    </dgm:fillClrLst>
+    <dgm:linClrLst meth="repeat">
+      <a:schemeClr val="accent1">
+        <a:shade val="60000"/>
+      </a:schemeClr>
+    </dgm:linClrLst>
+    <dgm:effectClrLst/>
+    <dgm:txLinClrLst/>
+    <dgm:txFillClrLst meth="repeat">
+      <a:schemeClr val="tx1"/>
+    </dgm:txFillClrLst>
+    <dgm:txEffectClrLst/>
+  </dgm:styleLbl>
+  <dgm:styleLbl name="parChTrans1D2">
+    <dgm:fillClrLst meth="repeat">
+      <a:schemeClr val="accent1"/>
+    </dgm:fillClrLst>
+    <dgm:linClrLst meth="repeat">
+      <a:schemeClr val="accent1">
+        <a:shade val="60000"/>
+      </a:schemeClr>
+    </dgm:linClrLst>
+    <dgm:effectClrLst/>
+    <dgm:txLinClrLst/>
+    <dgm:txFillClrLst meth="repeat">
+      <a:schemeClr val="tx1"/>
+    </dgm:txFillClrLst>
+    <dgm:txEffectClrLst/>
+  </dgm:styleLbl>
+  <dgm:styleLbl name="parChTrans1D3">
+    <dgm:fillClrLst meth="repeat">
+      <a:schemeClr val="accent1"/>
+    </dgm:fillClrLst>
+    <dgm:linClrLst meth="repeat">
+      <a:schemeClr val="accent1">
+        <a:shade val="80000"/>
+      </a:schemeClr>
+    </dgm:linClrLst>
+    <dgm:effectClrLst/>
+    <dgm:txLinClrLst/>
+    <dgm:txFillClrLst meth="repeat">
+      <a:schemeClr val="tx1"/>
+    </dgm:txFillClrLst>
+    <dgm:txEffectClrLst/>
+  </dgm:styleLbl>
+  <dgm:styleLbl name="parChTrans1D4">
+    <dgm:fillClrLst meth="repeat">
+      <a:schemeClr val="accent1"/>
+    </dgm:fillClrLst>
+    <dgm:linClrLst meth="repeat">
+      <a:schemeClr val="accent1">
+        <a:shade val="80000"/>
+      </a:schemeClr>
+    </dgm:linClrLst>
+    <dgm:effectClrLst/>
+    <dgm:txLinClrLst/>
+    <dgm:txFillClrLst meth="repeat">
+      <a:schemeClr val="tx1"/>
+    </dgm:txFillClrLst>
+    <dgm:txEffectClrLst/>
+  </dgm:styleLbl>
+  <dgm:styleLbl name="fgAcc1">
+    <dgm:fillClrLst meth="repeat">
+      <a:schemeClr val="lt1">
+        <a:alpha val="90000"/>
+      </a:schemeClr>
+    </dgm:fillClrLst>
+    <dgm:linClrLst meth="repeat">
+      <a:schemeClr val="accent1"/>
+    </dgm:linClrLst>
+    <dgm:effectClrLst/>
+    <dgm:txLinClrLst/>
+    <dgm:txFillClrLst meth="repeat">
+      <a:schemeClr val="dk1"/>
+    </dgm:txFillClrLst>
+    <dgm:txEffectClrLst/>
+  </dgm:styleLbl>
+  <dgm:styleLbl name="conFgAcc1">
+    <dgm:fillClrLst meth="repeat">
+      <a:schemeClr val="lt1">
+        <a:alpha val="90000"/>
+      </a:schemeClr>
+    </dgm:fillClrLst>
+    <dgm:linClrLst meth="repeat">
+      <a:schemeClr val="accent1"/>
+    </dgm:linClrLst>
+    <dgm:effectClrLst/>
+    <dgm:txLinClrLst/>
+    <dgm:txFillClrLst meth="repeat">
+      <a:schemeClr val="dk1"/>
+    </dgm:txFillClrLst>
+    <dgm:txEffectClrLst/>
+  </dgm:styleLbl>
+  <dgm:styleLbl name="alignAcc1">
+    <dgm:fillClrLst meth="repeat">
+      <a:schemeClr val="lt1">
+        <a:alpha val="90000"/>
+      </a:schemeClr>
+    </dgm:fillClrLst>
+    <dgm:linClrLst meth="repeat">
+      <a:schemeClr val="accent1"/>
+    </dgm:linClrLst>
+    <dgm:effectClrLst/>
+    <dgm:txLinClrLst/>
+    <dgm:txFillClrLst meth="repeat">
+      <a:schemeClr val="dk1"/>
+    </dgm:txFillClrLst>
+    <dgm:txEffectClrLst/>
+  </dgm:styleLbl>
+  <dgm:styleLbl name="trAlignAcc1">
+    <dgm:fillClrLst meth="repeat">
+      <a:schemeClr val="lt1">
+        <a:alpha val="40000"/>
+      </a:schemeClr>
+    </dgm:fillClrLst>
+    <dgm:linClrLst meth="repeat">
+      <a:schemeClr val="accent1"/>
+    </dgm:linClrLst>
+    <dgm:effectClrLst/>
+    <dgm:txLinClrLst/>
+    <dgm:txFillClrLst meth="repeat">
+      <a:schemeClr val="dk1"/>
+    </dgm:txFillClrLst>
+    <dgm:txEffectClrLst/>
+  </dgm:styleLbl>
+  <dgm:styleLbl name="bgAcc1">
+    <dgm:fillClrLst meth="repeat">
+      <a:schemeClr val="lt1">
+        <a:alpha val="90000"/>
+      </a:schemeClr>
+    </dgm:fillClrLst>
+    <dgm:linClrLst meth="repeat">
+      <a:schemeClr val="accent1"/>
+    </dgm:linClrLst>
+    <dgm:effectClrLst/>
+    <dgm:txLinClrLst/>
+    <dgm:txFillClrLst meth="repeat">
+      <a:schemeClr val="dk1"/>
+    </dgm:txFillClrLst>
+    <dgm:txEffectClrLst/>
+  </dgm:styleLbl>
+  <dgm:styleLbl name="solidFgAcc1">
+    <dgm:fillClrLst meth="repeat">
+      <a:schemeClr val="lt1"/>
+    </dgm:fillClrLst>
+    <dgm:linClrLst meth="repeat">
+      <a:schemeClr val="accent1"/>
+    </dgm:linClrLst>
+    <dgm:effectClrLst/>
+    <dgm:txLinClrLst/>
+    <dgm:txFillClrLst meth="repeat">
+      <a:schemeClr val="dk1"/>
+    </dgm:txFillClrLst>
+    <dgm:txEffectClrLst/>
+  </dgm:styleLbl>
+  <dgm:styleLbl name="solidAlignAcc1">
+    <dgm:fillClrLst meth="repeat">
+      <a:schemeClr val="lt1"/>
+    </dgm:fillClrLst>
+    <dgm:linClrLst meth="repeat">
+      <a:schemeClr val="accent1"/>
+    </dgm:linClrLst>
+    <dgm:effectClrLst/>
+    <dgm:txLinClrLst/>
+    <dgm:txFillClrLst meth="repeat">
+      <a:schemeClr val="dk1"/>
+    </dgm:txFillClrLst>
+    <dgm:txEffectClrLst/>
+  </dgm:styleLbl>
+  <dgm:styleLbl name="solidBgAcc1">
+    <dgm:fillClrLst meth="repeat">
+      <a:schemeClr val="lt1"/>
+    </dgm:fillClrLst>
+    <dgm:linClrLst meth="repeat">
+      <a:schemeClr val="accent1"/>
+    </dgm:linClrLst>
+    <dgm:effectClrLst/>
+    <dgm:txLinClrLst/>
+    <dgm:txFillClrLst meth="repeat">
+      <a:schemeClr val="dk1"/>
+    </dgm:txFillClrLst>
+    <dgm:txEffectClrLst/>
+  </dgm:styleLbl>
+  <dgm:styleLbl name="fgAccFollowNode1">
+    <dgm:fillClrLst meth="repeat">
+      <a:schemeClr val="accent1">
+        <a:alpha val="90000"/>
+        <a:tint val="40000"/>
+      </a:schemeClr>
+    </dgm:fillClrLst>
+    <dgm:linClrLst meth="repeat">
+      <a:schemeClr val="accent1">
+        <a:alpha val="90000"/>
+        <a:tint val="40000"/>
+      </a:schemeClr>
+    </dgm:linClrLst>
+    <dgm:effectClrLst/>
+    <dgm:txLinClrLst/>
+    <dgm:txFillClrLst meth="repeat">
+      <a:schemeClr val="dk1"/>
+    </dgm:txFillClrLst>
+    <dgm:txEffectClrLst/>
+  </dgm:styleLbl>
+  <dgm:styleLbl name="alignAccFollowNode1">
+    <dgm:fillClrLst meth="repeat">
+      <a:schemeClr val="accent1">
+        <a:alpha val="90000"/>
+        <a:tint val="40000"/>
+      </a:schemeClr>
+    </dgm:fillClrLst>
+    <dgm:linClrLst meth="repeat">
+      <a:schemeClr val="accent1">
+        <a:alpha val="90000"/>
+        <a:tint val="40000"/>
+      </a:schemeClr>
+    </dgm:linClrLst>
+    <dgm:effectClrLst/>
+    <dgm:txLinClrLst/>
+    <dgm:txFillClrLst meth="repeat">
+      <a:schemeClr val="dk1"/>
+    </dgm:txFillClrLst>
+    <dgm:txEffectClrLst/>
+  </dgm:styleLbl>
+  <dgm:styleLbl name="bgAccFollowNode1">
+    <dgm:fillClrLst meth="repeat">
+      <a:schemeClr val="accent1">
+        <a:alpha val="90000"/>
+        <a:tint val="40000"/>
+      </a:schemeClr>
+    </dgm:fillClrLst>
+    <dgm:linClrLst meth="repeat">
+      <a:schemeClr val="accent1">
+        <a:alpha val="90000"/>
+        <a:tint val="40000"/>
+      </a:schemeClr>
+    </dgm:linClrLst>
+    <dgm:effectClrLst/>
+    <dgm:txLinClrLst/>
+    <dgm:txFillClrLst meth="repeat">
+      <a:schemeClr val="dk1"/>
+    </dgm:txFillClrLst>
+    <dgm:txEffectClrLst/>
+  </dgm:styleLbl>
+  <dgm:styleLbl name="fgAcc0">
+    <dgm:fillClrLst meth="repeat">
+      <a:schemeClr val="lt1">
+        <a:alpha val="90000"/>
+      </a:schemeClr>
+    </dgm:fillClrLst>
+    <dgm:linClrLst meth="repeat">
+      <a:schemeClr val="accent1"/>
+    </dgm:linClrLst>
+    <dgm:effectClrLst/>
+    <dgm:txLinClrLst/>
+    <dgm:txFillClrLst meth="repeat">
+      <a:schemeClr val="dk1"/>
+    </dgm:txFillClrLst>
+    <dgm:txEffectClrLst/>
+  </dgm:styleLbl>
+  <dgm:styleLbl name="fgAcc2">
+    <dgm:fillClrLst meth="repeat">
+      <a:schemeClr val="lt1">
+        <a:alpha val="90000"/>
+      </a:schemeClr>
+    </dgm:fillClrLst>
+    <dgm:linClrLst meth="repeat">
+      <a:schemeClr val="accent1"/>
+    </dgm:linClrLst>
+    <dgm:effectClrLst/>
+    <dgm:txLinClrLst/>
+    <dgm:txFillClrLst meth="repeat">
+      <a:schemeClr val="dk1"/>
+    </dgm:txFillClrLst>
+    <dgm:txEffectClrLst/>
+  </dgm:styleLbl>
+  <dgm:styleLbl name="fgAcc3">
+    <dgm:fillClrLst meth="repeat">
+      <a:schemeClr val="lt1">
+        <a:alpha val="90000"/>
+      </a:schemeClr>
+    </dgm:fillClrLst>
+    <dgm:linClrLst meth="repeat">
+      <a:schemeClr val="accent1"/>
+    </dgm:linClrLst>
+    <dgm:effectClrLst/>
+    <dgm:txLinClrLst/>
+    <dgm:txFillClrLst meth="repeat">
+      <a:schemeClr val="dk1"/>
+    </dgm:txFillClrLst>
+    <dgm:txEffectClrLst/>
+  </dgm:styleLbl>
+  <dgm:styleLbl name="fgAcc4">
+    <dgm:fillClrLst meth="repeat">
+      <a:schemeClr val="lt1">
+        <a:alpha val="90000"/>
+      </a:schemeClr>
+    </dgm:fillClrLst>
+    <dgm:linClrLst meth="repeat">
+      <a:schemeClr val="accent1"/>
+    </dgm:linClrLst>
+    <dgm:effectClrLst/>
+    <dgm:txLinClrLst/>
+    <dgm:txFillClrLst meth="repeat">
+      <a:schemeClr val="dk1"/>
+    </dgm:txFillClrLst>
+    <dgm:txEffectClrLst/>
+  </dgm:styleLbl>
+  <dgm:styleLbl name="bgShp">
+    <dgm:fillClrLst meth="repeat">
+      <a:schemeClr val="accent1">
+        <a:tint val="40000"/>
+      </a:schemeClr>
+    </dgm:fillClrLst>
+    <dgm:linClrLst meth="repeat">
+      <a:schemeClr val="accent1"/>
+    </dgm:linClrLst>
+    <dgm:effectClrLst/>
+    <dgm:txLinClrLst/>
+    <dgm:txFillClrLst meth="repeat">
+      <a:schemeClr val="dk1"/>
+    </dgm:txFillClrLst>
+    <dgm:txEffectClrLst/>
+  </dgm:styleLbl>
+  <dgm:styleLbl name="dkBgShp">
+    <dgm:fillClrLst meth="repeat">
+      <a:schemeClr val="accent1">
+        <a:shade val="80000"/>
+      </a:schemeClr>
+    </dgm:fillClrLst>
+    <dgm:linClrLst meth="repeat">
+      <a:schemeClr val="accent1"/>
+    </dgm:linClrLst>
+    <dgm:effectClrLst/>
+    <dgm:txLinClrLst/>
+    <dgm:txFillClrLst meth="repeat">
+      <a:schemeClr val="lt1"/>
+    </dgm:txFillClrLst>
+    <dgm:txEffectClrLst/>
+  </dgm:styleLbl>
+  <dgm:styleLbl name="trBgShp">
+    <dgm:fillClrLst meth="repeat">
+      <a:schemeClr val="accent1">
+        <a:tint val="50000"/>
+        <a:alpha val="40000"/>
+      </a:schemeClr>
+    </dgm:fillClrLst>
+    <dgm:linClrLst meth="repeat">
+      <a:schemeClr val="accent1"/>
+    </dgm:linClrLst>
+    <dgm:effectClrLst/>
+    <dgm:txLinClrLst/>
+    <dgm:txFillClrLst meth="repeat">
+      <a:schemeClr val="lt1"/>
+    </dgm:txFillClrLst>
+    <dgm:txEffectClrLst/>
+  </dgm:styleLbl>
+  <dgm:styleLbl name="fgShp">
+    <dgm:fillClrLst meth="repeat">
+      <a:schemeClr val="accent1">
+        <a:tint val="60000"/>
+      </a:schemeClr>
+    </dgm:fillClrLst>
+    <dgm:linClrLst meth="repeat">
+      <a:schemeClr val="lt1"/>
+    </dgm:linClrLst>
+    <dgm:effectClrLst/>
+    <dgm:txLinClrLst/>
+    <dgm:txFillClrLst meth="repeat">
+      <a:schemeClr val="dk1"/>
+    </dgm:txFillClrLst>
+    <dgm:txEffectClrLst/>
+  </dgm:styleLbl>
+  <dgm:styleLbl name="revTx">
+    <dgm:fillClrLst meth="repeat">
+      <a:schemeClr val="lt1">
+        <a:alpha val="0"/>
+      </a:schemeClr>
+    </dgm:fillClrLst>
+    <dgm:linClrLst meth="repeat">
+      <a:schemeClr val="dk1">
+        <a:alpha val="0"/>
+      </a:schemeClr>
+    </dgm:linClrLst>
+    <dgm:effectClrLst/>
+    <dgm:txLinClrLst/>
+    <dgm:txFillClrLst meth="repeat">
+      <a:schemeClr val="tx1"/>
+    </dgm:txFillClrLst>
+    <dgm:txEffectClrLst/>
+  </dgm:styleLbl>
+</dgm:colorsDef>
+</file>
+
+<file path=ppt/diagrams/data1.xml><?xml version="1.0" encoding="utf-8"?>
+<dgm:dataModel xmlns:dgm="http://schemas.openxmlformats.org/drawingml/2006/diagram" xmlns:a="http://schemas.openxmlformats.org/drawingml/2006/main">
+  <dgm:ptLst>
+    <dgm:pt modelId="{C768B337-D543-44D6-B9BD-97A330F0DA25}" type="doc">
+      <dgm:prSet loTypeId="urn:microsoft.com/office/officeart/2005/8/layout/hierarchy4" loCatId="relationship" qsTypeId="urn:microsoft.com/office/officeart/2005/8/quickstyle/simple1" qsCatId="simple" csTypeId="urn:microsoft.com/office/officeart/2005/8/colors/accent1_2" csCatId="accent1" phldr="1"/>
+      <dgm:spPr/>
+      <dgm:t>
+        <a:bodyPr/>
+        <a:lstStyle/>
+        <a:p>
+          <a:endParaRPr lang="en-US"/>
+        </a:p>
+      </dgm:t>
+    </dgm:pt>
+    <dgm:pt modelId="{A17E77E2-DE7C-4AEC-A1E3-298AEF0888C7}">
+      <dgm:prSet phldrT="[Text]"/>
+      <dgm:spPr/>
+      <dgm:t>
+        <a:bodyPr/>
+        <a:lstStyle/>
+        <a:p>
+          <a:r>
+            <a:rPr lang="en-US" dirty="0" smtClean="0"/>
+            <a:t>Root</a:t>
+          </a:r>
+          <a:endParaRPr lang="en-US" dirty="0"/>
+        </a:p>
+      </dgm:t>
+    </dgm:pt>
+    <dgm:pt modelId="{DB03D6DA-D96B-442E-B6CC-E8009EC5EE0B}" type="parTrans" cxnId="{2F22AAD1-8C83-4AAA-8217-A4F7F0DA4F9A}">
+      <dgm:prSet/>
+      <dgm:spPr/>
+      <dgm:t>
+        <a:bodyPr/>
+        <a:lstStyle/>
+        <a:p>
+          <a:endParaRPr lang="en-US"/>
+        </a:p>
+      </dgm:t>
+    </dgm:pt>
+    <dgm:pt modelId="{C4D90433-7019-4AC5-BDA3-5C538D4D9120}" type="sibTrans" cxnId="{2F22AAD1-8C83-4AAA-8217-A4F7F0DA4F9A}">
+      <dgm:prSet/>
+      <dgm:spPr/>
+      <dgm:t>
+        <a:bodyPr/>
+        <a:lstStyle/>
+        <a:p>
+          <a:endParaRPr lang="en-US"/>
+        </a:p>
+      </dgm:t>
+    </dgm:pt>
+    <dgm:pt modelId="{C4361406-ACA3-4954-B455-94E502085F3B}">
+      <dgm:prSet phldrT="[Text]"/>
+      <dgm:spPr/>
+      <dgm:t>
+        <a:bodyPr/>
+        <a:lstStyle/>
+        <a:p>
+          <a:r>
+            <a:rPr lang="en-US" dirty="0" smtClean="0"/>
+            <a:t>Review</a:t>
+          </a:r>
+          <a:endParaRPr lang="en-US" dirty="0"/>
+        </a:p>
+      </dgm:t>
+    </dgm:pt>
+    <dgm:pt modelId="{5D35BAD2-269F-4B3E-97E6-8C19D43E5407}" type="parTrans" cxnId="{5B60A557-6BC3-462F-90CE-04C0A8A4E7FD}">
+      <dgm:prSet/>
+      <dgm:spPr/>
+      <dgm:t>
+        <a:bodyPr/>
+        <a:lstStyle/>
+        <a:p>
+          <a:endParaRPr lang="en-US"/>
+        </a:p>
+      </dgm:t>
+    </dgm:pt>
+    <dgm:pt modelId="{D5A86CA3-671C-4C6F-A5B4-072B2E436B6D}" type="sibTrans" cxnId="{5B60A557-6BC3-462F-90CE-04C0A8A4E7FD}">
+      <dgm:prSet/>
+      <dgm:spPr/>
+      <dgm:t>
+        <a:bodyPr/>
+        <a:lstStyle/>
+        <a:p>
+          <a:endParaRPr lang="en-US"/>
+        </a:p>
+      </dgm:t>
+    </dgm:pt>
+    <dgm:pt modelId="{CB48BB65-ED2B-48DD-90D1-6F07A9009B0C}">
+      <dgm:prSet phldrT="[Text]"/>
+      <dgm:spPr/>
+      <dgm:t>
+        <a:bodyPr/>
+        <a:lstStyle/>
+        <a:p>
+          <a:r>
+            <a:rPr lang="en-US" dirty="0" smtClean="0"/>
+            <a:t>List</a:t>
+          </a:r>
+          <a:endParaRPr lang="en-US" dirty="0"/>
+        </a:p>
+      </dgm:t>
+    </dgm:pt>
+    <dgm:pt modelId="{5FFF3FB2-4A36-43F3-9AED-72E9038034D0}" type="parTrans" cxnId="{DD27B039-5B79-4759-8FFC-F83A2A916FCC}">
+      <dgm:prSet/>
+      <dgm:spPr/>
+      <dgm:t>
+        <a:bodyPr/>
+        <a:lstStyle/>
+        <a:p>
+          <a:endParaRPr lang="en-US"/>
+        </a:p>
+      </dgm:t>
+    </dgm:pt>
+    <dgm:pt modelId="{E320F1AE-8317-4FF9-BF65-C51FB3FB74DB}" type="sibTrans" cxnId="{DD27B039-5B79-4759-8FFC-F83A2A916FCC}">
+      <dgm:prSet/>
+      <dgm:spPr/>
+      <dgm:t>
+        <a:bodyPr/>
+        <a:lstStyle/>
+        <a:p>
+          <a:endParaRPr lang="en-US"/>
+        </a:p>
+      </dgm:t>
+    </dgm:pt>
+    <dgm:pt modelId="{52CBA95D-1394-4036-9FBC-BB49932751BC}">
+      <dgm:prSet phldrT="[Text]"/>
+      <dgm:spPr/>
+      <dgm:t>
+        <a:bodyPr/>
+        <a:lstStyle/>
+        <a:p>
+          <a:r>
+            <a:rPr lang="en-US" dirty="0" smtClean="0"/>
+            <a:t>Detail</a:t>
+          </a:r>
+          <a:endParaRPr lang="en-US" dirty="0"/>
+        </a:p>
+      </dgm:t>
+    </dgm:pt>
+    <dgm:pt modelId="{B05D7425-9880-47FA-B7DC-062EC661E186}" type="parTrans" cxnId="{D6DCDDEE-A49F-4EE3-92D1-7870D218AAE6}">
+      <dgm:prSet/>
+      <dgm:spPr/>
+      <dgm:t>
+        <a:bodyPr/>
+        <a:lstStyle/>
+        <a:p>
+          <a:endParaRPr lang="en-US"/>
+        </a:p>
+      </dgm:t>
+    </dgm:pt>
+    <dgm:pt modelId="{214CB6EE-275A-4D34-B073-71B108C14A1C}" type="sibTrans" cxnId="{D6DCDDEE-A49F-4EE3-92D1-7870D218AAE6}">
+      <dgm:prSet/>
+      <dgm:spPr/>
+      <dgm:t>
+        <a:bodyPr/>
+        <a:lstStyle/>
+        <a:p>
+          <a:endParaRPr lang="en-US"/>
+        </a:p>
+      </dgm:t>
+    </dgm:pt>
+    <dgm:pt modelId="{81DFFCCC-5D78-42E1-A50A-BD8513334CFE}">
+      <dgm:prSet phldrT="[Text]"/>
+      <dgm:spPr/>
+      <dgm:t>
+        <a:bodyPr/>
+        <a:lstStyle/>
+        <a:p>
+          <a:r>
+            <a:rPr lang="en-US" dirty="0" smtClean="0"/>
+            <a:t>Grade</a:t>
+          </a:r>
+          <a:endParaRPr lang="en-US" dirty="0"/>
+        </a:p>
+      </dgm:t>
+    </dgm:pt>
+    <dgm:pt modelId="{8D162478-D639-48E4-918F-CE4F2D4CE8B3}" type="parTrans" cxnId="{6C25C07F-0CCD-49A8-878C-5758E436572C}">
+      <dgm:prSet/>
+      <dgm:spPr/>
+      <dgm:t>
+        <a:bodyPr/>
+        <a:lstStyle/>
+        <a:p>
+          <a:endParaRPr lang="en-US"/>
+        </a:p>
+      </dgm:t>
+    </dgm:pt>
+    <dgm:pt modelId="{2B355283-A4B4-4CEC-8B24-CC42FD8C8EC3}" type="sibTrans" cxnId="{6C25C07F-0CCD-49A8-878C-5758E436572C}">
+      <dgm:prSet/>
+      <dgm:spPr/>
+      <dgm:t>
+        <a:bodyPr/>
+        <a:lstStyle/>
+        <a:p>
+          <a:endParaRPr lang="en-US"/>
+        </a:p>
+      </dgm:t>
+    </dgm:pt>
+    <dgm:pt modelId="{B5F201AA-A96B-4C2B-A053-C7269FF636EA}">
+      <dgm:prSet phldrT="[Text]"/>
+      <dgm:spPr/>
+      <dgm:t>
+        <a:bodyPr/>
+        <a:lstStyle/>
+        <a:p>
+          <a:r>
+            <a:rPr lang="en-US" dirty="0" smtClean="0"/>
+            <a:t>Home</a:t>
+          </a:r>
+          <a:endParaRPr lang="en-US" dirty="0"/>
+        </a:p>
+      </dgm:t>
+    </dgm:pt>
+    <dgm:pt modelId="{BB04FEBC-9F53-4493-9178-0F7D348AACBD}" type="parTrans" cxnId="{EE1C623C-0FB6-4D59-A400-366EE03DAF33}">
+      <dgm:prSet/>
+      <dgm:spPr/>
+      <dgm:t>
+        <a:bodyPr/>
+        <a:lstStyle/>
+        <a:p>
+          <a:endParaRPr lang="en-US"/>
+        </a:p>
+      </dgm:t>
+    </dgm:pt>
+    <dgm:pt modelId="{8693B929-4872-452D-9E89-10E6EBD6D9FE}" type="sibTrans" cxnId="{EE1C623C-0FB6-4D59-A400-366EE03DAF33}">
+      <dgm:prSet/>
+      <dgm:spPr/>
+      <dgm:t>
+        <a:bodyPr/>
+        <a:lstStyle/>
+        <a:p>
+          <a:endParaRPr lang="en-US"/>
+        </a:p>
+      </dgm:t>
+    </dgm:pt>
+    <dgm:pt modelId="{0D899E0B-C563-4CD7-BF75-9E187054BA2E}" type="pres">
+      <dgm:prSet presAssocID="{C768B337-D543-44D6-B9BD-97A330F0DA25}" presName="Name0" presStyleCnt="0">
+        <dgm:presLayoutVars>
+          <dgm:chPref val="1"/>
+          <dgm:dir/>
+          <dgm:animOne val="branch"/>
+          <dgm:animLvl val="lvl"/>
+          <dgm:resizeHandles/>
+        </dgm:presLayoutVars>
+      </dgm:prSet>
+      <dgm:spPr/>
+    </dgm:pt>
+    <dgm:pt modelId="{6B6EC9C9-20BC-40F7-86D9-67130FA1AFE1}" type="pres">
+      <dgm:prSet presAssocID="{A17E77E2-DE7C-4AEC-A1E3-298AEF0888C7}" presName="vertOne" presStyleCnt="0"/>
+      <dgm:spPr/>
+    </dgm:pt>
+    <dgm:pt modelId="{143C4F91-D9EA-43EE-8886-B945D04B5B09}" type="pres">
+      <dgm:prSet presAssocID="{A17E77E2-DE7C-4AEC-A1E3-298AEF0888C7}" presName="txOne" presStyleLbl="node0" presStyleIdx="0" presStyleCnt="1" custLinFactNeighborX="-11" custLinFactNeighborY="-462">
+        <dgm:presLayoutVars>
+          <dgm:chPref val="3"/>
+        </dgm:presLayoutVars>
+      </dgm:prSet>
+      <dgm:spPr/>
+    </dgm:pt>
+    <dgm:pt modelId="{19BFEEE8-7235-49EF-8259-7A9F6C6DB0FE}" type="pres">
+      <dgm:prSet presAssocID="{A17E77E2-DE7C-4AEC-A1E3-298AEF0888C7}" presName="parTransOne" presStyleCnt="0"/>
+      <dgm:spPr/>
+    </dgm:pt>
+    <dgm:pt modelId="{48A18508-EF33-43F3-ADA1-6AC3FF06B5F1}" type="pres">
+      <dgm:prSet presAssocID="{A17E77E2-DE7C-4AEC-A1E3-298AEF0888C7}" presName="horzOne" presStyleCnt="0"/>
+      <dgm:spPr/>
+    </dgm:pt>
+    <dgm:pt modelId="{132201F8-A4BA-4BB7-85F3-48B140C07E86}" type="pres">
+      <dgm:prSet presAssocID="{B5F201AA-A96B-4C2B-A053-C7269FF636EA}" presName="vertTwo" presStyleCnt="0"/>
+      <dgm:spPr/>
+    </dgm:pt>
+    <dgm:pt modelId="{D3085972-68A6-454D-B46F-D9B1A0C649F0}" type="pres">
+      <dgm:prSet presAssocID="{B5F201AA-A96B-4C2B-A053-C7269FF636EA}" presName="txTwo" presStyleLbl="node2" presStyleIdx="0" presStyleCnt="2">
+        <dgm:presLayoutVars>
+          <dgm:chPref val="3"/>
+        </dgm:presLayoutVars>
+      </dgm:prSet>
+      <dgm:spPr/>
+    </dgm:pt>
+    <dgm:pt modelId="{DEC37CF0-6415-42C2-881A-594E6C5B0DD4}" type="pres">
+      <dgm:prSet presAssocID="{B5F201AA-A96B-4C2B-A053-C7269FF636EA}" presName="horzTwo" presStyleCnt="0"/>
+      <dgm:spPr/>
+    </dgm:pt>
+    <dgm:pt modelId="{27BB8E2A-C017-4E9B-8C78-8D1234B8F789}" type="pres">
+      <dgm:prSet presAssocID="{8693B929-4872-452D-9E89-10E6EBD6D9FE}" presName="sibSpaceTwo" presStyleCnt="0"/>
+      <dgm:spPr/>
+    </dgm:pt>
+    <dgm:pt modelId="{650B5790-2C76-4696-88C4-A71B3F0E999C}" type="pres">
+      <dgm:prSet presAssocID="{C4361406-ACA3-4954-B455-94E502085F3B}" presName="vertTwo" presStyleCnt="0"/>
+      <dgm:spPr/>
+    </dgm:pt>
+    <dgm:pt modelId="{9577D710-5868-4873-B480-3124930F5D55}" type="pres">
+      <dgm:prSet presAssocID="{C4361406-ACA3-4954-B455-94E502085F3B}" presName="txTwo" presStyleLbl="node2" presStyleIdx="1" presStyleCnt="2">
+        <dgm:presLayoutVars>
+          <dgm:chPref val="3"/>
+        </dgm:presLayoutVars>
+      </dgm:prSet>
+      <dgm:spPr/>
+    </dgm:pt>
+    <dgm:pt modelId="{15BC02EC-8706-4761-B032-F6FC6FA7C128}" type="pres">
+      <dgm:prSet presAssocID="{C4361406-ACA3-4954-B455-94E502085F3B}" presName="parTransTwo" presStyleCnt="0"/>
+      <dgm:spPr/>
+    </dgm:pt>
+    <dgm:pt modelId="{7209E944-AA4D-4E67-BBE5-A0E5249F88F2}" type="pres">
+      <dgm:prSet presAssocID="{C4361406-ACA3-4954-B455-94E502085F3B}" presName="horzTwo" presStyleCnt="0"/>
+      <dgm:spPr/>
+    </dgm:pt>
+    <dgm:pt modelId="{01FB2612-7E07-42DF-9790-915CC68E8094}" type="pres">
+      <dgm:prSet presAssocID="{CB48BB65-ED2B-48DD-90D1-6F07A9009B0C}" presName="vertThree" presStyleCnt="0"/>
+      <dgm:spPr/>
+    </dgm:pt>
+    <dgm:pt modelId="{D45A31A6-F56D-4C74-BC61-B6E330199B80}" type="pres">
+      <dgm:prSet presAssocID="{CB48BB65-ED2B-48DD-90D1-6F07A9009B0C}" presName="txThree" presStyleLbl="node3" presStyleIdx="0" presStyleCnt="2">
+        <dgm:presLayoutVars>
+          <dgm:chPref val="3"/>
+        </dgm:presLayoutVars>
+      </dgm:prSet>
+      <dgm:spPr/>
+      <dgm:t>
+        <a:bodyPr/>
+        <a:lstStyle/>
+        <a:p>
+          <a:endParaRPr lang="en-US"/>
+        </a:p>
+      </dgm:t>
+    </dgm:pt>
+    <dgm:pt modelId="{2A2B6806-7DC3-4997-A631-3462D336B83F}" type="pres">
+      <dgm:prSet presAssocID="{CB48BB65-ED2B-48DD-90D1-6F07A9009B0C}" presName="horzThree" presStyleCnt="0"/>
+      <dgm:spPr/>
+    </dgm:pt>
+    <dgm:pt modelId="{92F75174-9489-4FE7-9DB8-E3B74D6FAC1C}" type="pres">
+      <dgm:prSet presAssocID="{E320F1AE-8317-4FF9-BF65-C51FB3FB74DB}" presName="sibSpaceThree" presStyleCnt="0"/>
+      <dgm:spPr/>
+    </dgm:pt>
+    <dgm:pt modelId="{C27423C3-3B6C-4EC0-9929-FF99047D8128}" type="pres">
+      <dgm:prSet presAssocID="{52CBA95D-1394-4036-9FBC-BB49932751BC}" presName="vertThree" presStyleCnt="0"/>
+      <dgm:spPr/>
+    </dgm:pt>
+    <dgm:pt modelId="{0E66B91D-4E95-4DCE-BDAA-2596875F46A2}" type="pres">
+      <dgm:prSet presAssocID="{52CBA95D-1394-4036-9FBC-BB49932751BC}" presName="txThree" presStyleLbl="node3" presStyleIdx="1" presStyleCnt="2">
+        <dgm:presLayoutVars>
+          <dgm:chPref val="3"/>
+        </dgm:presLayoutVars>
+      </dgm:prSet>
+      <dgm:spPr/>
+    </dgm:pt>
+    <dgm:pt modelId="{D6AAD1B3-20FF-4A66-9F6D-E8E2039F695C}" type="pres">
+      <dgm:prSet presAssocID="{52CBA95D-1394-4036-9FBC-BB49932751BC}" presName="parTransThree" presStyleCnt="0"/>
+      <dgm:spPr/>
+    </dgm:pt>
+    <dgm:pt modelId="{B6F83A26-9B97-44C6-A3F5-27743E977EBE}" type="pres">
+      <dgm:prSet presAssocID="{52CBA95D-1394-4036-9FBC-BB49932751BC}" presName="horzThree" presStyleCnt="0"/>
+      <dgm:spPr/>
+    </dgm:pt>
+    <dgm:pt modelId="{591BB48C-DCF6-4AD8-8B9F-AE6034073544}" type="pres">
+      <dgm:prSet presAssocID="{81DFFCCC-5D78-42E1-A50A-BD8513334CFE}" presName="vertFour" presStyleCnt="0">
+        <dgm:presLayoutVars>
+          <dgm:chPref val="3"/>
+        </dgm:presLayoutVars>
+      </dgm:prSet>
+      <dgm:spPr/>
+    </dgm:pt>
+    <dgm:pt modelId="{7559C032-DFB9-4F06-B030-634A1E05B69D}" type="pres">
+      <dgm:prSet presAssocID="{81DFFCCC-5D78-42E1-A50A-BD8513334CFE}" presName="txFour" presStyleLbl="node4" presStyleIdx="0" presStyleCnt="1">
+        <dgm:presLayoutVars>
+          <dgm:chPref val="3"/>
+        </dgm:presLayoutVars>
+      </dgm:prSet>
+      <dgm:spPr/>
+    </dgm:pt>
+    <dgm:pt modelId="{73F3283F-1390-41A6-BB68-F8BFA9989D20}" type="pres">
+      <dgm:prSet presAssocID="{81DFFCCC-5D78-42E1-A50A-BD8513334CFE}" presName="horzFour" presStyleCnt="0"/>
+      <dgm:spPr/>
+    </dgm:pt>
+  </dgm:ptLst>
+  <dgm:cxnLst>
+    <dgm:cxn modelId="{61D707F7-0CA1-43AA-B2E7-884767F7F3B1}" type="presOf" srcId="{CB48BB65-ED2B-48DD-90D1-6F07A9009B0C}" destId="{D45A31A6-F56D-4C74-BC61-B6E330199B80}" srcOrd="0" destOrd="0" presId="urn:microsoft.com/office/officeart/2005/8/layout/hierarchy4"/>
+    <dgm:cxn modelId="{DD27B039-5B79-4759-8FFC-F83A2A916FCC}" srcId="{C4361406-ACA3-4954-B455-94E502085F3B}" destId="{CB48BB65-ED2B-48DD-90D1-6F07A9009B0C}" srcOrd="0" destOrd="0" parTransId="{5FFF3FB2-4A36-43F3-9AED-72E9038034D0}" sibTransId="{E320F1AE-8317-4FF9-BF65-C51FB3FB74DB}"/>
+    <dgm:cxn modelId="{EE1C623C-0FB6-4D59-A400-366EE03DAF33}" srcId="{A17E77E2-DE7C-4AEC-A1E3-298AEF0888C7}" destId="{B5F201AA-A96B-4C2B-A053-C7269FF636EA}" srcOrd="0" destOrd="0" parTransId="{BB04FEBC-9F53-4493-9178-0F7D348AACBD}" sibTransId="{8693B929-4872-452D-9E89-10E6EBD6D9FE}"/>
+    <dgm:cxn modelId="{4C5FF7B1-FEEB-4B27-BEF1-537D24AA7670}" type="presOf" srcId="{C768B337-D543-44D6-B9BD-97A330F0DA25}" destId="{0D899E0B-C563-4CD7-BF75-9E187054BA2E}" srcOrd="0" destOrd="0" presId="urn:microsoft.com/office/officeart/2005/8/layout/hierarchy4"/>
+    <dgm:cxn modelId="{DD9E3764-12E5-4308-8ADA-9628688A5180}" type="presOf" srcId="{81DFFCCC-5D78-42E1-A50A-BD8513334CFE}" destId="{7559C032-DFB9-4F06-B030-634A1E05B69D}" srcOrd="0" destOrd="0" presId="urn:microsoft.com/office/officeart/2005/8/layout/hierarchy4"/>
+    <dgm:cxn modelId="{5B60A557-6BC3-462F-90CE-04C0A8A4E7FD}" srcId="{A17E77E2-DE7C-4AEC-A1E3-298AEF0888C7}" destId="{C4361406-ACA3-4954-B455-94E502085F3B}" srcOrd="1" destOrd="0" parTransId="{5D35BAD2-269F-4B3E-97E6-8C19D43E5407}" sibTransId="{D5A86CA3-671C-4C6F-A5B4-072B2E436B6D}"/>
+    <dgm:cxn modelId="{7DB02B4F-D734-4363-91B2-AA9099FEF889}" type="presOf" srcId="{52CBA95D-1394-4036-9FBC-BB49932751BC}" destId="{0E66B91D-4E95-4DCE-BDAA-2596875F46A2}" srcOrd="0" destOrd="0" presId="urn:microsoft.com/office/officeart/2005/8/layout/hierarchy4"/>
+    <dgm:cxn modelId="{E96DF8A4-110D-486C-8D12-F83D784A957C}" type="presOf" srcId="{A17E77E2-DE7C-4AEC-A1E3-298AEF0888C7}" destId="{143C4F91-D9EA-43EE-8886-B945D04B5B09}" srcOrd="0" destOrd="0" presId="urn:microsoft.com/office/officeart/2005/8/layout/hierarchy4"/>
+    <dgm:cxn modelId="{D6DCDDEE-A49F-4EE3-92D1-7870D218AAE6}" srcId="{C4361406-ACA3-4954-B455-94E502085F3B}" destId="{52CBA95D-1394-4036-9FBC-BB49932751BC}" srcOrd="1" destOrd="0" parTransId="{B05D7425-9880-47FA-B7DC-062EC661E186}" sibTransId="{214CB6EE-275A-4D34-B073-71B108C14A1C}"/>
+    <dgm:cxn modelId="{2F22AAD1-8C83-4AAA-8217-A4F7F0DA4F9A}" srcId="{C768B337-D543-44D6-B9BD-97A330F0DA25}" destId="{A17E77E2-DE7C-4AEC-A1E3-298AEF0888C7}" srcOrd="0" destOrd="0" parTransId="{DB03D6DA-D96B-442E-B6CC-E8009EC5EE0B}" sibTransId="{C4D90433-7019-4AC5-BDA3-5C538D4D9120}"/>
+    <dgm:cxn modelId="{6C25C07F-0CCD-49A8-878C-5758E436572C}" srcId="{52CBA95D-1394-4036-9FBC-BB49932751BC}" destId="{81DFFCCC-5D78-42E1-A50A-BD8513334CFE}" srcOrd="0" destOrd="0" parTransId="{8D162478-D639-48E4-918F-CE4F2D4CE8B3}" sibTransId="{2B355283-A4B4-4CEC-8B24-CC42FD8C8EC3}"/>
+    <dgm:cxn modelId="{0734B593-A1FC-49A2-894A-C35DAADBA31E}" type="presOf" srcId="{B5F201AA-A96B-4C2B-A053-C7269FF636EA}" destId="{D3085972-68A6-454D-B46F-D9B1A0C649F0}" srcOrd="0" destOrd="0" presId="urn:microsoft.com/office/officeart/2005/8/layout/hierarchy4"/>
+    <dgm:cxn modelId="{6F1BDF7D-EFD8-499C-8AC1-B67F16D8717F}" type="presOf" srcId="{C4361406-ACA3-4954-B455-94E502085F3B}" destId="{9577D710-5868-4873-B480-3124930F5D55}" srcOrd="0" destOrd="0" presId="urn:microsoft.com/office/officeart/2005/8/layout/hierarchy4"/>
+    <dgm:cxn modelId="{D88F1204-DC51-4337-89C8-EECDB90655AF}" type="presParOf" srcId="{0D899E0B-C563-4CD7-BF75-9E187054BA2E}" destId="{6B6EC9C9-20BC-40F7-86D9-67130FA1AFE1}" srcOrd="0" destOrd="0" presId="urn:microsoft.com/office/officeart/2005/8/layout/hierarchy4"/>
+    <dgm:cxn modelId="{20FDECE7-F3BE-4A4A-897F-24A4C060BF93}" type="presParOf" srcId="{6B6EC9C9-20BC-40F7-86D9-67130FA1AFE1}" destId="{143C4F91-D9EA-43EE-8886-B945D04B5B09}" srcOrd="0" destOrd="0" presId="urn:microsoft.com/office/officeart/2005/8/layout/hierarchy4"/>
+    <dgm:cxn modelId="{A8491971-1A3F-4490-8586-3F7B5D7CB8F2}" type="presParOf" srcId="{6B6EC9C9-20BC-40F7-86D9-67130FA1AFE1}" destId="{19BFEEE8-7235-49EF-8259-7A9F6C6DB0FE}" srcOrd="1" destOrd="0" presId="urn:microsoft.com/office/officeart/2005/8/layout/hierarchy4"/>
+    <dgm:cxn modelId="{F0899BBB-778B-454A-A092-DB7D275A8915}" type="presParOf" srcId="{6B6EC9C9-20BC-40F7-86D9-67130FA1AFE1}" destId="{48A18508-EF33-43F3-ADA1-6AC3FF06B5F1}" srcOrd="2" destOrd="0" presId="urn:microsoft.com/office/officeart/2005/8/layout/hierarchy4"/>
+    <dgm:cxn modelId="{8FFBD2A2-4D73-41A1-908B-C48F42F65D00}" type="presParOf" srcId="{48A18508-EF33-43F3-ADA1-6AC3FF06B5F1}" destId="{132201F8-A4BA-4BB7-85F3-48B140C07E86}" srcOrd="0" destOrd="0" presId="urn:microsoft.com/office/officeart/2005/8/layout/hierarchy4"/>
+    <dgm:cxn modelId="{146C5EA5-0AD1-4A51-8502-D1D24F2E4835}" type="presParOf" srcId="{132201F8-A4BA-4BB7-85F3-48B140C07E86}" destId="{D3085972-68A6-454D-B46F-D9B1A0C649F0}" srcOrd="0" destOrd="0" presId="urn:microsoft.com/office/officeart/2005/8/layout/hierarchy4"/>
+    <dgm:cxn modelId="{2A123F11-F398-49DF-B77B-F40F85E27C6F}" type="presParOf" srcId="{132201F8-A4BA-4BB7-85F3-48B140C07E86}" destId="{DEC37CF0-6415-42C2-881A-594E6C5B0DD4}" srcOrd="1" destOrd="0" presId="urn:microsoft.com/office/officeart/2005/8/layout/hierarchy4"/>
+    <dgm:cxn modelId="{D0DF0B8B-6D1E-4E96-9047-892C720ACDCE}" type="presParOf" srcId="{48A18508-EF33-43F3-ADA1-6AC3FF06B5F1}" destId="{27BB8E2A-C017-4E9B-8C78-8D1234B8F789}" srcOrd="1" destOrd="0" presId="urn:microsoft.com/office/officeart/2005/8/layout/hierarchy4"/>
+    <dgm:cxn modelId="{44E07818-82F6-43DF-95B9-7FCFE7D36966}" type="presParOf" srcId="{48A18508-EF33-43F3-ADA1-6AC3FF06B5F1}" destId="{650B5790-2C76-4696-88C4-A71B3F0E999C}" srcOrd="2" destOrd="0" presId="urn:microsoft.com/office/officeart/2005/8/layout/hierarchy4"/>
+    <dgm:cxn modelId="{7658D905-80D7-41E4-8A29-0849779CCD89}" type="presParOf" srcId="{650B5790-2C76-4696-88C4-A71B3F0E999C}" destId="{9577D710-5868-4873-B480-3124930F5D55}" srcOrd="0" destOrd="0" presId="urn:microsoft.com/office/officeart/2005/8/layout/hierarchy4"/>
+    <dgm:cxn modelId="{563701DA-486C-4EAF-96DC-1B7C8985CF45}" type="presParOf" srcId="{650B5790-2C76-4696-88C4-A71B3F0E999C}" destId="{15BC02EC-8706-4761-B032-F6FC6FA7C128}" srcOrd="1" destOrd="0" presId="urn:microsoft.com/office/officeart/2005/8/layout/hierarchy4"/>
+    <dgm:cxn modelId="{795EBB05-5E83-4519-8CE8-3AF5BA5EE7CE}" type="presParOf" srcId="{650B5790-2C76-4696-88C4-A71B3F0E999C}" destId="{7209E944-AA4D-4E67-BBE5-A0E5249F88F2}" srcOrd="2" destOrd="0" presId="urn:microsoft.com/office/officeart/2005/8/layout/hierarchy4"/>
+    <dgm:cxn modelId="{3F3DD60F-A72F-4425-B8C7-D505EFF121A8}" type="presParOf" srcId="{7209E944-AA4D-4E67-BBE5-A0E5249F88F2}" destId="{01FB2612-7E07-42DF-9790-915CC68E8094}" srcOrd="0" destOrd="0" presId="urn:microsoft.com/office/officeart/2005/8/layout/hierarchy4"/>
+    <dgm:cxn modelId="{C342404A-BA64-4095-AB88-2AB59164608C}" type="presParOf" srcId="{01FB2612-7E07-42DF-9790-915CC68E8094}" destId="{D45A31A6-F56D-4C74-BC61-B6E330199B80}" srcOrd="0" destOrd="0" presId="urn:microsoft.com/office/officeart/2005/8/layout/hierarchy4"/>
+    <dgm:cxn modelId="{2165BA13-2E81-439D-9AA2-38710A1F383E}" type="presParOf" srcId="{01FB2612-7E07-42DF-9790-915CC68E8094}" destId="{2A2B6806-7DC3-4997-A631-3462D336B83F}" srcOrd="1" destOrd="0" presId="urn:microsoft.com/office/officeart/2005/8/layout/hierarchy4"/>
+    <dgm:cxn modelId="{2F4BF89E-1405-4C44-BBAC-FD36D0A926B3}" type="presParOf" srcId="{7209E944-AA4D-4E67-BBE5-A0E5249F88F2}" destId="{92F75174-9489-4FE7-9DB8-E3B74D6FAC1C}" srcOrd="1" destOrd="0" presId="urn:microsoft.com/office/officeart/2005/8/layout/hierarchy4"/>
+    <dgm:cxn modelId="{628A0FC4-4987-4B84-AF66-03F6A6768428}" type="presParOf" srcId="{7209E944-AA4D-4E67-BBE5-A0E5249F88F2}" destId="{C27423C3-3B6C-4EC0-9929-FF99047D8128}" srcOrd="2" destOrd="0" presId="urn:microsoft.com/office/officeart/2005/8/layout/hierarchy4"/>
+    <dgm:cxn modelId="{22FC40D6-10DC-4C6D-AC74-7665F5D8C782}" type="presParOf" srcId="{C27423C3-3B6C-4EC0-9929-FF99047D8128}" destId="{0E66B91D-4E95-4DCE-BDAA-2596875F46A2}" srcOrd="0" destOrd="0" presId="urn:microsoft.com/office/officeart/2005/8/layout/hierarchy4"/>
+    <dgm:cxn modelId="{64C0516E-3223-4A8E-B6AC-62C65C3848C0}" type="presParOf" srcId="{C27423C3-3B6C-4EC0-9929-FF99047D8128}" destId="{D6AAD1B3-20FF-4A66-9F6D-E8E2039F695C}" srcOrd="1" destOrd="0" presId="urn:microsoft.com/office/officeart/2005/8/layout/hierarchy4"/>
+    <dgm:cxn modelId="{05CD7606-F256-4F1D-9640-89844C1A0B03}" type="presParOf" srcId="{C27423C3-3B6C-4EC0-9929-FF99047D8128}" destId="{B6F83A26-9B97-44C6-A3F5-27743E977EBE}" srcOrd="2" destOrd="0" presId="urn:microsoft.com/office/officeart/2005/8/layout/hierarchy4"/>
+    <dgm:cxn modelId="{45088A77-7510-44E5-94D2-CB7369C14769}" type="presParOf" srcId="{B6F83A26-9B97-44C6-A3F5-27743E977EBE}" destId="{591BB48C-DCF6-4AD8-8B9F-AE6034073544}" srcOrd="0" destOrd="0" presId="urn:microsoft.com/office/officeart/2005/8/layout/hierarchy4"/>
+    <dgm:cxn modelId="{194095FA-AF12-4F07-B48E-5D1BDAF8F147}" type="presParOf" srcId="{591BB48C-DCF6-4AD8-8B9F-AE6034073544}" destId="{7559C032-DFB9-4F06-B030-634A1E05B69D}" srcOrd="0" destOrd="0" presId="urn:microsoft.com/office/officeart/2005/8/layout/hierarchy4"/>
+    <dgm:cxn modelId="{D6850C29-940A-47A8-8BF5-ABD99D3AE855}" type="presParOf" srcId="{591BB48C-DCF6-4AD8-8B9F-AE6034073544}" destId="{73F3283F-1390-41A6-BB68-F8BFA9989D20}" srcOrd="1" destOrd="0" presId="urn:microsoft.com/office/officeart/2005/8/layout/hierarchy4"/>
+  </dgm:cxnLst>
+  <dgm:bg/>
+  <dgm:whole/>
+  <dgm:extLst>
+    <a:ext uri="http://schemas.microsoft.com/office/drawing/2008/diagram">
+      <dsp:dataModelExt xmlns:dsp="http://schemas.microsoft.com/office/drawing/2008/diagram" relId="rId6" minVer="http://schemas.openxmlformats.org/drawingml/2006/diagram"/>
+    </a:ext>
+  </dgm:extLst>
+</dgm:dataModel>
+</file>
+
+<file path=ppt/diagrams/drawing1.xml><?xml version="1.0" encoding="utf-8"?>
+<dsp:drawing xmlns:dgm="http://schemas.openxmlformats.org/drawingml/2006/diagram" xmlns:dsp="http://schemas.microsoft.com/office/drawing/2008/diagram" xmlns:a="http://schemas.openxmlformats.org/drawingml/2006/main">
+  <dsp:spTree>
+    <dsp:nvGrpSpPr>
+      <dsp:cNvPr id="0" name=""/>
+      <dsp:cNvGrpSpPr/>
+    </dsp:nvGrpSpPr>
+    <dsp:grpSpPr/>
+    <dsp:sp modelId="{143C4F91-D9EA-43EE-8886-B945D04B5B09}">
+      <dsp:nvSpPr>
+        <dsp:cNvPr id="0" name=""/>
+        <dsp:cNvSpPr/>
+      </dsp:nvSpPr>
+      <dsp:spPr>
+        <a:xfrm>
+          <a:off x="38" y="0"/>
+          <a:ext cx="8076932" cy="912241"/>
+        </a:xfrm>
+        <a:prstGeom prst="roundRect">
+          <a:avLst>
+            <a:gd name="adj" fmla="val 10000"/>
+          </a:avLst>
+        </a:prstGeom>
+        <a:solidFill>
+          <a:schemeClr val="accent1">
+            <a:hueOff val="0"/>
+            <a:satOff val="0"/>
+            <a:lumOff val="0"/>
+            <a:alphaOff val="0"/>
+          </a:schemeClr>
+        </a:solidFill>
+        <a:ln w="12700" cap="flat" cmpd="sng" algn="ctr">
+          <a:solidFill>
+            <a:schemeClr val="lt1">
+              <a:hueOff val="0"/>
+              <a:satOff val="0"/>
+              <a:lumOff val="0"/>
+              <a:alphaOff val="0"/>
+            </a:schemeClr>
+          </a:solidFill>
+          <a:prstDash val="solid"/>
+          <a:miter lim="800000"/>
+        </a:ln>
+        <a:effectLst/>
+      </dsp:spPr>
+      <dsp:style>
+        <a:lnRef idx="2">
+          <a:scrgbClr r="0" g="0" b="0"/>
+        </a:lnRef>
+        <a:fillRef idx="1">
+          <a:scrgbClr r="0" g="0" b="0"/>
+        </a:fillRef>
+        <a:effectRef idx="0">
+          <a:scrgbClr r="0" g="0" b="0"/>
+        </a:effectRef>
+        <a:fontRef idx="minor">
+          <a:schemeClr val="lt1"/>
+        </a:fontRef>
+      </dsp:style>
+      <dsp:txBody>
+        <a:bodyPr spcFirstLastPara="0" vert="horz" wrap="square" lIns="148590" tIns="148590" rIns="148590" bIns="148590" numCol="1" spcCol="1270" anchor="ctr" anchorCtr="0">
+          <a:noAutofit/>
+        </a:bodyPr>
+        <a:lstStyle/>
+        <a:p>
+          <a:pPr lvl="0" algn="ctr" defTabSz="1733550">
+            <a:lnSpc>
+              <a:spcPct val="90000"/>
+            </a:lnSpc>
+            <a:spcBef>
+              <a:spcPct val="0"/>
+            </a:spcBef>
+            <a:spcAft>
+              <a:spcPct val="35000"/>
+            </a:spcAft>
+          </a:pPr>
+          <a:r>
+            <a:rPr lang="en-US" sz="3900" kern="1200" dirty="0" smtClean="0"/>
+            <a:t>Root</a:t>
+          </a:r>
+          <a:endParaRPr lang="en-US" sz="3900" kern="1200" dirty="0"/>
+        </a:p>
+      </dsp:txBody>
+      <dsp:txXfrm>
+        <a:off x="26757" y="26719"/>
+        <a:ext cx="8023494" cy="858803"/>
+      </dsp:txXfrm>
+    </dsp:sp>
+    <dsp:sp modelId="{D3085972-68A6-454D-B46F-D9B1A0C649F0}">
+      <dsp:nvSpPr>
+        <dsp:cNvPr id="0" name=""/>
+        <dsp:cNvSpPr/>
+      </dsp:nvSpPr>
+      <dsp:spPr>
+        <a:xfrm>
+          <a:off x="927" y="1016879"/>
+          <a:ext cx="2583791" cy="912241"/>
+        </a:xfrm>
+        <a:prstGeom prst="roundRect">
+          <a:avLst>
+            <a:gd name="adj" fmla="val 10000"/>
+          </a:avLst>
+        </a:prstGeom>
+        <a:solidFill>
+          <a:schemeClr val="accent1">
+            <a:hueOff val="0"/>
+            <a:satOff val="0"/>
+            <a:lumOff val="0"/>
+            <a:alphaOff val="0"/>
+          </a:schemeClr>
+        </a:solidFill>
+        <a:ln w="12700" cap="flat" cmpd="sng" algn="ctr">
+          <a:solidFill>
+            <a:schemeClr val="lt1">
+              <a:hueOff val="0"/>
+              <a:satOff val="0"/>
+              <a:lumOff val="0"/>
+              <a:alphaOff val="0"/>
+            </a:schemeClr>
+          </a:solidFill>
+          <a:prstDash val="solid"/>
+          <a:miter lim="800000"/>
+        </a:ln>
+        <a:effectLst/>
+      </dsp:spPr>
+      <dsp:style>
+        <a:lnRef idx="2">
+          <a:scrgbClr r="0" g="0" b="0"/>
+        </a:lnRef>
+        <a:fillRef idx="1">
+          <a:scrgbClr r="0" g="0" b="0"/>
+        </a:fillRef>
+        <a:effectRef idx="0">
+          <a:scrgbClr r="0" g="0" b="0"/>
+        </a:effectRef>
+        <a:fontRef idx="minor">
+          <a:schemeClr val="lt1"/>
+        </a:fontRef>
+      </dsp:style>
+      <dsp:txBody>
+        <a:bodyPr spcFirstLastPara="0" vert="horz" wrap="square" lIns="148590" tIns="148590" rIns="148590" bIns="148590" numCol="1" spcCol="1270" anchor="ctr" anchorCtr="0">
+          <a:noAutofit/>
+        </a:bodyPr>
+        <a:lstStyle/>
+        <a:p>
+          <a:pPr lvl="0" algn="ctr" defTabSz="1733550">
+            <a:lnSpc>
+              <a:spcPct val="90000"/>
+            </a:lnSpc>
+            <a:spcBef>
+              <a:spcPct val="0"/>
+            </a:spcBef>
+            <a:spcAft>
+              <a:spcPct val="35000"/>
+            </a:spcAft>
+          </a:pPr>
+          <a:r>
+            <a:rPr lang="en-US" sz="3900" kern="1200" dirty="0" smtClean="0"/>
+            <a:t>Home</a:t>
+          </a:r>
+          <a:endParaRPr lang="en-US" sz="3900" kern="1200" dirty="0"/>
+        </a:p>
+      </dsp:txBody>
+      <dsp:txXfrm>
+        <a:off x="27646" y="1043598"/>
+        <a:ext cx="2530353" cy="858803"/>
+      </dsp:txXfrm>
+    </dsp:sp>
+    <dsp:sp modelId="{9577D710-5868-4873-B480-3124930F5D55}">
+      <dsp:nvSpPr>
+        <dsp:cNvPr id="0" name=""/>
+        <dsp:cNvSpPr/>
+      </dsp:nvSpPr>
+      <dsp:spPr>
+        <a:xfrm>
+          <a:off x="2801757" y="1016879"/>
+          <a:ext cx="5276102" cy="912241"/>
+        </a:xfrm>
+        <a:prstGeom prst="roundRect">
+          <a:avLst>
+            <a:gd name="adj" fmla="val 10000"/>
+          </a:avLst>
+        </a:prstGeom>
+        <a:solidFill>
+          <a:schemeClr val="accent1">
+            <a:hueOff val="0"/>
+            <a:satOff val="0"/>
+            <a:lumOff val="0"/>
+            <a:alphaOff val="0"/>
+          </a:schemeClr>
+        </a:solidFill>
+        <a:ln w="12700" cap="flat" cmpd="sng" algn="ctr">
+          <a:solidFill>
+            <a:schemeClr val="lt1">
+              <a:hueOff val="0"/>
+              <a:satOff val="0"/>
+              <a:lumOff val="0"/>
+              <a:alphaOff val="0"/>
+            </a:schemeClr>
+          </a:solidFill>
+          <a:prstDash val="solid"/>
+          <a:miter lim="800000"/>
+        </a:ln>
+        <a:effectLst/>
+      </dsp:spPr>
+      <dsp:style>
+        <a:lnRef idx="2">
+          <a:scrgbClr r="0" g="0" b="0"/>
+        </a:lnRef>
+        <a:fillRef idx="1">
+          <a:scrgbClr r="0" g="0" b="0"/>
+        </a:fillRef>
+        <a:effectRef idx="0">
+          <a:scrgbClr r="0" g="0" b="0"/>
+        </a:effectRef>
+        <a:fontRef idx="minor">
+          <a:schemeClr val="lt1"/>
+        </a:fontRef>
+      </dsp:style>
+      <dsp:txBody>
+        <a:bodyPr spcFirstLastPara="0" vert="horz" wrap="square" lIns="148590" tIns="148590" rIns="148590" bIns="148590" numCol="1" spcCol="1270" anchor="ctr" anchorCtr="0">
+          <a:noAutofit/>
+        </a:bodyPr>
+        <a:lstStyle/>
+        <a:p>
+          <a:pPr lvl="0" algn="ctr" defTabSz="1733550">
+            <a:lnSpc>
+              <a:spcPct val="90000"/>
+            </a:lnSpc>
+            <a:spcBef>
+              <a:spcPct val="0"/>
+            </a:spcBef>
+            <a:spcAft>
+              <a:spcPct val="35000"/>
+            </a:spcAft>
+          </a:pPr>
+          <a:r>
+            <a:rPr lang="en-US" sz="3900" kern="1200" dirty="0" smtClean="0"/>
+            <a:t>Review</a:t>
+          </a:r>
+          <a:endParaRPr lang="en-US" sz="3900" kern="1200" dirty="0"/>
+        </a:p>
+      </dsp:txBody>
+      <dsp:txXfrm>
+        <a:off x="2828476" y="1043598"/>
+        <a:ext cx="5222664" cy="858803"/>
+      </dsp:txXfrm>
+    </dsp:sp>
+    <dsp:sp modelId="{D45A31A6-F56D-4C74-BC61-B6E330199B80}">
+      <dsp:nvSpPr>
+        <dsp:cNvPr id="0" name=""/>
+        <dsp:cNvSpPr/>
+      </dsp:nvSpPr>
+      <dsp:spPr>
+        <a:xfrm>
+          <a:off x="2801757" y="2033278"/>
+          <a:ext cx="2583791" cy="912241"/>
+        </a:xfrm>
+        <a:prstGeom prst="roundRect">
+          <a:avLst>
+            <a:gd name="adj" fmla="val 10000"/>
+          </a:avLst>
+        </a:prstGeom>
+        <a:solidFill>
+          <a:schemeClr val="accent1">
+            <a:hueOff val="0"/>
+            <a:satOff val="0"/>
+            <a:lumOff val="0"/>
+            <a:alphaOff val="0"/>
+          </a:schemeClr>
+        </a:solidFill>
+        <a:ln w="12700" cap="flat" cmpd="sng" algn="ctr">
+          <a:solidFill>
+            <a:schemeClr val="lt1">
+              <a:hueOff val="0"/>
+              <a:satOff val="0"/>
+              <a:lumOff val="0"/>
+              <a:alphaOff val="0"/>
+            </a:schemeClr>
+          </a:solidFill>
+          <a:prstDash val="solid"/>
+          <a:miter lim="800000"/>
+        </a:ln>
+        <a:effectLst/>
+      </dsp:spPr>
+      <dsp:style>
+        <a:lnRef idx="2">
+          <a:scrgbClr r="0" g="0" b="0"/>
+        </a:lnRef>
+        <a:fillRef idx="1">
+          <a:scrgbClr r="0" g="0" b="0"/>
+        </a:fillRef>
+        <a:effectRef idx="0">
+          <a:scrgbClr r="0" g="0" b="0"/>
+        </a:effectRef>
+        <a:fontRef idx="minor">
+          <a:schemeClr val="lt1"/>
+        </a:fontRef>
+      </dsp:style>
+      <dsp:txBody>
+        <a:bodyPr spcFirstLastPara="0" vert="horz" wrap="square" lIns="148590" tIns="148590" rIns="148590" bIns="148590" numCol="1" spcCol="1270" anchor="ctr" anchorCtr="0">
+          <a:noAutofit/>
+        </a:bodyPr>
+        <a:lstStyle/>
+        <a:p>
+          <a:pPr lvl="0" algn="ctr" defTabSz="1733550">
+            <a:lnSpc>
+              <a:spcPct val="90000"/>
+            </a:lnSpc>
+            <a:spcBef>
+              <a:spcPct val="0"/>
+            </a:spcBef>
+            <a:spcAft>
+              <a:spcPct val="35000"/>
+            </a:spcAft>
+          </a:pPr>
+          <a:r>
+            <a:rPr lang="en-US" sz="3900" kern="1200" dirty="0" smtClean="0"/>
+            <a:t>List</a:t>
+          </a:r>
+          <a:endParaRPr lang="en-US" sz="3900" kern="1200" dirty="0"/>
+        </a:p>
+      </dsp:txBody>
+      <dsp:txXfrm>
+        <a:off x="2828476" y="2059997"/>
+        <a:ext cx="2530353" cy="858803"/>
+      </dsp:txXfrm>
+    </dsp:sp>
+    <dsp:sp modelId="{0E66B91D-4E95-4DCE-BDAA-2596875F46A2}">
+      <dsp:nvSpPr>
+        <dsp:cNvPr id="0" name=""/>
+        <dsp:cNvSpPr/>
+      </dsp:nvSpPr>
+      <dsp:spPr>
+        <a:xfrm>
+          <a:off x="5494068" y="2033278"/>
+          <a:ext cx="2583791" cy="912241"/>
+        </a:xfrm>
+        <a:prstGeom prst="roundRect">
+          <a:avLst>
+            <a:gd name="adj" fmla="val 10000"/>
+          </a:avLst>
+        </a:prstGeom>
+        <a:solidFill>
+          <a:schemeClr val="accent1">
+            <a:hueOff val="0"/>
+            <a:satOff val="0"/>
+            <a:lumOff val="0"/>
+            <a:alphaOff val="0"/>
+          </a:schemeClr>
+        </a:solidFill>
+        <a:ln w="12700" cap="flat" cmpd="sng" algn="ctr">
+          <a:solidFill>
+            <a:schemeClr val="lt1">
+              <a:hueOff val="0"/>
+              <a:satOff val="0"/>
+              <a:lumOff val="0"/>
+              <a:alphaOff val="0"/>
+            </a:schemeClr>
+          </a:solidFill>
+          <a:prstDash val="solid"/>
+          <a:miter lim="800000"/>
+        </a:ln>
+        <a:effectLst/>
+      </dsp:spPr>
+      <dsp:style>
+        <a:lnRef idx="2">
+          <a:scrgbClr r="0" g="0" b="0"/>
+        </a:lnRef>
+        <a:fillRef idx="1">
+          <a:scrgbClr r="0" g="0" b="0"/>
+        </a:fillRef>
+        <a:effectRef idx="0">
+          <a:scrgbClr r="0" g="0" b="0"/>
+        </a:effectRef>
+        <a:fontRef idx="minor">
+          <a:schemeClr val="lt1"/>
+        </a:fontRef>
+      </dsp:style>
+      <dsp:txBody>
+        <a:bodyPr spcFirstLastPara="0" vert="horz" wrap="square" lIns="148590" tIns="148590" rIns="148590" bIns="148590" numCol="1" spcCol="1270" anchor="ctr" anchorCtr="0">
+          <a:noAutofit/>
+        </a:bodyPr>
+        <a:lstStyle/>
+        <a:p>
+          <a:pPr lvl="0" algn="ctr" defTabSz="1733550">
+            <a:lnSpc>
+              <a:spcPct val="90000"/>
+            </a:lnSpc>
+            <a:spcBef>
+              <a:spcPct val="0"/>
+            </a:spcBef>
+            <a:spcAft>
+              <a:spcPct val="35000"/>
+            </a:spcAft>
+          </a:pPr>
+          <a:r>
+            <a:rPr lang="en-US" sz="3900" kern="1200" dirty="0" smtClean="0"/>
+            <a:t>Detail</a:t>
+          </a:r>
+          <a:endParaRPr lang="en-US" sz="3900" kern="1200" dirty="0"/>
+        </a:p>
+      </dsp:txBody>
+      <dsp:txXfrm>
+        <a:off x="5520787" y="2059997"/>
+        <a:ext cx="2530353" cy="858803"/>
+      </dsp:txXfrm>
+    </dsp:sp>
+    <dsp:sp modelId="{7559C032-DFB9-4F06-B030-634A1E05B69D}">
+      <dsp:nvSpPr>
+        <dsp:cNvPr id="0" name=""/>
+        <dsp:cNvSpPr/>
+      </dsp:nvSpPr>
+      <dsp:spPr>
+        <a:xfrm>
+          <a:off x="5494068" y="3049676"/>
+          <a:ext cx="2583791" cy="912241"/>
+        </a:xfrm>
+        <a:prstGeom prst="roundRect">
+          <a:avLst>
+            <a:gd name="adj" fmla="val 10000"/>
+          </a:avLst>
+        </a:prstGeom>
+        <a:solidFill>
+          <a:schemeClr val="accent1">
+            <a:hueOff val="0"/>
+            <a:satOff val="0"/>
+            <a:lumOff val="0"/>
+            <a:alphaOff val="0"/>
+          </a:schemeClr>
+        </a:solidFill>
+        <a:ln w="12700" cap="flat" cmpd="sng" algn="ctr">
+          <a:solidFill>
+            <a:schemeClr val="lt1">
+              <a:hueOff val="0"/>
+              <a:satOff val="0"/>
+              <a:lumOff val="0"/>
+              <a:alphaOff val="0"/>
+            </a:schemeClr>
+          </a:solidFill>
+          <a:prstDash val="solid"/>
+          <a:miter lim="800000"/>
+        </a:ln>
+        <a:effectLst/>
+      </dsp:spPr>
+      <dsp:style>
+        <a:lnRef idx="2">
+          <a:scrgbClr r="0" g="0" b="0"/>
+        </a:lnRef>
+        <a:fillRef idx="1">
+          <a:scrgbClr r="0" g="0" b="0"/>
+        </a:fillRef>
+        <a:effectRef idx="0">
+          <a:scrgbClr r="0" g="0" b="0"/>
+        </a:effectRef>
+        <a:fontRef idx="minor">
+          <a:schemeClr val="lt1"/>
+        </a:fontRef>
+      </dsp:style>
+      <dsp:txBody>
+        <a:bodyPr spcFirstLastPara="0" vert="horz" wrap="square" lIns="148590" tIns="148590" rIns="148590" bIns="148590" numCol="1" spcCol="1270" anchor="ctr" anchorCtr="0">
+          <a:noAutofit/>
+        </a:bodyPr>
+        <a:lstStyle/>
+        <a:p>
+          <a:pPr lvl="0" algn="ctr" defTabSz="1733550">
+            <a:lnSpc>
+              <a:spcPct val="90000"/>
+            </a:lnSpc>
+            <a:spcBef>
+              <a:spcPct val="0"/>
+            </a:spcBef>
+            <a:spcAft>
+              <a:spcPct val="35000"/>
+            </a:spcAft>
+          </a:pPr>
+          <a:r>
+            <a:rPr lang="en-US" sz="3900" kern="1200" dirty="0" smtClean="0"/>
+            <a:t>Grade</a:t>
+          </a:r>
+          <a:endParaRPr lang="en-US" sz="3900" kern="1200" dirty="0"/>
+        </a:p>
+      </dsp:txBody>
+      <dsp:txXfrm>
+        <a:off x="5520787" y="3076395"/>
+        <a:ext cx="2530353" cy="858803"/>
+      </dsp:txXfrm>
+    </dsp:sp>
+  </dsp:spTree>
+</dsp:drawing>
+</file>
+
+<file path=ppt/diagrams/layout1.xml><?xml version="1.0" encoding="utf-8"?>
+<dgm:layoutDef xmlns:dgm="http://schemas.openxmlformats.org/drawingml/2006/diagram" xmlns:a="http://schemas.openxmlformats.org/drawingml/2006/main" uniqueId="urn:microsoft.com/office/officeart/2005/8/layout/hierarchy4">
+  <dgm:title val=""/>
+  <dgm:desc val=""/>
+  <dgm:catLst>
+    <dgm:cat type="hierarchy" pri="4000"/>
+    <dgm:cat type="list" pri="24000"/>
+    <dgm:cat type="relationship" pri="10000"/>
+  </dgm:catLst>
+  <dgm:sampData>
+    <dgm:dataModel>
+      <dgm:ptLst>
+        <dgm:pt modelId="0" type="doc"/>
+        <dgm:pt modelId="1">
+          <dgm:prSet phldr="1"/>
+        </dgm:pt>
+        <dgm:pt modelId="2">
+          <dgm:prSet phldr="1"/>
+        </dgm:pt>
+        <dgm:pt modelId="21">
+          <dgm:prSet phldr="1"/>
+        </dgm:pt>
+        <dgm:pt modelId="22">
+          <dgm:prSet phldr="1"/>
+        </dgm:pt>
+        <dgm:pt modelId="3">
+          <dgm:prSet phldr="1"/>
+        </dgm:pt>
+        <dgm:pt modelId="31">
+          <dgm:prSet phldr="1"/>
+        </dgm:pt>
+      </dgm:ptLst>
+      <dgm:cxnLst>
+        <dgm:cxn modelId="4" srcId="0" destId="1" srcOrd="0" destOrd="0"/>
+        <dgm:cxn modelId="5" srcId="1" destId="2" srcOrd="0" destOrd="0"/>
+        <dgm:cxn modelId="6" srcId="1" destId="3" srcOrd="1" destOrd="0"/>
+        <dgm:cxn modelId="23" srcId="2" destId="21" srcOrd="0" destOrd="0"/>
+        <dgm:cxn modelId="24" srcId="2" destId="22" srcOrd="1" destOrd="0"/>
+        <dgm:cxn modelId="33" srcId="3" destId="31" srcOrd="0" destOrd="0"/>
+      </dgm:cxnLst>
+      <dgm:bg/>
+      <dgm:whole/>
+    </dgm:dataModel>
+  </dgm:sampData>
+  <dgm:styleData>
+    <dgm:dataModel>
+      <dgm:ptLst>
+        <dgm:pt modelId="0" type="doc"/>
+        <dgm:pt modelId="1"/>
+        <dgm:pt modelId="11"/>
+        <dgm:pt modelId="12"/>
+      </dgm:ptLst>
+      <dgm:cxnLst>
+        <dgm:cxn modelId="2" srcId="0" destId="1" srcOrd="0" destOrd="0"/>
+        <dgm:cxn modelId="13" srcId="1" destId="11" srcOrd="0" destOrd="0"/>
+        <dgm:cxn modelId="14" srcId="1" destId="12" srcOrd="1" destOrd="0"/>
+      </dgm:cxnLst>
+      <dgm:bg/>
+      <dgm:whole/>
+    </dgm:dataModel>
+  </dgm:styleData>
+  <dgm:clrData>
+    <dgm:dataModel>
+      <dgm:ptLst>
+        <dgm:pt modelId="0" type="doc"/>
+        <dgm:pt modelId="1"/>
+        <dgm:pt modelId="2"/>
+        <dgm:pt modelId="21"/>
+        <dgm:pt modelId="211"/>
+        <dgm:pt modelId="3"/>
+        <dgm:pt modelId="31"/>
+        <dgm:pt modelId="311"/>
+      </dgm:ptLst>
+      <dgm:cxnLst>
+        <dgm:cxn modelId="4" srcId="0" destId="1" srcOrd="0" destOrd="0"/>
+        <dgm:cxn modelId="5" srcId="1" destId="2" srcOrd="0" destOrd="0"/>
+        <dgm:cxn modelId="6" srcId="1" destId="3" srcOrd="1" destOrd="0"/>
+        <dgm:cxn modelId="23" srcId="2" destId="21" srcOrd="0" destOrd="0"/>
+        <dgm:cxn modelId="24" srcId="21" destId="211" srcOrd="0" destOrd="0"/>
+        <dgm:cxn modelId="33" srcId="3" destId="31" srcOrd="0" destOrd="0"/>
+        <dgm:cxn modelId="34" srcId="31" destId="311" srcOrd="0" destOrd="0"/>
+      </dgm:cxnLst>
+      <dgm:bg/>
+      <dgm:whole/>
+    </dgm:dataModel>
+  </dgm:clrData>
+  <dgm:layoutNode name="Name0">
+    <dgm:varLst>
+      <dgm:chPref val="1"/>
+      <dgm:dir/>
+      <dgm:animOne val="branch"/>
+      <dgm:animLvl val="lvl"/>
+      <dgm:resizeHandles/>
+    </dgm:varLst>
+    <dgm:choose name="Name1">
+      <dgm:if name="Name2" func="var" arg="dir" op="equ" val="norm">
+        <dgm:alg type="lin">
+          <dgm:param type="linDir" val="fromL"/>
+          <dgm:param type="nodeVertAlign" val="t"/>
+        </dgm:alg>
+      </dgm:if>
+      <dgm:else name="Name3">
+        <dgm:alg type="lin">
+          <dgm:param type="linDir" val="fromR"/>
+          <dgm:param type="nodeVertAlign" val="t"/>
+        </dgm:alg>
+      </dgm:else>
+    </dgm:choose>
+    <dgm:shape xmlns:r="http://schemas.openxmlformats.org/officeDocument/2006/relationships" r:blip="">
+      <dgm:adjLst/>
+    </dgm:shape>
+    <dgm:presOf/>
+    <dgm:constrLst>
+      <dgm:constr type="w" for="ch" forName="vertOne" refType="w"/>
+      <dgm:constr type="w" for="des" forName="horzOne" refType="w"/>
+      <dgm:constr type="w" for="des" forName="txOne" refType="w"/>
+      <dgm:constr type="w" for="des" forName="vertTwo" refType="w"/>
+      <dgm:constr type="w" for="des" forName="horzTwo" refType="w"/>
+      <dgm:constr type="w" for="des" forName="txTwo" refType="w"/>
+      <dgm:constr type="w" for="des" forName="vertThree" refType="w"/>
+      <dgm:constr type="w" for="des" forName="horzThree" refType="w"/>
+      <dgm:constr type="w" for="des" forName="txThree" refType="w"/>
+      <dgm:constr type="w" for="des" forName="vertFour" refType="w"/>
+      <dgm:constr type="w" for="des" forName="horzFour" refType="w"/>
+      <dgm:constr type="w" for="des" forName="txFour" refType="w"/>
+      <dgm:constr type="h" for="des" ptType="node" op="equ"/>
+      <dgm:constr type="h" for="des" forName="txOne" refType="h"/>
+      <dgm:constr type="userH" for="des" ptType="node" refType="h" refFor="des" refForName="txOne"/>
+      <dgm:constr type="primFontSz" for="des" forName="txOne" val="65"/>
+      <dgm:constr type="primFontSz" for="des" forName="txTwo" val="65"/>
+      <dgm:constr type="primFontSz" for="des" forName="txTwo" refType="primFontSz" refFor="des" refForName="txOne" op="lte"/>
+      <dgm:constr type="primFontSz" for="des" forName="txThree" val="65"/>
+      <dgm:constr type="primFontSz" for="des" forName="txThree" refType="primFontSz" refFor="des" refForName="txOne" op="lte"/>
+      <dgm:constr type="primFontSz" for="des" forName="txThree" refType="primFontSz" refFor="des" refForName="txTwo" op="lte"/>
+      <dgm:constr type="primFontSz" for="des" forName="txFour" val="65"/>
+      <dgm:constr type="primFontSz" for="des" forName="txFour" refType="primFontSz" refFor="des" refForName="txOne" op="lte"/>
+      <dgm:constr type="primFontSz" for="des" forName="txFour" refType="primFontSz" refFor="des" refForName="txTwo" op="lte"/>
+      <dgm:constr type="primFontSz" for="des" forName="txFour" refType="primFontSz" refFor="des" refForName="txThree" op="lte"/>
+      <dgm:constr type="w" for="des" forName="sibSpaceOne" refType="w" fact="0.168"/>
+      <dgm:constr type="w" for="des" forName="sibSpaceTwo" refType="w" refFor="des" refForName="sibSpaceOne" op="equ" fact="0.5"/>
+      <dgm:constr type="w" for="des" forName="sibSpaceThree" refType="w" refFor="des" refForName="sibSpaceTwo" op="equ" fact="0.5"/>
+      <dgm:constr type="w" for="des" forName="sibSpaceFour" refType="w" refFor="des" refForName="sibSpaceThree" op="equ" fact="0.5"/>
+      <dgm:constr type="h" for="des" forName="parTransOne" refType="w" fact="0.056"/>
+      <dgm:constr type="h" for="des" forName="parTransTwo" refType="h" refFor="des" refForName="parTransOne" op="equ"/>
+      <dgm:constr type="h" for="des" forName="parTransThree" refType="h" refFor="des" refForName="parTransTwo" op="equ"/>
+      <dgm:constr type="h" for="des" forName="parTransFour" refType="h" refFor="des" refForName="parTransThree" op="equ"/>
+    </dgm:constrLst>
+    <dgm:ruleLst/>
+    <dgm:forEach name="Name4" axis="ch" ptType="node">
+      <dgm:layoutNode name="vertOne">
+        <dgm:alg type="lin">
+          <dgm:param type="linDir" val="fromT"/>
+        </dgm:alg>
+        <dgm:shape xmlns:r="http://schemas.openxmlformats.org/officeDocument/2006/relationships" r:blip="">
+          <dgm:adjLst/>
+        </dgm:shape>
+        <dgm:presOf/>
+        <dgm:constrLst>
+          <dgm:constr type="w" for="ch" forName="txOne" refType="w" refFor="ch" refForName="horzOne" op="gte"/>
+        </dgm:constrLst>
+        <dgm:ruleLst/>
+        <dgm:layoutNode name="txOne" styleLbl="node0">
+          <dgm:varLst>
+            <dgm:chPref val="3"/>
+          </dgm:varLst>
+          <dgm:alg type="tx"/>
+          <dgm:shape xmlns:r="http://schemas.openxmlformats.org/officeDocument/2006/relationships" type="roundRect" r:blip="">
+            <dgm:adjLst>
+              <dgm:adj idx="1" val="0.1"/>
+            </dgm:adjLst>
+          </dgm:shape>
+          <dgm:presOf axis="self"/>
+          <dgm:constrLst>
+            <dgm:constr type="tMarg" refType="primFontSz" fact="0.3"/>
+            <dgm:constr type="bMarg" refType="primFontSz" fact="0.3"/>
+            <dgm:constr type="lMarg" refType="primFontSz" fact="0.3"/>
+            <dgm:constr type="rMarg" refType="primFontSz" fact="0.3"/>
+          </dgm:constrLst>
+          <dgm:ruleLst>
+            <dgm:rule type="primFontSz" val="5" fact="NaN" max="NaN"/>
+          </dgm:ruleLst>
+        </dgm:layoutNode>
+        <dgm:choose name="Name5">
+          <dgm:if name="Name6" axis="des" ptType="node" func="cnt" op="gt" val="0">
+            <dgm:layoutNode name="parTransOne">
+              <dgm:alg type="sp"/>
+              <dgm:shape xmlns:r="http://schemas.openxmlformats.org/officeDocument/2006/relationships" r:blip="">
+                <dgm:adjLst/>
+              </dgm:shape>
+              <dgm:presOf/>
+              <dgm:constrLst/>
+              <dgm:ruleLst/>
+            </dgm:layoutNode>
+          </dgm:if>
+          <dgm:else name="Name7"/>
+        </dgm:choose>
+        <dgm:layoutNode name="horzOne">
+          <dgm:choose name="Name8">
+            <dgm:if name="Name9" func="var" arg="dir" op="equ" val="norm">
+              <dgm:alg type="lin">
+                <dgm:param type="linDir" val="fromL"/>
+                <dgm:param type="nodeVertAlign" val="t"/>
+              </dgm:alg>
+            </dgm:if>
+            <dgm:else name="Name10">
+              <dgm:alg type="lin">
+                <dgm:param type="linDir" val="fromR"/>
+                <dgm:param type="nodeVertAlign" val="t"/>
+              </dgm:alg>
+            </dgm:else>
+          </dgm:choose>
+          <dgm:shape xmlns:r="http://schemas.openxmlformats.org/officeDocument/2006/relationships" r:blip="">
+            <dgm:adjLst/>
+          </dgm:shape>
+          <dgm:presOf/>
+          <dgm:constrLst/>
+          <dgm:ruleLst>
+            <dgm:rule type="w" val="INF" fact="NaN" max="NaN"/>
+          </dgm:ruleLst>
+          <dgm:forEach name="Name11" axis="ch" ptType="node">
+            <dgm:layoutNode name="vertTwo">
+              <dgm:alg type="lin">
+                <dgm:param type="linDir" val="fromT"/>
+              </dgm:alg>
+              <dgm:shape xmlns:r="http://schemas.openxmlformats.org/officeDocument/2006/relationships" r:blip="">
+                <dgm:adjLst/>
+              </dgm:shape>
+              <dgm:presOf/>
+              <dgm:constrLst>
+                <dgm:constr type="w" for="ch" forName="txTwo" refType="w" refFor="ch" refForName="horzTwo" op="gte"/>
+              </dgm:constrLst>
+              <dgm:ruleLst/>
+              <dgm:layoutNode name="txTwo">
+                <dgm:varLst>
+                  <dgm:chPref val="3"/>
+                </dgm:varLst>
+                <dgm:alg type="tx"/>
+                <dgm:shape xmlns:r="http://schemas.openxmlformats.org/officeDocument/2006/relationships" type="roundRect" r:blip="">
+                  <dgm:adjLst>
+                    <dgm:adj idx="1" val="0.1"/>
+                  </dgm:adjLst>
+                </dgm:shape>
+                <dgm:presOf axis="self"/>
+                <dgm:constrLst>
+                  <dgm:constr type="userH"/>
+                  <dgm:constr type="h" refType="userH"/>
+                  <dgm:constr type="tMarg" refType="primFontSz" fact="0.3"/>
+                  <dgm:constr type="bMarg" refType="primFontSz" fact="0.3"/>
+                  <dgm:constr type="lMarg" refType="primFontSz" fact="0.3"/>
+                  <dgm:constr type="rMarg" refType="primFontSz" fact="0.3"/>
+                </dgm:constrLst>
+                <dgm:ruleLst>
+                  <dgm:rule type="primFontSz" val="5" fact="NaN" max="NaN"/>
+                </dgm:ruleLst>
+              </dgm:layoutNode>
+              <dgm:choose name="Name12">
+                <dgm:if name="Name13" axis="des" ptType="node" func="cnt" op="gt" val="0">
+                  <dgm:layoutNode name="parTransTwo">
+                    <dgm:alg type="sp"/>
+                    <dgm:shape xmlns:r="http://schemas.openxmlformats.org/officeDocument/2006/relationships" r:blip="">
+                      <dgm:adjLst/>
+                    </dgm:shape>
+                    <dgm:presOf/>
+                    <dgm:constrLst/>
+                    <dgm:ruleLst/>
+                  </dgm:layoutNode>
+                </dgm:if>
+                <dgm:else name="Name14"/>
+              </dgm:choose>
+              <dgm:layoutNode name="horzTwo">
+                <dgm:choose name="Name15">
+                  <dgm:if name="Name16" func="var" arg="dir" op="equ" val="norm">
+                    <dgm:alg type="lin">
+                      <dgm:param type="linDir" val="fromL"/>
+                      <dgm:param type="nodeVertAlign" val="t"/>
+                    </dgm:alg>
+                  </dgm:if>
+                  <dgm:else name="Name17">
+                    <dgm:alg type="lin">
+                      <dgm:param type="linDir" val="fromR"/>
+                      <dgm:param type="nodeVertAlign" val="t"/>
+                    </dgm:alg>
+                  </dgm:else>
+                </dgm:choose>
+                <dgm:shape xmlns:r="http://schemas.openxmlformats.org/officeDocument/2006/relationships" r:blip="">
+                  <dgm:adjLst/>
+                </dgm:shape>
+                <dgm:presOf/>
+                <dgm:constrLst/>
+                <dgm:ruleLst>
+                  <dgm:rule type="w" val="INF" fact="NaN" max="NaN"/>
+                </dgm:ruleLst>
+                <dgm:forEach name="Name18" axis="ch" ptType="node">
+                  <dgm:layoutNode name="vertThree">
+                    <dgm:alg type="lin">
+                      <dgm:param type="linDir" val="fromT"/>
+                    </dgm:alg>
+                    <dgm:shape xmlns:r="http://schemas.openxmlformats.org/officeDocument/2006/relationships" r:blip="">
+                      <dgm:adjLst/>
+                    </dgm:shape>
+                    <dgm:presOf/>
+                    <dgm:constrLst>
+                      <dgm:constr type="w" for="ch" forName="txThree" refType="w" refFor="ch" refForName="horzThree" op="gte"/>
+                    </dgm:constrLst>
+                    <dgm:ruleLst/>
+                    <dgm:layoutNode name="txThree">
+                      <dgm:varLst>
+                        <dgm:chPref val="3"/>
+                      </dgm:varLst>
+                      <dgm:alg type="tx"/>
+                      <dgm:shape xmlns:r="http://schemas.openxmlformats.org/officeDocument/2006/relationships" type="roundRect" r:blip="">
+                        <dgm:adjLst>
+                          <dgm:adj idx="1" val="0.1"/>
+                        </dgm:adjLst>
+                      </dgm:shape>
+                      <dgm:presOf axis="self"/>
+                      <dgm:constrLst>
+                        <dgm:constr type="userH"/>
+                        <dgm:constr type="h" refType="userH"/>
+                        <dgm:constr type="tMarg" refType="primFontSz" fact="0.3"/>
+                        <dgm:constr type="bMarg" refType="primFontSz" fact="0.3"/>
+                        <dgm:constr type="lMarg" refType="primFontSz" fact="0.3"/>
+                        <dgm:constr type="rMarg" refType="primFontSz" fact="0.3"/>
+                      </dgm:constrLst>
+                      <dgm:ruleLst>
+                        <dgm:rule type="primFontSz" val="5" fact="NaN" max="NaN"/>
+                      </dgm:ruleLst>
+                    </dgm:layoutNode>
+                    <dgm:choose name="Name19">
+                      <dgm:if name="Name20" axis="des" ptType="node" func="cnt" op="gt" val="0">
+                        <dgm:layoutNode name="parTransThree">
+                          <dgm:alg type="sp"/>
+                          <dgm:shape xmlns:r="http://schemas.openxmlformats.org/officeDocument/2006/relationships" r:blip="">
+                            <dgm:adjLst/>
+                          </dgm:shape>
+                          <dgm:presOf/>
+                          <dgm:constrLst/>
+                          <dgm:ruleLst/>
+                        </dgm:layoutNode>
+                      </dgm:if>
+                      <dgm:else name="Name21"/>
+                    </dgm:choose>
+                    <dgm:layoutNode name="horzThree">
+                      <dgm:choose name="Name22">
+                        <dgm:if name="Name23" func="var" arg="dir" op="equ" val="norm">
+                          <dgm:alg type="lin">
+                            <dgm:param type="linDir" val="fromL"/>
+                            <dgm:param type="nodeVertAlign" val="t"/>
+                          </dgm:alg>
+                        </dgm:if>
+                        <dgm:else name="Name24">
+                          <dgm:alg type="lin">
+                            <dgm:param type="linDir" val="fromR"/>
+                            <dgm:param type="nodeVertAlign" val="t"/>
+                          </dgm:alg>
+                        </dgm:else>
+                      </dgm:choose>
+                      <dgm:shape xmlns:r="http://schemas.openxmlformats.org/officeDocument/2006/relationships" r:blip="">
+                        <dgm:adjLst/>
+                      </dgm:shape>
+                      <dgm:presOf/>
+                      <dgm:constrLst/>
+                      <dgm:ruleLst>
+                        <dgm:rule type="w" val="INF" fact="NaN" max="NaN"/>
+                      </dgm:ruleLst>
+                      <dgm:forEach name="repeat" axis="ch" ptType="node">
+                        <dgm:layoutNode name="vertFour">
+                          <dgm:varLst>
+                            <dgm:chPref val="3"/>
+                          </dgm:varLst>
+                          <dgm:alg type="lin">
+                            <dgm:param type="linDir" val="fromT"/>
+                          </dgm:alg>
+                          <dgm:shape xmlns:r="http://schemas.openxmlformats.org/officeDocument/2006/relationships" r:blip="">
+                            <dgm:adjLst/>
+                          </dgm:shape>
+                          <dgm:presOf/>
+                          <dgm:constrLst>
+                            <dgm:constr type="w" for="ch" forName="txFour" refType="w" refFor="ch" refForName="horzFour" op="gte"/>
+                          </dgm:constrLst>
+                          <dgm:ruleLst/>
+                          <dgm:layoutNode name="txFour">
+                            <dgm:varLst>
+                              <dgm:chPref val="3"/>
+                            </dgm:varLst>
+                            <dgm:alg type="tx"/>
+                            <dgm:shape xmlns:r="http://schemas.openxmlformats.org/officeDocument/2006/relationships" type="roundRect" r:blip="">
+                              <dgm:adjLst>
+                                <dgm:adj idx="1" val="0.1"/>
+                              </dgm:adjLst>
+                            </dgm:shape>
+                            <dgm:presOf axis="self"/>
+                            <dgm:constrLst>
+                              <dgm:constr type="userH"/>
+                              <dgm:constr type="h" refType="userH"/>
+                              <dgm:constr type="tMarg" refType="primFontSz" fact="0.3"/>
+                              <dgm:constr type="bMarg" refType="primFontSz" fact="0.3"/>
+                              <dgm:constr type="lMarg" refType="primFontSz" fact="0.3"/>
+                              <dgm:constr type="rMarg" refType="primFontSz" fact="0.3"/>
+                            </dgm:constrLst>
+                            <dgm:ruleLst>
+                              <dgm:rule type="primFontSz" val="5" fact="NaN" max="NaN"/>
+                            </dgm:ruleLst>
+                          </dgm:layoutNode>
+                          <dgm:choose name="Name25">
+                            <dgm:if name="Name26" axis="des" ptType="node" func="cnt" op="gt" val="0">
+                              <dgm:layoutNode name="parTransFour">
+                                <dgm:alg type="sp"/>
+                                <dgm:shape xmlns:r="http://schemas.openxmlformats.org/officeDocument/2006/relationships" r:blip="">
+                                  <dgm:adjLst/>
+                                </dgm:shape>
+                                <dgm:presOf/>
+                                <dgm:constrLst/>
+                                <dgm:ruleLst/>
+                              </dgm:layoutNode>
+                            </dgm:if>
+                            <dgm:else name="Name27"/>
+                          </dgm:choose>
+                          <dgm:layoutNode name="horzFour">
+                            <dgm:choose name="Name28">
+                              <dgm:if name="Name29" func="var" arg="dir" op="equ" val="norm">
+                                <dgm:alg type="lin">
+                                  <dgm:param type="linDir" val="fromL"/>
+                                  <dgm:param type="nodeVertAlign" val="t"/>
+                                </dgm:alg>
+                              </dgm:if>
+                              <dgm:else name="Name30">
+                                <dgm:alg type="lin">
+                                  <dgm:param type="linDir" val="fromR"/>
+                                  <dgm:param type="nodeVertAlign" val="t"/>
+                                </dgm:alg>
+                              </dgm:else>
+                            </dgm:choose>
+                            <dgm:shape xmlns:r="http://schemas.openxmlformats.org/officeDocument/2006/relationships" r:blip="">
+                              <dgm:adjLst/>
+                            </dgm:shape>
+                            <dgm:presOf/>
+                            <dgm:constrLst/>
+                            <dgm:ruleLst>
+                              <dgm:rule type="w" val="INF" fact="NaN" max="NaN"/>
+                            </dgm:ruleLst>
+                            <dgm:forEach name="Name31" ref="repeat"/>
+                          </dgm:layoutNode>
+                        </dgm:layoutNode>
+                        <dgm:choose name="Name32">
+                          <dgm:if name="Name33" axis="self" ptType="node" func="revPos" op="gte" val="2">
+                            <dgm:forEach name="Name34" axis="followSib" ptType="sibTrans" cnt="1">
+                              <dgm:layoutNode name="sibSpaceFour">
+                                <dgm:alg type="sp"/>
+                                <dgm:shape xmlns:r="http://schemas.openxmlformats.org/officeDocument/2006/relationships" r:blip="">
+                                  <dgm:adjLst/>
+                                </dgm:shape>
+                                <dgm:presOf/>
+                                <dgm:constrLst/>
+                                <dgm:ruleLst/>
+                              </dgm:layoutNode>
+                            </dgm:forEach>
+                          </dgm:if>
+                          <dgm:else name="Name35"/>
+                        </dgm:choose>
+                      </dgm:forEach>
+                    </dgm:layoutNode>
+                  </dgm:layoutNode>
+                  <dgm:choose name="Name36">
+                    <dgm:if name="Name37" axis="self" ptType="node" func="revPos" op="gte" val="2">
+                      <dgm:forEach name="Name38" axis="followSib" ptType="sibTrans" cnt="1">
+                        <dgm:layoutNode name="sibSpaceThree">
+                          <dgm:alg type="sp"/>
+                          <dgm:shape xmlns:r="http://schemas.openxmlformats.org/officeDocument/2006/relationships" r:blip="">
+                            <dgm:adjLst/>
+                          </dgm:shape>
+                          <dgm:presOf/>
+                          <dgm:constrLst/>
+                          <dgm:ruleLst/>
+                        </dgm:layoutNode>
+                      </dgm:forEach>
+                    </dgm:if>
+                    <dgm:else name="Name39"/>
+                  </dgm:choose>
+                </dgm:forEach>
+              </dgm:layoutNode>
+            </dgm:layoutNode>
+            <dgm:choose name="Name40">
+              <dgm:if name="Name41" axis="self" ptType="node" func="revPos" op="gte" val="2">
+                <dgm:forEach name="Name42" axis="followSib" ptType="sibTrans" cnt="1">
+                  <dgm:layoutNode name="sibSpaceTwo">
+                    <dgm:alg type="sp"/>
+                    <dgm:shape xmlns:r="http://schemas.openxmlformats.org/officeDocument/2006/relationships" r:blip="">
+                      <dgm:adjLst/>
+                    </dgm:shape>
+                    <dgm:presOf/>
+                    <dgm:constrLst/>
+                    <dgm:ruleLst/>
+                  </dgm:layoutNode>
+                </dgm:forEach>
+              </dgm:if>
+              <dgm:else name="Name43"/>
+            </dgm:choose>
+          </dgm:forEach>
+        </dgm:layoutNode>
+      </dgm:layoutNode>
+      <dgm:choose name="Name44">
+        <dgm:if name="Name45" axis="self" ptType="node" func="revPos" op="gte" val="2">
+          <dgm:forEach name="Name46" axis="followSib" ptType="sibTrans" cnt="1">
+            <dgm:layoutNode name="sibSpaceOne">
+              <dgm:alg type="sp"/>
+              <dgm:shape xmlns:r="http://schemas.openxmlformats.org/officeDocument/2006/relationships" r:blip="">
+                <dgm:adjLst/>
+              </dgm:shape>
+              <dgm:presOf/>
+              <dgm:constrLst/>
+              <dgm:ruleLst/>
+            </dgm:layoutNode>
+          </dgm:forEach>
+        </dgm:if>
+        <dgm:else name="Name47"/>
+      </dgm:choose>
+    </dgm:forEach>
+  </dgm:layoutNode>
+</dgm:layoutDef>
+</file>
+
+<file path=ppt/diagrams/quickStyle1.xml><?xml version="1.0" encoding="utf-8"?>
+<dgm:styleDef xmlns:dgm="http://schemas.openxmlformats.org/drawingml/2006/diagram" xmlns:a="http://schemas.openxmlformats.org/drawingml/2006/main" uniqueId="urn:microsoft.com/office/officeart/2005/8/quickstyle/simple1">
+  <dgm:title val=""/>
+  <dgm:desc val=""/>
+  <dgm:catLst>
+    <dgm:cat type="simple" pri="10100"/>
+  </dgm:catLst>
+  <dgm:scene3d>
+    <a:camera prst="orthographicFront"/>
+    <a:lightRig rig="threePt" dir="t"/>
+  </dgm:scene3d>
+  <dgm:styleLbl name="node0">
+    <dgm:scene3d>
+      <a:camera prst="orthographicFront"/>
+      <a:lightRig rig="threePt" dir="t"/>
+    </dgm:scene3d>
+    <dgm:sp3d/>
+    <dgm:txPr/>
+    <dgm:style>
+      <a:lnRef idx="2">
+        <a:scrgbClr r="0" g="0" b="0"/>
+      </a:lnRef>
+      <a:fillRef idx="1">
+        <a:scrgbClr r="0" g="0" b="0"/>
+      </a:fillRef>
+      <a:effectRef idx="0">
+        <a:scrgbClr r="0" g="0" b="0"/>
+      </a:effectRef>
+      <a:fontRef idx="minor">
+        <a:schemeClr val="lt1"/>
+      </a:fontRef>
+    </dgm:style>
+  </dgm:styleLbl>
+  <dgm:styleLbl name="lnNode1">
+    <dgm:scene3d>
+      <a:camera prst="orthographicFront"/>
+      <a:lightRig rig="threePt" dir="t"/>
+    </dgm:scene3d>
+    <dgm:sp3d/>
+    <dgm:txPr/>
+    <dgm:style>
+      <a:lnRef idx="2">
+        <a:scrgbClr r="0" g="0" b="0"/>
+      </a:lnRef>
+      <a:fillRef idx="1">
+        <a:scrgbClr r="0" g="0" b="0"/>
+      </a:fillRef>
+      <a:effectRef idx="0">
+        <a:scrgbClr r="0" g="0" b="0"/>
+      </a:effectRef>
+      <a:fontRef idx="minor">
+        <a:schemeClr val="lt1"/>
+      </a:fontRef>
+    </dgm:style>
+  </dgm:styleLbl>
+  <dgm:styleLbl name="vennNode1">
+    <dgm:scene3d>
+      <a:camera prst="orthographicFront"/>
+      <a:lightRig rig="threePt" dir="t"/>
+    </dgm:scene3d>
+    <dgm:sp3d/>
+    <dgm:txPr/>
+    <dgm:style>
+      <a:lnRef idx="2">
+        <a:scrgbClr r="0" g="0" b="0"/>
+      </a:lnRef>
+      <a:fillRef idx="1">
+        <a:scrgbClr r="0" g="0" b="0"/>
+      </a:fillRef>
+      <a:effectRef idx="0">
+        <a:scrgbClr r="0" g="0" b="0"/>
+      </a:effectRef>
+      <a:fontRef idx="minor">
+        <a:schemeClr val="tx1"/>
+      </a:fontRef>
+    </dgm:style>
+  </dgm:styleLbl>
+  <dgm:styleLbl name="alignNode1">
+    <dgm:scene3d>
+      <a:camera prst="orthographicFront"/>
+      <a:lightRig rig="threePt" dir="t"/>
+    </dgm:scene3d>
+    <dgm:sp3d/>
+    <dgm:txPr/>
+    <dgm:style>
+      <a:lnRef idx="2">
+        <a:scrgbClr r="0" g="0" b="0"/>
+      </a:lnRef>
+      <a:fillRef idx="1">
+        <a:scrgbClr r="0" g="0" b="0"/>
+      </a:fillRef>
+      <a:effectRef idx="0">
+        <a:scrgbClr r="0" g="0" b="0"/>
+      </a:effectRef>
+      <a:fontRef idx="minor">
+        <a:schemeClr val="lt1"/>
+      </a:fontRef>
+    </dgm:style>
+  </dgm:styleLbl>
+  <dgm:styleLbl name="node1">
+    <dgm:scene3d>
+      <a:camera prst="orthographicFront"/>
+      <a:lightRig rig="threePt" dir="t"/>
+    </dgm:scene3d>
+    <dgm:sp3d/>
+    <dgm:txPr/>
+    <dgm:style>
+      <a:lnRef idx="2">
+        <a:scrgbClr r="0" g="0" b="0"/>
+      </a:lnRef>
+      <a:fillRef idx="1">
+        <a:scrgbClr r="0" g="0" b="0"/>
+      </a:fillRef>
+      <a:effectRef idx="0">
+        <a:scrgbClr r="0" g="0" b="0"/>
+      </a:effectRef>
+      <a:fontRef idx="minor">
+        <a:schemeClr val="lt1"/>
+      </a:fontRef>
+    </dgm:style>
+  </dgm:styleLbl>
+  <dgm:styleLbl name="node2">
+    <dgm:scene3d>
+      <a:camera prst="orthographicFront"/>
+      <a:lightRig rig="threePt" dir="t"/>
+    </dgm:scene3d>
+    <dgm:sp3d/>
+    <dgm:txPr/>
+    <dgm:style>
+      <a:lnRef idx="2">
+        <a:scrgbClr r="0" g="0" b="0"/>
+      </a:lnRef>
+      <a:fillRef idx="1">
+        <a:scrgbClr r="0" g="0" b="0"/>
+      </a:fillRef>
+      <a:effectRef idx="0">
+        <a:scrgbClr r="0" g="0" b="0"/>
+      </a:effectRef>
+      <a:fontRef idx="minor">
+        <a:schemeClr val="lt1"/>
+      </a:fontRef>
+    </dgm:style>
+  </dgm:styleLbl>
+  <dgm:styleLbl name="node3">
+    <dgm:scene3d>
+      <a:camera prst="orthographicFront"/>
+      <a:lightRig rig="threePt" dir="t"/>
+    </dgm:scene3d>
+    <dgm:sp3d/>
+    <dgm:txPr/>
+    <dgm:style>
+      <a:lnRef idx="2">
+        <a:scrgbClr r="0" g="0" b="0"/>
+      </a:lnRef>
+      <a:fillRef idx="1">
+        <a:scrgbClr r="0" g="0" b="0"/>
+      </a:fillRef>
+      <a:effectRef idx="0">
+        <a:scrgbClr r="0" g="0" b="0"/>
+      </a:effectRef>
+      <a:fontRef idx="minor">
+        <a:schemeClr val="lt1"/>
+      </a:fontRef>
+    </dgm:style>
+  </dgm:styleLbl>
+  <dgm:styleLbl name="node4">
+    <dgm:scene3d>
+      <a:camera prst="orthographicFront"/>
+      <a:lightRig rig="threePt" dir="t"/>
+    </dgm:scene3d>
+    <dgm:sp3d/>
+    <dgm:txPr/>
+    <dgm:style>
+      <a:lnRef idx="2">
+        <a:scrgbClr r="0" g="0" b="0"/>
+      </a:lnRef>
+      <a:fillRef idx="1">
+        <a:scrgbClr r="0" g="0" b="0"/>
+      </a:fillRef>
+      <a:effectRef idx="0">
+        <a:scrgbClr r="0" g="0" b="0"/>
+      </a:effectRef>
+      <a:fontRef idx="minor">
+        <a:schemeClr val="lt1"/>
+      </a:fontRef>
+    </dgm:style>
+  </dgm:styleLbl>
+  <dgm:styleLbl name="fgImgPlace1">
+    <dgm:scene3d>
+      <a:camera prst="orthographicFront"/>
+      <a:lightRig rig="threePt" dir="t"/>
+    </dgm:scene3d>
+    <dgm:sp3d/>
+    <dgm:txPr/>
+    <dgm:style>
+      <a:lnRef idx="2">
+        <a:scrgbClr r="0" g="0" b="0"/>
+      </a:lnRef>
+      <a:fillRef idx="1">
+        <a:scrgbClr r="0" g="0" b="0"/>
+      </a:fillRef>
+      <a:effectRef idx="0">
+        <a:scrgbClr r="0" g="0" b="0"/>
+      </a:effectRef>
+      <a:fontRef idx="minor"/>
+    </dgm:style>
+  </dgm:styleLbl>
+  <dgm:styleLbl name="alignImgPlace1">
+    <dgm:scene3d>
+      <a:camera prst="orthographicFront"/>
+      <a:lightRig rig="threePt" dir="t"/>
+    </dgm:scene3d>
+    <dgm:sp3d/>
+    <dgm:txPr/>
+    <dgm:style>
+      <a:lnRef idx="2">
+        <a:scrgbClr r="0" g="0" b="0"/>
+      </a:lnRef>
+      <a:fillRef idx="1">
+        <a:scrgbClr r="0" g="0" b="0"/>
+      </a:fillRef>
+      <a:effectRef idx="0">
+        <a:scrgbClr r="0" g="0" b="0"/>
+      </a:effectRef>
+      <a:fontRef idx="minor"/>
+    </dgm:style>
+  </dgm:styleLbl>
+  <dgm:styleLbl name="bgImgPlace1">
+    <dgm:scene3d>
+      <a:camera prst="orthographicFront"/>
+      <a:lightRig rig="threePt" dir="t"/>
+    </dgm:scene3d>
+    <dgm:sp3d/>
+    <dgm:txPr/>
+    <dgm:style>
+      <a:lnRef idx="2">
+        <a:scrgbClr r="0" g="0" b="0"/>
+      </a:lnRef>
+      <a:fillRef idx="1">
+        <a:scrgbClr r="0" g="0" b="0"/>
+      </a:fillRef>
+      <a:effectRef idx="0">
+        <a:scrgbClr r="0" g="0" b="0"/>
+      </a:effectRef>
+      <a:fontRef idx="minor"/>
+    </dgm:style>
+  </dgm:styleLbl>
+  <dgm:styleLbl name="sibTrans2D1">
+    <dgm:scene3d>
+      <a:camera prst="orthographicFront"/>
+      <a:lightRig rig="threePt" dir="t"/>
+    </dgm:scene3d>
+    <dgm:sp3d/>
+    <dgm:txPr/>
+    <dgm:style>
+      <a:lnRef idx="0">
+        <a:scrgbClr r="0" g="0" b="0"/>
+      </a:lnRef>
+      <a:fillRef idx="1">
+        <a:scrgbClr r="0" g="0" b="0"/>
+      </a:fillRef>
+      <a:effectRef idx="0">
+        <a:scrgbClr r="0" g="0" b="0"/>
+      </a:effectRef>
+      <a:fontRef idx="minor">
+        <a:schemeClr val="lt1"/>
+      </a:fontRef>
+    </dgm:style>
+  </dgm:styleLbl>
+  <dgm:styleLbl name="fgSibTrans2D1">
+    <dgm:scene3d>
+      <a:camera prst="orthographicFront"/>
+      <a:lightRig rig="threePt" dir="t"/>
+    </dgm:scene3d>
+    <dgm:sp3d/>
+    <dgm:txPr/>
+    <dgm:style>
+      <a:lnRef idx="0">
+        <a:scrgbClr r="0" g="0" b="0"/>
+      </a:lnRef>
+      <a:fillRef idx="1">
+        <a:scrgbClr r="0" g="0" b="0"/>
+      </a:fillRef>
+      <a:effectRef idx="0">
+        <a:scrgbClr r="0" g="0" b="0"/>
+      </a:effectRef>
+      <a:fontRef idx="minor">
+        <a:schemeClr val="lt1"/>
+      </a:fontRef>
+    </dgm:style>
+  </dgm:styleLbl>
+  <dgm:styleLbl name="bgSibTrans2D1">
+    <dgm:scene3d>
+      <a:camera prst="orthographicFront"/>
+      <a:lightRig rig="threePt" dir="t"/>
+    </dgm:scene3d>
+    <dgm:sp3d/>
+    <dgm:txPr/>
+    <dgm:style>
+      <a:lnRef idx="0">
+        <a:scrgbClr r="0" g="0" b="0"/>
+      </a:lnRef>
+      <a:fillRef idx="1">
+        <a:scrgbClr r="0" g="0" b="0"/>
+      </a:fillRef>
+      <a:effectRef idx="0">
+        <a:scrgbClr r="0" g="0" b="0"/>
+      </a:effectRef>
+      <a:fontRef idx="minor">
+        <a:schemeClr val="lt1"/>
+      </a:fontRef>
+    </dgm:style>
+  </dgm:styleLbl>
+  <dgm:styleLbl name="sibTrans1D1">
+    <dgm:scene3d>
+      <a:camera prst="orthographicFront"/>
+      <a:lightRig rig="threePt" dir="t"/>
+    </dgm:scene3d>
+    <dgm:sp3d/>
+    <dgm:txPr/>
+    <dgm:style>
+      <a:lnRef idx="1">
+        <a:scrgbClr r="0" g="0" b="0"/>
+      </a:lnRef>
+      <a:fillRef idx="0">
+        <a:scrgbClr r="0" g="0" b="0"/>
+      </a:fillRef>
+      <a:effectRef idx="0">
+        <a:scrgbClr r="0" g="0" b="0"/>
+      </a:effectRef>
+      <a:fontRef idx="minor"/>
+    </dgm:style>
+  </dgm:styleLbl>
+  <dgm:styleLbl name="callout">
+    <dgm:scene3d>
+      <a:camera prst="orthographicFront"/>
+      <a:lightRig rig="threePt" dir="t"/>
+    </dgm:scene3d>
+    <dgm:sp3d/>
+    <dgm:txPr/>
+    <dgm:style>
+      <a:lnRef idx="2">
+        <a:scrgbClr r="0" g="0" b="0"/>
+      </a:lnRef>
+      <a:fillRef idx="1">
+        <a:scrgbClr r="0" g="0" b="0"/>
+      </a:fillRef>
+      <a:effectRef idx="0">
+        <a:scrgbClr r="0" g="0" b="0"/>
+      </a:effectRef>
+      <a:fontRef idx="minor"/>
+    </dgm:style>
+  </dgm:styleLbl>
+  <dgm:styleLbl name="asst0">
+    <dgm:scene3d>
+      <a:camera prst="orthographicFront"/>
+      <a:lightRig rig="threePt" dir="t"/>
+    </dgm:scene3d>
+    <dgm:sp3d/>
+    <dgm:txPr/>
+    <dgm:style>
+      <a:lnRef idx="2">
+        <a:scrgbClr r="0" g="0" b="0"/>
+      </a:lnRef>
+      <a:fillRef idx="1">
+        <a:scrgbClr r="0" g="0" b="0"/>
+      </a:fillRef>
+      <a:effectRef idx="0">
+        <a:scrgbClr r="0" g="0" b="0"/>
+      </a:effectRef>
+      <a:fontRef idx="minor">
+        <a:schemeClr val="lt1"/>
+      </a:fontRef>
+    </dgm:style>
+  </dgm:styleLbl>
+  <dgm:styleLbl name="asst1">
+    <dgm:scene3d>
+      <a:camera prst="orthographicFront"/>
+      <a:lightRig rig="threePt" dir="t"/>
+    </dgm:scene3d>
+    <dgm:sp3d/>
+    <dgm:txPr/>
+    <dgm:style>
+      <a:lnRef idx="2">
+        <a:scrgbClr r="0" g="0" b="0"/>
+      </a:lnRef>
+      <a:fillRef idx="1">
+        <a:scrgbClr r="0" g="0" b="0"/>
+      </a:fillRef>
+      <a:effectRef idx="0">
+        <a:scrgbClr r="0" g="0" b="0"/>
+      </a:effectRef>
+      <a:fontRef idx="minor">
+        <a:schemeClr val="lt1"/>
+      </a:fontRef>
+    </dgm:style>
+  </dgm:styleLbl>
+  <dgm:styleLbl name="asst2">
+    <dgm:scene3d>
+      <a:camera prst="orthographicFront"/>
+      <a:lightRig rig="threePt" dir="t"/>
+    </dgm:scene3d>
+    <dgm:sp3d/>
+    <dgm:txPr/>
+    <dgm:style>
+      <a:lnRef idx="2">
+        <a:scrgbClr r="0" g="0" b="0"/>
+      </a:lnRef>
+      <a:fillRef idx="1">
+        <a:scrgbClr r="0" g="0" b="0"/>
+      </a:fillRef>
+      <a:effectRef idx="0">
+        <a:scrgbClr r="0" g="0" b="0"/>
+      </a:effectRef>
+      <a:fontRef idx="minor">
+        <a:schemeClr val="lt1"/>
+      </a:fontRef>
+    </dgm:style>
+  </dgm:styleLbl>
+  <dgm:styleLbl name="asst3">
+    <dgm:scene3d>
+      <a:camera prst="orthographicFront"/>
+      <a:lightRig rig="threePt" dir="t"/>
+    </dgm:scene3d>
+    <dgm:sp3d/>
+    <dgm:txPr/>
+    <dgm:style>
+      <a:lnRef idx="2">
+        <a:scrgbClr r="0" g="0" b="0"/>
+      </a:lnRef>
+      <a:fillRef idx="1">
+        <a:scrgbClr r="0" g="0" b="0"/>
+      </a:fillRef>
+      <a:effectRef idx="0">
+        <a:scrgbClr r="0" g="0" b="0"/>
+      </a:effectRef>
+      <a:fontRef idx="minor">
+        <a:schemeClr val="lt1"/>
+      </a:fontRef>
+    </dgm:style>
+  </dgm:styleLbl>
+  <dgm:styleLbl name="asst4">
+    <dgm:scene3d>
+      <a:camera prst="orthographicFront"/>
+      <a:lightRig rig="threePt" dir="t"/>
+    </dgm:scene3d>
+    <dgm:sp3d/>
+    <dgm:txPr/>
+    <dgm:style>
+      <a:lnRef idx="2">
+        <a:scrgbClr r="0" g="0" b="0"/>
+      </a:lnRef>
+      <a:fillRef idx="1">
+        <a:scrgbClr r="0" g="0" b="0"/>
+      </a:fillRef>
+      <a:effectRef idx="0">
+        <a:scrgbClr r="0" g="0" b="0"/>
+      </a:effectRef>
+      <a:fontRef idx="minor">
+        <a:schemeClr val="lt1"/>
+      </a:fontRef>
+    </dgm:style>
+  </dgm:styleLbl>
+  <dgm:styleLbl name="parChTrans2D1">
+    <dgm:scene3d>
+      <a:camera prst="orthographicFront"/>
+      <a:lightRig rig="threePt" dir="t"/>
+    </dgm:scene3d>
+    <dgm:sp3d/>
+    <dgm:txPr/>
+    <dgm:style>
+      <a:lnRef idx="2">
+        <a:scrgbClr r="0" g="0" b="0"/>
+      </a:lnRef>
+      <a:fillRef idx="1">
+        <a:scrgbClr r="0" g="0" b="0"/>
+      </a:fillRef>
+      <a:effectRef idx="0">
+        <a:scrgbClr r="0" g="0" b="0"/>
+      </a:effectRef>
+      <a:fontRef idx="minor">
+        <a:schemeClr val="lt1"/>
+      </a:fontRef>
+    </dgm:style>
+  </dgm:styleLbl>
+  <dgm:styleLbl name="parChTrans2D2">
+    <dgm:scene3d>
+      <a:camera prst="orthographicFront"/>
+      <a:lightRig rig="threePt" dir="t"/>
+    </dgm:scene3d>
+    <dgm:sp3d/>
+    <dgm:txPr/>
+    <dgm:style>
+      <a:lnRef idx="2">
+        <a:scrgbClr r="0" g="0" b="0"/>
+      </a:lnRef>
+      <a:fillRef idx="1">
+        <a:scrgbClr r="0" g="0" b="0"/>
+      </a:fillRef>
+      <a:effectRef idx="0">
+        <a:scrgbClr r="0" g="0" b="0"/>
+      </a:effectRef>
+      <a:fontRef idx="minor">
+        <a:schemeClr val="lt1"/>
+      </a:fontRef>
+    </dgm:style>
+  </dgm:styleLbl>
+  <dgm:styleLbl name="parChTrans2D3">
+    <dgm:scene3d>
+      <a:camera prst="orthographicFront"/>
+      <a:lightRig rig="threePt" dir="t"/>
+    </dgm:scene3d>
+    <dgm:sp3d/>
+    <dgm:txPr/>
+    <dgm:style>
+      <a:lnRef idx="2">
+        <a:scrgbClr r="0" g="0" b="0"/>
+      </a:lnRef>
+      <a:fillRef idx="1">
+        <a:scrgbClr r="0" g="0" b="0"/>
+      </a:fillRef>
+      <a:effectRef idx="0">
+        <a:scrgbClr r="0" g="0" b="0"/>
+      </a:effectRef>
+      <a:fontRef idx="minor">
+        <a:schemeClr val="lt1"/>
+      </a:fontRef>
+    </dgm:style>
+  </dgm:styleLbl>
+  <dgm:styleLbl name="parChTrans2D4">
+    <dgm:scene3d>
+      <a:camera prst="orthographicFront"/>
+      <a:lightRig rig="threePt" dir="t"/>
+    </dgm:scene3d>
+    <dgm:sp3d/>
+    <dgm:txPr/>
+    <dgm:style>
+      <a:lnRef idx="2">
+        <a:scrgbClr r="0" g="0" b="0"/>
+      </a:lnRef>
+      <a:fillRef idx="1">
+        <a:scrgbClr r="0" g="0" b="0"/>
+      </a:fillRef>
+      <a:effectRef idx="0">
+        <a:scrgbClr r="0" g="0" b="0"/>
+      </a:effectRef>
+      <a:fontRef idx="minor">
+        <a:schemeClr val="lt1"/>
+      </a:fontRef>
+    </dgm:style>
+  </dgm:styleLbl>
+  <dgm:styleLbl name="parChTrans1D1">
+    <dgm:scene3d>
+      <a:camera prst="orthographicFront"/>
+      <a:lightRig rig="threePt" dir="t"/>
+    </dgm:scene3d>
+    <dgm:sp3d/>
+    <dgm:txPr/>
+    <dgm:style>
+      <a:lnRef idx="2">
+        <a:scrgbClr r="0" g="0" b="0"/>
+      </a:lnRef>
+      <a:fillRef idx="0">
+        <a:scrgbClr r="0" g="0" b="0"/>
+      </a:fillRef>
+      <a:effectRef idx="0">
+        <a:scrgbClr r="0" g="0" b="0"/>
+      </a:effectRef>
+      <a:fontRef idx="minor"/>
+    </dgm:style>
+  </dgm:styleLbl>
+  <dgm:styleLbl name="parChTrans1D2">
+    <dgm:scene3d>
+      <a:camera prst="orthographicFront"/>
+      <a:lightRig rig="threePt" dir="t"/>
+    </dgm:scene3d>
+    <dgm:sp3d/>
+    <dgm:txPr/>
+    <dgm:style>
+      <a:lnRef idx="2">
+        <a:scrgbClr r="0" g="0" b="0"/>
+      </a:lnRef>
+      <a:fillRef idx="0">
+        <a:scrgbClr r="0" g="0" b="0"/>
+      </a:fillRef>
+      <a:effectRef idx="0">
+        <a:scrgbClr r="0" g="0" b="0"/>
+      </a:effectRef>
+      <a:fontRef idx="minor"/>
+    </dgm:style>
+  </dgm:styleLbl>
+  <dgm:styleLbl name="parChTrans1D3">
+    <dgm:scene3d>
+      <a:camera prst="orthographicFront"/>
+      <a:lightRig rig="threePt" dir="t"/>
+    </dgm:scene3d>
+    <dgm:sp3d/>
+    <dgm:txPr/>
+    <dgm:style>
+      <a:lnRef idx="2">
+        <a:scrgbClr r="0" g="0" b="0"/>
+      </a:lnRef>
+      <a:fillRef idx="0">
+        <a:scrgbClr r="0" g="0" b="0"/>
+      </a:fillRef>
+      <a:effectRef idx="0">
+        <a:scrgbClr r="0" g="0" b="0"/>
+      </a:effectRef>
+      <a:fontRef idx="minor"/>
+    </dgm:style>
+  </dgm:styleLbl>
+  <dgm:styleLbl name="parChTrans1D4">
+    <dgm:scene3d>
+      <a:camera prst="orthographicFront"/>
+      <a:lightRig rig="threePt" dir="t"/>
+    </dgm:scene3d>
+    <dgm:sp3d/>
+    <dgm:txPr/>
+    <dgm:style>
+      <a:lnRef idx="2">
+        <a:scrgbClr r="0" g="0" b="0"/>
+      </a:lnRef>
+      <a:fillRef idx="0">
+        <a:scrgbClr r="0" g="0" b="0"/>
+      </a:fillRef>
+      <a:effectRef idx="0">
+        <a:scrgbClr r="0" g="0" b="0"/>
+      </a:effectRef>
+      <a:fontRef idx="minor"/>
+    </dgm:style>
+  </dgm:styleLbl>
+  <dgm:styleLbl name="fgAcc1">
+    <dgm:scene3d>
+      <a:camera prst="orthographicFront"/>
+      <a:lightRig rig="threePt" dir="t"/>
+    </dgm:scene3d>
+    <dgm:sp3d/>
+    <dgm:txPr/>
+    <dgm:style>
+      <a:lnRef idx="2">
+        <a:scrgbClr r="0" g="0" b="0"/>
+      </a:lnRef>
+      <a:fillRef idx="1">
+        <a:scrgbClr r="0" g="0" b="0"/>
+      </a:fillRef>
+      <a:effectRef idx="0">
+        <a:scrgbClr r="0" g="0" b="0"/>
+      </a:effectRef>
+      <a:fontRef idx="minor"/>
+    </dgm:style>
+  </dgm:styleLbl>
+  <dgm:styleLbl name="conFgAcc1">
+    <dgm:scene3d>
+      <a:camera prst="orthographicFront"/>
+      <a:lightRig rig="threePt" dir="t"/>
+    </dgm:scene3d>
+    <dgm:sp3d/>
+    <dgm:txPr/>
+    <dgm:style>
+      <a:lnRef idx="2">
+        <a:scrgbClr r="0" g="0" b="0"/>
+      </a:lnRef>
+      <a:fillRef idx="1">
+        <a:scrgbClr r="0" g="0" b="0"/>
+      </a:fillRef>
+      <a:effectRef idx="0">
+        <a:scrgbClr r="0" g="0" b="0"/>
+      </a:effectRef>
+      <a:fontRef idx="minor"/>
+    </dgm:style>
+  </dgm:styleLbl>
+  <dgm:styleLbl name="alignAcc1">
+    <dgm:scene3d>
+      <a:camera prst="orthographicFront"/>
+      <a:lightRig rig="threePt" dir="t"/>
+    </dgm:scene3d>
+    <dgm:sp3d/>
+    <dgm:txPr/>
+    <dgm:style>
+      <a:lnRef idx="2">
+        <a:scrgbClr r="0" g="0" b="0"/>
+      </a:lnRef>
+      <a:fillRef idx="1">
+        <a:scrgbClr r="0" g="0" b="0"/>
+      </a:fillRef>
+      <a:effectRef idx="0">
+        <a:scrgbClr r="0" g="0" b="0"/>
+      </a:effectRef>
+      <a:fontRef idx="minor"/>
+    </dgm:style>
+  </dgm:styleLbl>
+  <dgm:styleLbl name="trAlignAcc1">
+    <dgm:scene3d>
+      <a:camera prst="orthographicFront"/>
+      <a:lightRig rig="threePt" dir="t"/>
+    </dgm:scene3d>
+    <dgm:sp3d/>
+    <dgm:txPr/>
+    <dgm:style>
+      <a:lnRef idx="1">
+        <a:scrgbClr r="0" g="0" b="0"/>
+      </a:lnRef>
+      <a:fillRef idx="1">
+        <a:scrgbClr r="0" g="0" b="0"/>
+      </a:fillRef>
+      <a:effectRef idx="0">
+        <a:scrgbClr r="0" g="0" b="0"/>
+      </a:effectRef>
+      <a:fontRef idx="minor"/>
+    </dgm:style>
+  </dgm:styleLbl>
+  <dgm:styleLbl name="bgAcc1">
+    <dgm:scene3d>
+      <a:camera prst="orthographicFront"/>
+      <a:lightRig rig="threePt" dir="t"/>
+    </dgm:scene3d>
+    <dgm:sp3d/>
+    <dgm:txPr/>
+    <dgm:style>
+      <a:lnRef idx="2">
+        <a:scrgbClr r="0" g="0" b="0"/>
+      </a:lnRef>
+      <a:fillRef idx="1">
+        <a:scrgbClr r="0" g="0" b="0"/>
+      </a:fillRef>
+      <a:effectRef idx="0">
+        <a:scrgbClr r="0" g="0" b="0"/>
+      </a:effectRef>
+      <a:fontRef idx="minor"/>
+    </dgm:style>
+  </dgm:styleLbl>
+  <dgm:styleLbl name="solidFgAcc1">
+    <dgm:scene3d>
+      <a:camera prst="orthographicFront"/>
+      <a:lightRig rig="threePt" dir="t"/>
+    </dgm:scene3d>
+    <dgm:sp3d/>
+    <dgm:txPr/>
+    <dgm:style>
+      <a:lnRef idx="2">
+        <a:scrgbClr r="0" g="0" b="0"/>
+      </a:lnRef>
+      <a:fillRef idx="1">
+        <a:scrgbClr r="0" g="0" b="0"/>
+      </a:fillRef>
+      <a:effectRef idx="0">
+        <a:scrgbClr r="0" g="0" b="0"/>
+      </a:effectRef>
+      <a:fontRef idx="minor"/>
+    </dgm:style>
+  </dgm:styleLbl>
+  <dgm:styleLbl name="solidAlignAcc1">
+    <dgm:scene3d>
+      <a:camera prst="orthographicFront"/>
+      <a:lightRig rig="threePt" dir="t"/>
+    </dgm:scene3d>
+    <dgm:sp3d/>
+    <dgm:txPr/>
+    <dgm:style>
+      <a:lnRef idx="2">
+        <a:scrgbClr r="0" g="0" b="0"/>
+      </a:lnRef>
+      <a:fillRef idx="1">
+        <a:scrgbClr r="0" g="0" b="0"/>
+      </a:fillRef>
+      <a:effectRef idx="0">
+        <a:scrgbClr r="0" g="0" b="0"/>
+      </a:effectRef>
+      <a:fontRef idx="minor"/>
+    </dgm:style>
+  </dgm:styleLbl>
+  <dgm:styleLbl name="solidBgAcc1">
+    <dgm:scene3d>
+      <a:camera prst="orthographicFront"/>
+      <a:lightRig rig="threePt" dir="t"/>
+    </dgm:scene3d>
+    <dgm:sp3d/>
+    <dgm:txPr/>
+    <dgm:style>
+      <a:lnRef idx="2">
+        <a:scrgbClr r="0" g="0" b="0"/>
+      </a:lnRef>
+      <a:fillRef idx="1">
+        <a:scrgbClr r="0" g="0" b="0"/>
+      </a:fillRef>
+      <a:effectRef idx="0">
+        <a:scrgbClr r="0" g="0" b="0"/>
+      </a:effectRef>
+      <a:fontRef idx="minor"/>
+    </dgm:style>
+  </dgm:styleLbl>
+  <dgm:styleLbl name="fgAccFollowNode1">
+    <dgm:scene3d>
+      <a:camera prst="orthographicFront"/>
+      <a:lightRig rig="threePt" dir="t"/>
+    </dgm:scene3d>
+    <dgm:sp3d/>
+    <dgm:txPr/>
+    <dgm:style>
+      <a:lnRef idx="2">
+        <a:scrgbClr r="0" g="0" b="0"/>
+      </a:lnRef>
+      <a:fillRef idx="1">
+        <a:scrgbClr r="0" g="0" b="0"/>
+      </a:fillRef>
+      <a:effectRef idx="0">
+        <a:scrgbClr r="0" g="0" b="0"/>
+      </a:effectRef>
+      <a:fontRef idx="minor"/>
+    </dgm:style>
+  </dgm:styleLbl>
+  <dgm:styleLbl name="alignAccFollowNode1">
+    <dgm:scene3d>
+      <a:camera prst="orthographicFront"/>
+      <a:lightRig rig="threePt" dir="t"/>
+    </dgm:scene3d>
+    <dgm:sp3d/>
+    <dgm:txPr/>
+    <dgm:style>
+      <a:lnRef idx="2">
+        <a:scrgbClr r="0" g="0" b="0"/>
+      </a:lnRef>
+      <a:fillRef idx="1">
+        <a:scrgbClr r="0" g="0" b="0"/>
+      </a:fillRef>
+      <a:effectRef idx="0">
+        <a:scrgbClr r="0" g="0" b="0"/>
+      </a:effectRef>
+      <a:fontRef idx="minor"/>
+    </dgm:style>
+  </dgm:styleLbl>
+  <dgm:styleLbl name="bgAccFollowNode1">
+    <dgm:scene3d>
+      <a:camera prst="orthographicFront"/>
+      <a:lightRig rig="threePt" dir="t"/>
+    </dgm:scene3d>
+    <dgm:sp3d/>
+    <dgm:txPr/>
+    <dgm:style>
+      <a:lnRef idx="2">
+        <a:scrgbClr r="0" g="0" b="0"/>
+      </a:lnRef>
+      <a:fillRef idx="1">
+        <a:scrgbClr r="0" g="0" b="0"/>
+      </a:fillRef>
+      <a:effectRef idx="0">
+        <a:scrgbClr r="0" g="0" b="0"/>
+      </a:effectRef>
+      <a:fontRef idx="minor"/>
+    </dgm:style>
+  </dgm:styleLbl>
+  <dgm:styleLbl name="fgAcc0">
+    <dgm:scene3d>
+      <a:camera prst="orthographicFront"/>
+      <a:lightRig rig="threePt" dir="t"/>
+    </dgm:scene3d>
+    <dgm:sp3d/>
+    <dgm:txPr/>
+    <dgm:style>
+      <a:lnRef idx="2">
+        <a:scrgbClr r="0" g="0" b="0"/>
+      </a:lnRef>
+      <a:fillRef idx="1">
+        <a:scrgbClr r="0" g="0" b="0"/>
+      </a:fillRef>
+      <a:effectRef idx="0">
+        <a:scrgbClr r="0" g="0" b="0"/>
+      </a:effectRef>
+      <a:fontRef idx="minor"/>
+    </dgm:style>
+  </dgm:styleLbl>
+  <dgm:styleLbl name="fgAcc2">
+    <dgm:scene3d>
+      <a:camera prst="orthographicFront"/>
+      <a:lightRig rig="threePt" dir="t"/>
+    </dgm:scene3d>
+    <dgm:sp3d/>
+    <dgm:txPr/>
+    <dgm:style>
+      <a:lnRef idx="2">
+        <a:scrgbClr r="0" g="0" b="0"/>
+      </a:lnRef>
+      <a:fillRef idx="1">
+        <a:scrgbClr r="0" g="0" b="0"/>
+      </a:fillRef>
+      <a:effectRef idx="0">
+        <a:scrgbClr r="0" g="0" b="0"/>
+      </a:effectRef>
+      <a:fontRef idx="minor"/>
+    </dgm:style>
+  </dgm:styleLbl>
+  <dgm:styleLbl name="fgAcc3">
+    <dgm:scene3d>
+      <a:camera prst="orthographicFront"/>
+      <a:lightRig rig="threePt" dir="t"/>
+    </dgm:scene3d>
+    <dgm:sp3d/>
+    <dgm:txPr/>
+    <dgm:style>
+      <a:lnRef idx="2">
+        <a:scrgbClr r="0" g="0" b="0"/>
+      </a:lnRef>
+      <a:fillRef idx="1">
+        <a:scrgbClr r="0" g="0" b="0"/>
+      </a:fillRef>
+      <a:effectRef idx="0">
+        <a:scrgbClr r="0" g="0" b="0"/>
+      </a:effectRef>
+      <a:fontRef idx="minor"/>
+    </dgm:style>
+  </dgm:styleLbl>
+  <dgm:styleLbl name="fgAcc4">
+    <dgm:scene3d>
+      <a:camera prst="orthographicFront"/>
+      <a:lightRig rig="threePt" dir="t"/>
+    </dgm:scene3d>
+    <dgm:sp3d/>
+    <dgm:txPr/>
+    <dgm:style>
+      <a:lnRef idx="2">
+        <a:scrgbClr r="0" g="0" b="0"/>
+      </a:lnRef>
+      <a:fillRef idx="1">
+        <a:scrgbClr r="0" g="0" b="0"/>
+      </a:fillRef>
+      <a:effectRef idx="0">
+        <a:scrgbClr r="0" g="0" b="0"/>
+      </a:effectRef>
+      <a:fontRef idx="minor"/>
+    </dgm:style>
+  </dgm:styleLbl>
+  <dgm:styleLbl name="bgShp">
+    <dgm:scene3d>
+      <a:camera prst="orthographicFront"/>
+      <a:lightRig rig="threePt" dir="t"/>
+    </dgm:scene3d>
+    <dgm:sp3d/>
+    <dgm:txPr/>
+    <dgm:style>
+      <a:lnRef idx="0">
+        <a:scrgbClr r="0" g="0" b="0"/>
+      </a:lnRef>
+      <a:fillRef idx="1">
+        <a:scrgbClr r="0" g="0" b="0"/>
+      </a:fillRef>
+      <a:effectRef idx="0">
+        <a:scrgbClr r="0" g="0" b="0"/>
+      </a:effectRef>
+      <a:fontRef idx="minor"/>
+    </dgm:style>
+  </dgm:styleLbl>
+  <dgm:styleLbl name="dkBgShp">
+    <dgm:scene3d>
+      <a:camera prst="orthographicFront"/>
+      <a:lightRig rig="threePt" dir="t"/>
+    </dgm:scene3d>
+    <dgm:sp3d/>
+    <dgm:txPr/>
+    <dgm:style>
+      <a:lnRef idx="0">
+        <a:scrgbClr r="0" g="0" b="0"/>
+      </a:lnRef>
+      <a:fillRef idx="1">
+        <a:scrgbClr r="0" g="0" b="0"/>
+      </a:fillRef>
+      <a:effectRef idx="0">
+        <a:scrgbClr r="0" g="0" b="0"/>
+      </a:effectRef>
+      <a:fontRef idx="minor"/>
+    </dgm:style>
+  </dgm:styleLbl>
+  <dgm:styleLbl name="trBgShp">
+    <dgm:scene3d>
+      <a:camera prst="orthographicFront"/>
+      <a:lightRig rig="threePt" dir="t"/>
+    </dgm:scene3d>
+    <dgm:sp3d/>
+    <dgm:txPr/>
+    <dgm:style>
+      <a:lnRef idx="0">
+        <a:scrgbClr r="0" g="0" b="0"/>
+      </a:lnRef>
+      <a:fillRef idx="1">
+        <a:scrgbClr r="0" g="0" b="0"/>
+      </a:fillRef>
+      <a:effectRef idx="0">
+        <a:scrgbClr r="0" g="0" b="0"/>
+      </a:effectRef>
+      <a:fontRef idx="minor"/>
+    </dgm:style>
+  </dgm:styleLbl>
+  <dgm:styleLbl name="fgShp">
+    <dgm:scene3d>
+      <a:camera prst="orthographicFront"/>
+      <a:lightRig rig="threePt" dir="t"/>
+    </dgm:scene3d>
+    <dgm:sp3d/>
+    <dgm:txPr/>
+    <dgm:style>
+      <a:lnRef idx="2">
+        <a:scrgbClr r="0" g="0" b="0"/>
+      </a:lnRef>
+      <a:fillRef idx="1">
+        <a:scrgbClr r="0" g="0" b="0"/>
+      </a:fillRef>
+      <a:effectRef idx="0">
+        <a:scrgbClr r="0" g="0" b="0"/>
+      </a:effectRef>
+      <a:fontRef idx="minor"/>
+    </dgm:style>
+  </dgm:styleLbl>
+  <dgm:styleLbl name="revTx">
+    <dgm:scene3d>
+      <a:camera prst="orthographicFront"/>
+      <a:lightRig rig="threePt" dir="t"/>
+    </dgm:scene3d>
+    <dgm:sp3d/>
+    <dgm:txPr/>
+    <dgm:style>
+      <a:lnRef idx="0">
+        <a:scrgbClr r="0" g="0" b="0"/>
+      </a:lnRef>
+      <a:fillRef idx="0">
+        <a:scrgbClr r="0" g="0" b="0"/>
+      </a:fillRef>
+      <a:effectRef idx="0">
+        <a:scrgbClr r="0" g="0" b="0"/>
+      </a:effectRef>
+      <a:fontRef idx="minor"/>
+    </dgm:style>
+  </dgm:styleLbl>
+</dgm:styleDef>
 </file>
 
 <file path=ppt/handoutMasters/handoutMaster1.xml><?xml version="1.0" encoding="utf-8"?>
@@ -254,7 +3475,7 @@
           <a:p>
             <a:fld id="{D0CC69C6-EE0B-4D8B-9C71-C36EFED094F2}" type="datetimeFigureOut">
               <a:rPr lang="en-US"/>
-              <a:t>9/7/2016</a:t>
+              <a:t>9/10/2016</a:t>
             </a:fld>
             <a:endParaRPr/>
           </a:p>
@@ -419,7 +3640,7 @@
           <a:p>
             <a:fld id="{3ABD2D7A-D230-4F91-BD59-0A39C2703BA8}" type="datetimeFigureOut">
               <a:rPr lang="en-US"/>
-              <a:t>9/7/2016</a:t>
+              <a:t>9/10/2016</a:t>
             </a:fld>
             <a:endParaRPr/>
           </a:p>
@@ -1103,7 +4324,7 @@
           <a:p>
             <a:fld id="{03F41C87-7AD9-4845-A077-840E4A0F3F06}" type="datetimeFigureOut">
               <a:rPr lang="en-US"/>
-              <a:t>9/7/2016</a:t>
+              <a:t>9/10/2016</a:t>
             </a:fld>
             <a:endParaRPr/>
           </a:p>
@@ -1302,7 +4523,7 @@
           <a:p>
             <a:fld id="{03F41C87-7AD9-4845-A077-840E4A0F3F06}" type="datetimeFigureOut">
               <a:rPr lang="en-US"/>
-              <a:t>9/7/2016</a:t>
+              <a:t>9/10/2016</a:t>
             </a:fld>
             <a:endParaRPr/>
           </a:p>
@@ -1498,7 +4719,7 @@
           <a:p>
             <a:fld id="{03F41C87-7AD9-4845-A077-840E4A0F3F06}" type="datetimeFigureOut">
               <a:rPr lang="en-US"/>
-              <a:t>9/7/2016</a:t>
+              <a:t>9/10/2016</a:t>
             </a:fld>
             <a:endParaRPr/>
           </a:p>
@@ -1790,7 +5011,7 @@
           <a:p>
             <a:fld id="{03F41C87-7AD9-4845-A077-840E4A0F3F06}" type="datetimeFigureOut">
               <a:rPr lang="en-US"/>
-              <a:t>9/7/2016</a:t>
+              <a:t>9/10/2016</a:t>
             </a:fld>
             <a:endParaRPr/>
           </a:p>
@@ -2101,7 +5322,7 @@
           <a:p>
             <a:fld id="{03F41C87-7AD9-4845-A077-840E4A0F3F06}" type="datetimeFigureOut">
               <a:rPr lang="en-US"/>
-              <a:t>9/7/2016</a:t>
+              <a:t>9/10/2016</a:t>
             </a:fld>
             <a:endParaRPr/>
           </a:p>
@@ -2564,7 +5785,7 @@
           <a:p>
             <a:fld id="{03F41C87-7AD9-4845-A077-840E4A0F3F06}" type="datetimeFigureOut">
               <a:rPr lang="en-US"/>
-              <a:t>9/7/2016</a:t>
+              <a:t>9/10/2016</a:t>
             </a:fld>
             <a:endParaRPr/>
           </a:p>
@@ -2701,7 +5922,7 @@
           <a:p>
             <a:fld id="{03F41C87-7AD9-4845-A077-840E4A0F3F06}" type="datetimeFigureOut">
               <a:rPr lang="en-US"/>
-              <a:t>9/7/2016</a:t>
+              <a:t>9/10/2016</a:t>
             </a:fld>
             <a:endParaRPr/>
           </a:p>
@@ -2845,7 +6066,7 @@
           <a:p>
             <a:fld id="{03F41C87-7AD9-4845-A077-840E4A0F3F06}" type="datetimeFigureOut">
               <a:rPr lang="en-US"/>
-              <a:t>9/7/2016</a:t>
+              <a:t>9/10/2016</a:t>
             </a:fld>
             <a:endParaRPr/>
           </a:p>
@@ -3160,7 +6381,7 @@
           <a:p>
             <a:fld id="{03F41C87-7AD9-4845-A077-840E4A0F3F06}" type="datetimeFigureOut">
               <a:rPr lang="en-US"/>
-              <a:t>9/7/2016</a:t>
+              <a:t>9/10/2016</a:t>
             </a:fld>
             <a:endParaRPr/>
           </a:p>
@@ -3507,7 +6728,7 @@
             <a:fld id="{03F41C87-7AD9-4845-A077-840E4A0F3F06}" type="datetimeFigureOut">
               <a:rPr lang="en-US"/>
               <a:pPr/>
-              <a:t>9/7/2016</a:t>
+              <a:t>9/10/2016</a:t>
             </a:fld>
             <a:endParaRPr/>
           </a:p>
@@ -3863,7 +7084,7 @@
             <a:fld id="{03F41C87-7AD9-4845-A077-840E4A0F3F06}" type="datetimeFigureOut">
               <a:rPr lang="en-US"/>
               <a:pPr/>
-              <a:t>9/7/2016</a:t>
+              <a:t>9/10/2016</a:t>
             </a:fld>
             <a:endParaRPr/>
           </a:p>
@@ -4354,7 +7575,6 @@
               <a:rPr lang="en-US" sz="4400" dirty="0"/>
               <a:t>Applications</a:t>
             </a:r>
-            <a:endParaRPr lang="en-US" sz="4400" dirty="0"/>
           </a:p>
         </p:txBody>
       </p:sp>
@@ -5312,6 +8532,255 @@
     <p:extLst>
       <p:ext uri="{BB962C8B-B14F-4D97-AF65-F5344CB8AC3E}">
         <p14:creationId xmlns:p14="http://schemas.microsoft.com/office/powerpoint/2010/main" val="2098267654"/>
+      </p:ext>
+    </p:extLst>
+  </p:cSld>
+  <p:clrMapOvr>
+    <a:masterClrMapping/>
+  </p:clrMapOvr>
+  <mc:AlternateContent xmlns:mc="http://schemas.openxmlformats.org/markup-compatibility/2006" xmlns:p14="http://schemas.microsoft.com/office/powerpoint/2010/main">
+    <mc:Choice Requires="p14">
+      <p:transition spd="med" p14:dur="700">
+        <p:fade/>
+      </p:transition>
+    </mc:Choice>
+    <mc:Fallback xmlns="">
+      <p:transition spd="med">
+        <p:fade/>
+      </p:transition>
+    </mc:Fallback>
+  </mc:AlternateContent>
+</p:sld>
+</file>
+
+<file path=ppt/slides/slide16.xml><?xml version="1.0" encoding="utf-8"?>
+<p:sld xmlns:a="http://schemas.openxmlformats.org/drawingml/2006/main" xmlns:r="http://schemas.openxmlformats.org/officeDocument/2006/relationships" xmlns:p="http://schemas.openxmlformats.org/presentationml/2006/main">
+  <p:cSld>
+    <p:spTree>
+      <p:nvGrpSpPr>
+        <p:cNvPr id="1" name=""/>
+        <p:cNvGrpSpPr/>
+        <p:nvPr/>
+      </p:nvGrpSpPr>
+      <p:grpSpPr>
+        <a:xfrm>
+          <a:off x="0" y="0"/>
+          <a:ext cx="0" cy="0"/>
+          <a:chOff x="0" y="0"/>
+          <a:chExt cx="0" cy="0"/>
+        </a:xfrm>
+      </p:grpSpPr>
+      <p:sp>
+        <p:nvSpPr>
+          <p:cNvPr id="5" name="Rounded Rectangle 4"/>
+          <p:cNvSpPr/>
+          <p:nvPr/>
+        </p:nvSpPr>
+        <p:spPr>
+          <a:xfrm>
+            <a:off x="1905000" y="1905000"/>
+            <a:ext cx="9448800" cy="4800600"/>
+          </a:xfrm>
+          <a:prstGeom prst="roundRect">
+            <a:avLst/>
+          </a:prstGeom>
+        </p:spPr>
+        <p:style>
+          <a:lnRef idx="1">
+            <a:schemeClr val="accent1"/>
+          </a:lnRef>
+          <a:fillRef idx="2">
+            <a:schemeClr val="accent1"/>
+          </a:fillRef>
+          <a:effectRef idx="1">
+            <a:schemeClr val="accent1"/>
+          </a:effectRef>
+          <a:fontRef idx="minor">
+            <a:schemeClr val="dk1"/>
+          </a:fontRef>
+        </p:style>
+        <p:txBody>
+          <a:bodyPr rtlCol="0" anchor="ctr"/>
+          <a:lstStyle/>
+          <a:p>
+            <a:pPr algn="ctr"/>
+            <a:endParaRPr lang="en-US"/>
+          </a:p>
+        </p:txBody>
+      </p:sp>
+      <p:sp>
+        <p:nvSpPr>
+          <p:cNvPr id="2" name="Title 1"/>
+          <p:cNvSpPr>
+            <a:spLocks noGrp="1"/>
+          </p:cNvSpPr>
+          <p:nvPr>
+            <p:ph type="title"/>
+          </p:nvPr>
+        </p:nvSpPr>
+        <p:spPr/>
+        <p:txBody>
+          <a:bodyPr/>
+          <a:lstStyle/>
+          <a:p>
+            <a:r>
+              <a:rPr lang="en-US" dirty="0" smtClean="0"/>
+              <a:t>Component Tree</a:t>
+            </a:r>
+            <a:endParaRPr lang="en-US" dirty="0"/>
+          </a:p>
+        </p:txBody>
+      </p:sp>
+      <p:graphicFrame>
+        <p:nvGraphicFramePr>
+          <p:cNvPr id="4" name="Content Placeholder 3"/>
+          <p:cNvGraphicFramePr>
+            <a:graphicFrameLocks noGrp="1"/>
+          </p:cNvGraphicFramePr>
+          <p:nvPr>
+            <p:ph idx="1"/>
+            <p:extLst>
+              <p:ext uri="{D42A27DB-BD31-4B8C-83A1-F6EECF244321}">
+                <p14:modId xmlns:p14="http://schemas.microsoft.com/office/powerpoint/2010/main" val="902692760"/>
+              </p:ext>
+            </p:extLst>
+          </p:nvPr>
+        </p:nvGraphicFramePr>
+        <p:xfrm>
+          <a:off x="2438400" y="2514600"/>
+          <a:ext cx="8078787" cy="3962400"/>
+        </p:xfrm>
+        <a:graphic>
+          <a:graphicData uri="http://schemas.openxmlformats.org/drawingml/2006/diagram">
+            <dgm:relIds xmlns:dgm="http://schemas.openxmlformats.org/drawingml/2006/diagram" xmlns:r="http://schemas.openxmlformats.org/officeDocument/2006/relationships" r:dm="rId2" r:lo="rId3" r:qs="rId4" r:cs="rId5"/>
+          </a:graphicData>
+        </a:graphic>
+      </p:graphicFrame>
+      <p:sp>
+        <p:nvSpPr>
+          <p:cNvPr id="7" name="TextBox 6"/>
+          <p:cNvSpPr txBox="1"/>
+          <p:nvPr/>
+        </p:nvSpPr>
+        <p:spPr>
+          <a:xfrm>
+            <a:off x="2286000" y="1992868"/>
+            <a:ext cx="8686800" cy="369332"/>
+          </a:xfrm>
+          <a:prstGeom prst="rect">
+            <a:avLst/>
+          </a:prstGeom>
+          <a:noFill/>
+        </p:spPr>
+        <p:txBody>
+          <a:bodyPr wrap="square" rtlCol="0">
+            <a:spAutoFit/>
+          </a:bodyPr>
+          <a:lstStyle/>
+          <a:p>
+            <a:pPr algn="ctr"/>
+            <a:r>
+              <a:rPr lang="en-US" dirty="0">
+                <a:solidFill>
+                  <a:schemeClr val="bg1">
+                    <a:lumMod val="95000"/>
+                    <a:lumOff val="5000"/>
+                  </a:schemeClr>
+                </a:solidFill>
+              </a:rPr>
+              <a:t>i</a:t>
+            </a:r>
+            <a:r>
+              <a:rPr lang="en-US" dirty="0" smtClean="0">
+                <a:solidFill>
+                  <a:schemeClr val="bg1">
+                    <a:lumMod val="95000"/>
+                    <a:lumOff val="5000"/>
+                  </a:schemeClr>
+                </a:solidFill>
+              </a:rPr>
+              <a:t>ndex.html</a:t>
+            </a:r>
+            <a:endParaRPr lang="en-US" dirty="0">
+              <a:solidFill>
+                <a:schemeClr val="bg1">
+                  <a:lumMod val="95000"/>
+                  <a:lumOff val="5000"/>
+                </a:schemeClr>
+              </a:solidFill>
+            </a:endParaRPr>
+          </a:p>
+        </p:txBody>
+      </p:sp>
+      <p:pic>
+        <p:nvPicPr>
+          <p:cNvPr id="1034" name="Picture 10" descr="Image result for navigation icon"/>
+          <p:cNvPicPr>
+            <a:picLocks noChangeAspect="1" noChangeArrowheads="1"/>
+          </p:cNvPicPr>
+          <p:nvPr/>
+        </p:nvPicPr>
+        <p:blipFill>
+          <a:blip r:embed="rId7" cstate="print">
+            <a:extLst>
+              <a:ext uri="{28A0092B-C50C-407E-A947-70E740481C1C}">
+                <a14:useLocalDpi xmlns:a14="http://schemas.microsoft.com/office/drawing/2010/main" val="0"/>
+              </a:ext>
+            </a:extLst>
+          </a:blip>
+          <a:srcRect/>
+          <a:stretch>
+            <a:fillRect/>
+          </a:stretch>
+        </p:blipFill>
+        <p:spPr bwMode="auto">
+          <a:xfrm>
+            <a:off x="9753600" y="2667000"/>
+            <a:ext cx="609600" cy="609600"/>
+          </a:xfrm>
+          <a:prstGeom prst="rect">
+            <a:avLst/>
+          </a:prstGeom>
+          <a:noFill/>
+          <a:extLst>
+            <a:ext uri="{909E8E84-426E-40DD-AFC4-6F175D3DCCD1}">
+              <a14:hiddenFill xmlns:a14="http://schemas.microsoft.com/office/drawing/2010/main">
+                <a:solidFill>
+                  <a:srgbClr val="FFFFFF"/>
+                </a:solidFill>
+              </a14:hiddenFill>
+            </a:ext>
+          </a:extLst>
+        </p:spPr>
+      </p:pic>
+      <p:pic>
+        <p:nvPicPr>
+          <p:cNvPr id="8" name="Picture 7"/>
+          <p:cNvPicPr>
+            <a:picLocks noChangeAspect="1"/>
+          </p:cNvPicPr>
+          <p:nvPr/>
+        </p:nvPicPr>
+        <p:blipFill>
+          <a:blip r:embed="rId8"/>
+          <a:stretch>
+            <a:fillRect/>
+          </a:stretch>
+        </p:blipFill>
+        <p:spPr>
+          <a:xfrm>
+            <a:off x="9753547" y="3695647"/>
+            <a:ext cx="609653" cy="609653"/>
+          </a:xfrm>
+          <a:prstGeom prst="rect">
+            <a:avLst/>
+          </a:prstGeom>
+        </p:spPr>
+      </p:pic>
+    </p:spTree>
+    <p:extLst>
+      <p:ext uri="{BB962C8B-B14F-4D97-AF65-F5344CB8AC3E}">
+        <p14:creationId xmlns:p14="http://schemas.microsoft.com/office/powerpoint/2010/main" val="181966055"/>
       </p:ext>
     </p:extLst>
   </p:cSld>
@@ -5595,14 +9064,6 @@
               </a:rPr>
               <a:t>I have provided my Atom editor code snippets.</a:t>
             </a:r>
-            <a:endParaRPr lang="en-US" i="1" dirty="0" smtClean="0">
-              <a:solidFill>
-                <a:schemeClr val="accent1">
-                  <a:lumMod val="60000"/>
-                  <a:lumOff val="40000"/>
-                </a:schemeClr>
-              </a:solidFill>
-            </a:endParaRPr>
           </a:p>
         </p:txBody>
       </p:sp>
@@ -5837,7 +9298,27 @@
                   </a:schemeClr>
                 </a:solidFill>
               </a:rPr>
-              <a:t>jspm – package manager, simple, bundler, transpiler</a:t>
+              <a:t>jspm – package </a:t>
+            </a:r>
+            <a:r>
+              <a:rPr lang="en-US" dirty="0" smtClean="0">
+                <a:solidFill>
+                  <a:schemeClr val="tx1">
+                    <a:lumMod val="75000"/>
+                  </a:schemeClr>
+                </a:solidFill>
+              </a:rPr>
+              <a:t>manager, </a:t>
+            </a:r>
+            <a:r>
+              <a:rPr lang="en-US" dirty="0" smtClean="0">
+                <a:solidFill>
+                  <a:schemeClr val="tx1">
+                    <a:lumMod val="75000"/>
+                  </a:schemeClr>
+                </a:solidFill>
+              </a:rPr>
+              <a:t>bundler, transpiler</a:t>
             </a:r>
           </a:p>
           <a:p>
@@ -6280,7 +9761,6 @@
               <a:rPr lang="en-US" dirty="0"/>
               <a:t>Walkthrough Application Code</a:t>
             </a:r>
-            <a:endParaRPr lang="en-US" dirty="0"/>
           </a:p>
         </p:txBody>
       </p:sp>

</xml_diff>

<commit_message>
Updated readme and deck
</commit_message>
<xml_diff>
--- a/Deck/Testable ES2015 AngularJS 1.5.x Component-based Applications.pptx
+++ b/Deck/Testable ES2015 AngularJS 1.5.x Component-based Applications.pptx
@@ -1168,6 +1168,13 @@
         </dgm:presLayoutVars>
       </dgm:prSet>
       <dgm:spPr/>
+      <dgm:t>
+        <a:bodyPr/>
+        <a:lstStyle/>
+        <a:p>
+          <a:endParaRPr lang="en-US"/>
+        </a:p>
+      </dgm:t>
     </dgm:pt>
     <dgm:pt modelId="{6B6EC9C9-20BC-40F7-86D9-67130FA1AFE1}" type="pres">
       <dgm:prSet presAssocID="{A17E77E2-DE7C-4AEC-A1E3-298AEF0888C7}" presName="vertOne" presStyleCnt="0"/>
@@ -1180,6 +1187,13 @@
         </dgm:presLayoutVars>
       </dgm:prSet>
       <dgm:spPr/>
+      <dgm:t>
+        <a:bodyPr/>
+        <a:lstStyle/>
+        <a:p>
+          <a:endParaRPr lang="en-US"/>
+        </a:p>
+      </dgm:t>
     </dgm:pt>
     <dgm:pt modelId="{19BFEEE8-7235-49EF-8259-7A9F6C6DB0FE}" type="pres">
       <dgm:prSet presAssocID="{A17E77E2-DE7C-4AEC-A1E3-298AEF0888C7}" presName="parTransOne" presStyleCnt="0"/>
@@ -1200,6 +1214,13 @@
         </dgm:presLayoutVars>
       </dgm:prSet>
       <dgm:spPr/>
+      <dgm:t>
+        <a:bodyPr/>
+        <a:lstStyle/>
+        <a:p>
+          <a:endParaRPr lang="en-US"/>
+        </a:p>
+      </dgm:t>
     </dgm:pt>
     <dgm:pt modelId="{DEC37CF0-6415-42C2-881A-594E6C5B0DD4}" type="pres">
       <dgm:prSet presAssocID="{B5F201AA-A96B-4C2B-A053-C7269FF636EA}" presName="horzTwo" presStyleCnt="0"/>
@@ -1220,6 +1241,13 @@
         </dgm:presLayoutVars>
       </dgm:prSet>
       <dgm:spPr/>
+      <dgm:t>
+        <a:bodyPr/>
+        <a:lstStyle/>
+        <a:p>
+          <a:endParaRPr lang="en-US"/>
+        </a:p>
+      </dgm:t>
     </dgm:pt>
     <dgm:pt modelId="{15BC02EC-8706-4761-B032-F6FC6FA7C128}" type="pres">
       <dgm:prSet presAssocID="{C4361406-ACA3-4954-B455-94E502085F3B}" presName="parTransTwo" presStyleCnt="0"/>
@@ -1267,6 +1295,13 @@
         </dgm:presLayoutVars>
       </dgm:prSet>
       <dgm:spPr/>
+      <dgm:t>
+        <a:bodyPr/>
+        <a:lstStyle/>
+        <a:p>
+          <a:endParaRPr lang="en-US"/>
+        </a:p>
+      </dgm:t>
     </dgm:pt>
     <dgm:pt modelId="{D6AAD1B3-20FF-4A66-9F6D-E8E2039F695C}" type="pres">
       <dgm:prSet presAssocID="{52CBA95D-1394-4036-9FBC-BB49932751BC}" presName="parTransThree" presStyleCnt="0"/>
@@ -1291,6 +1326,13 @@
         </dgm:presLayoutVars>
       </dgm:prSet>
       <dgm:spPr/>
+      <dgm:t>
+        <a:bodyPr/>
+        <a:lstStyle/>
+        <a:p>
+          <a:endParaRPr lang="en-US"/>
+        </a:p>
+      </dgm:t>
     </dgm:pt>
     <dgm:pt modelId="{73F3283F-1390-41A6-BB68-F8BFA9989D20}" type="pres">
       <dgm:prSet presAssocID="{81DFFCCC-5D78-42E1-A50A-BD8513334CFE}" presName="horzFour" presStyleCnt="0"/>
@@ -1298,19 +1340,19 @@
     </dgm:pt>
   </dgm:ptLst>
   <dgm:cxnLst>
-    <dgm:cxn modelId="{61D707F7-0CA1-43AA-B2E7-884767F7F3B1}" type="presOf" srcId="{CB48BB65-ED2B-48DD-90D1-6F07A9009B0C}" destId="{D45A31A6-F56D-4C74-BC61-B6E330199B80}" srcOrd="0" destOrd="0" presId="urn:microsoft.com/office/officeart/2005/8/layout/hierarchy4"/>
-    <dgm:cxn modelId="{DD27B039-5B79-4759-8FFC-F83A2A916FCC}" srcId="{C4361406-ACA3-4954-B455-94E502085F3B}" destId="{CB48BB65-ED2B-48DD-90D1-6F07A9009B0C}" srcOrd="0" destOrd="0" parTransId="{5FFF3FB2-4A36-43F3-9AED-72E9038034D0}" sibTransId="{E320F1AE-8317-4FF9-BF65-C51FB3FB74DB}"/>
+    <dgm:cxn modelId="{E96DF8A4-110D-486C-8D12-F83D784A957C}" type="presOf" srcId="{A17E77E2-DE7C-4AEC-A1E3-298AEF0888C7}" destId="{143C4F91-D9EA-43EE-8886-B945D04B5B09}" srcOrd="0" destOrd="0" presId="urn:microsoft.com/office/officeart/2005/8/layout/hierarchy4"/>
     <dgm:cxn modelId="{EE1C623C-0FB6-4D59-A400-366EE03DAF33}" srcId="{A17E77E2-DE7C-4AEC-A1E3-298AEF0888C7}" destId="{B5F201AA-A96B-4C2B-A053-C7269FF636EA}" srcOrd="0" destOrd="0" parTransId="{BB04FEBC-9F53-4493-9178-0F7D348AACBD}" sibTransId="{8693B929-4872-452D-9E89-10E6EBD6D9FE}"/>
     <dgm:cxn modelId="{4C5FF7B1-FEEB-4B27-BEF1-537D24AA7670}" type="presOf" srcId="{C768B337-D543-44D6-B9BD-97A330F0DA25}" destId="{0D899E0B-C563-4CD7-BF75-9E187054BA2E}" srcOrd="0" destOrd="0" presId="urn:microsoft.com/office/officeart/2005/8/layout/hierarchy4"/>
+    <dgm:cxn modelId="{5B60A557-6BC3-462F-90CE-04C0A8A4E7FD}" srcId="{A17E77E2-DE7C-4AEC-A1E3-298AEF0888C7}" destId="{C4361406-ACA3-4954-B455-94E502085F3B}" srcOrd="1" destOrd="0" parTransId="{5D35BAD2-269F-4B3E-97E6-8C19D43E5407}" sibTransId="{D5A86CA3-671C-4C6F-A5B4-072B2E436B6D}"/>
     <dgm:cxn modelId="{DD9E3764-12E5-4308-8ADA-9628688A5180}" type="presOf" srcId="{81DFFCCC-5D78-42E1-A50A-BD8513334CFE}" destId="{7559C032-DFB9-4F06-B030-634A1E05B69D}" srcOrd="0" destOrd="0" presId="urn:microsoft.com/office/officeart/2005/8/layout/hierarchy4"/>
-    <dgm:cxn modelId="{5B60A557-6BC3-462F-90CE-04C0A8A4E7FD}" srcId="{A17E77E2-DE7C-4AEC-A1E3-298AEF0888C7}" destId="{C4361406-ACA3-4954-B455-94E502085F3B}" srcOrd="1" destOrd="0" parTransId="{5D35BAD2-269F-4B3E-97E6-8C19D43E5407}" sibTransId="{D5A86CA3-671C-4C6F-A5B4-072B2E436B6D}"/>
+    <dgm:cxn modelId="{6C25C07F-0CCD-49A8-878C-5758E436572C}" srcId="{52CBA95D-1394-4036-9FBC-BB49932751BC}" destId="{81DFFCCC-5D78-42E1-A50A-BD8513334CFE}" srcOrd="0" destOrd="0" parTransId="{8D162478-D639-48E4-918F-CE4F2D4CE8B3}" sibTransId="{2B355283-A4B4-4CEC-8B24-CC42FD8C8EC3}"/>
+    <dgm:cxn modelId="{2F22AAD1-8C83-4AAA-8217-A4F7F0DA4F9A}" srcId="{C768B337-D543-44D6-B9BD-97A330F0DA25}" destId="{A17E77E2-DE7C-4AEC-A1E3-298AEF0888C7}" srcOrd="0" destOrd="0" parTransId="{DB03D6DA-D96B-442E-B6CC-E8009EC5EE0B}" sibTransId="{C4D90433-7019-4AC5-BDA3-5C538D4D9120}"/>
+    <dgm:cxn modelId="{61D707F7-0CA1-43AA-B2E7-884767F7F3B1}" type="presOf" srcId="{CB48BB65-ED2B-48DD-90D1-6F07A9009B0C}" destId="{D45A31A6-F56D-4C74-BC61-B6E330199B80}" srcOrd="0" destOrd="0" presId="urn:microsoft.com/office/officeart/2005/8/layout/hierarchy4"/>
+    <dgm:cxn modelId="{6F1BDF7D-EFD8-499C-8AC1-B67F16D8717F}" type="presOf" srcId="{C4361406-ACA3-4954-B455-94E502085F3B}" destId="{9577D710-5868-4873-B480-3124930F5D55}" srcOrd="0" destOrd="0" presId="urn:microsoft.com/office/officeart/2005/8/layout/hierarchy4"/>
+    <dgm:cxn modelId="{0734B593-A1FC-49A2-894A-C35DAADBA31E}" type="presOf" srcId="{B5F201AA-A96B-4C2B-A053-C7269FF636EA}" destId="{D3085972-68A6-454D-B46F-D9B1A0C649F0}" srcOrd="0" destOrd="0" presId="urn:microsoft.com/office/officeart/2005/8/layout/hierarchy4"/>
+    <dgm:cxn modelId="{DD27B039-5B79-4759-8FFC-F83A2A916FCC}" srcId="{C4361406-ACA3-4954-B455-94E502085F3B}" destId="{CB48BB65-ED2B-48DD-90D1-6F07A9009B0C}" srcOrd="0" destOrd="0" parTransId="{5FFF3FB2-4A36-43F3-9AED-72E9038034D0}" sibTransId="{E320F1AE-8317-4FF9-BF65-C51FB3FB74DB}"/>
+    <dgm:cxn modelId="{D6DCDDEE-A49F-4EE3-92D1-7870D218AAE6}" srcId="{C4361406-ACA3-4954-B455-94E502085F3B}" destId="{52CBA95D-1394-4036-9FBC-BB49932751BC}" srcOrd="1" destOrd="0" parTransId="{B05D7425-9880-47FA-B7DC-062EC661E186}" sibTransId="{214CB6EE-275A-4D34-B073-71B108C14A1C}"/>
     <dgm:cxn modelId="{7DB02B4F-D734-4363-91B2-AA9099FEF889}" type="presOf" srcId="{52CBA95D-1394-4036-9FBC-BB49932751BC}" destId="{0E66B91D-4E95-4DCE-BDAA-2596875F46A2}" srcOrd="0" destOrd="0" presId="urn:microsoft.com/office/officeart/2005/8/layout/hierarchy4"/>
-    <dgm:cxn modelId="{E96DF8A4-110D-486C-8D12-F83D784A957C}" type="presOf" srcId="{A17E77E2-DE7C-4AEC-A1E3-298AEF0888C7}" destId="{143C4F91-D9EA-43EE-8886-B945D04B5B09}" srcOrd="0" destOrd="0" presId="urn:microsoft.com/office/officeart/2005/8/layout/hierarchy4"/>
-    <dgm:cxn modelId="{D6DCDDEE-A49F-4EE3-92D1-7870D218AAE6}" srcId="{C4361406-ACA3-4954-B455-94E502085F3B}" destId="{52CBA95D-1394-4036-9FBC-BB49932751BC}" srcOrd="1" destOrd="0" parTransId="{B05D7425-9880-47FA-B7DC-062EC661E186}" sibTransId="{214CB6EE-275A-4D34-B073-71B108C14A1C}"/>
-    <dgm:cxn modelId="{2F22AAD1-8C83-4AAA-8217-A4F7F0DA4F9A}" srcId="{C768B337-D543-44D6-B9BD-97A330F0DA25}" destId="{A17E77E2-DE7C-4AEC-A1E3-298AEF0888C7}" srcOrd="0" destOrd="0" parTransId="{DB03D6DA-D96B-442E-B6CC-E8009EC5EE0B}" sibTransId="{C4D90433-7019-4AC5-BDA3-5C538D4D9120}"/>
-    <dgm:cxn modelId="{6C25C07F-0CCD-49A8-878C-5758E436572C}" srcId="{52CBA95D-1394-4036-9FBC-BB49932751BC}" destId="{81DFFCCC-5D78-42E1-A50A-BD8513334CFE}" srcOrd="0" destOrd="0" parTransId="{8D162478-D639-48E4-918F-CE4F2D4CE8B3}" sibTransId="{2B355283-A4B4-4CEC-8B24-CC42FD8C8EC3}"/>
-    <dgm:cxn modelId="{0734B593-A1FC-49A2-894A-C35DAADBA31E}" type="presOf" srcId="{B5F201AA-A96B-4C2B-A053-C7269FF636EA}" destId="{D3085972-68A6-454D-B46F-D9B1A0C649F0}" srcOrd="0" destOrd="0" presId="urn:microsoft.com/office/officeart/2005/8/layout/hierarchy4"/>
-    <dgm:cxn modelId="{6F1BDF7D-EFD8-499C-8AC1-B67F16D8717F}" type="presOf" srcId="{C4361406-ACA3-4954-B455-94E502085F3B}" destId="{9577D710-5868-4873-B480-3124930F5D55}" srcOrd="0" destOrd="0" presId="urn:microsoft.com/office/officeart/2005/8/layout/hierarchy4"/>
     <dgm:cxn modelId="{D88F1204-DC51-4337-89C8-EECDB90655AF}" type="presParOf" srcId="{0D899E0B-C563-4CD7-BF75-9E187054BA2E}" destId="{6B6EC9C9-20BC-40F7-86D9-67130FA1AFE1}" srcOrd="0" destOrd="0" presId="urn:microsoft.com/office/officeart/2005/8/layout/hierarchy4"/>
     <dgm:cxn modelId="{20FDECE7-F3BE-4A4A-897F-24A4C060BF93}" type="presParOf" srcId="{6B6EC9C9-20BC-40F7-86D9-67130FA1AFE1}" destId="{143C4F91-D9EA-43EE-8886-B945D04B5B09}" srcOrd="0" destOrd="0" presId="urn:microsoft.com/office/officeart/2005/8/layout/hierarchy4"/>
     <dgm:cxn modelId="{A8491971-1A3F-4490-8586-3F7B5D7CB8F2}" type="presParOf" srcId="{6B6EC9C9-20BC-40F7-86D9-67130FA1AFE1}" destId="{19BFEEE8-7235-49EF-8259-7A9F6C6DB0FE}" srcOrd="1" destOrd="0" presId="urn:microsoft.com/office/officeart/2005/8/layout/hierarchy4"/>
@@ -3475,7 +3517,7 @@
           <a:p>
             <a:fld id="{D0CC69C6-EE0B-4D8B-9C71-C36EFED094F2}" type="datetimeFigureOut">
               <a:rPr lang="en-US"/>
-              <a:t>9/10/2016</a:t>
+              <a:t>10/16/16</a:t>
             </a:fld>
             <a:endParaRPr/>
           </a:p>
@@ -3640,7 +3682,7 @@
           <a:p>
             <a:fld id="{3ABD2D7A-D230-4F91-BD59-0A39C2703BA8}" type="datetimeFigureOut">
               <a:rPr lang="en-US"/>
-              <a:t>9/10/2016</a:t>
+              <a:t>10/16/16</a:t>
             </a:fld>
             <a:endParaRPr/>
           </a:p>
@@ -4324,7 +4366,7 @@
           <a:p>
             <a:fld id="{03F41C87-7AD9-4845-A077-840E4A0F3F06}" type="datetimeFigureOut">
               <a:rPr lang="en-US"/>
-              <a:t>9/10/2016</a:t>
+              <a:t>10/16/16</a:t>
             </a:fld>
             <a:endParaRPr/>
           </a:p>
@@ -4523,7 +4565,7 @@
           <a:p>
             <a:fld id="{03F41C87-7AD9-4845-A077-840E4A0F3F06}" type="datetimeFigureOut">
               <a:rPr lang="en-US"/>
-              <a:t>9/10/2016</a:t>
+              <a:t>10/16/16</a:t>
             </a:fld>
             <a:endParaRPr/>
           </a:p>
@@ -4719,7 +4761,7 @@
           <a:p>
             <a:fld id="{03F41C87-7AD9-4845-A077-840E4A0F3F06}" type="datetimeFigureOut">
               <a:rPr lang="en-US"/>
-              <a:t>9/10/2016</a:t>
+              <a:t>10/16/16</a:t>
             </a:fld>
             <a:endParaRPr/>
           </a:p>
@@ -5011,7 +5053,7 @@
           <a:p>
             <a:fld id="{03F41C87-7AD9-4845-A077-840E4A0F3F06}" type="datetimeFigureOut">
               <a:rPr lang="en-US"/>
-              <a:t>9/10/2016</a:t>
+              <a:t>10/16/16</a:t>
             </a:fld>
             <a:endParaRPr/>
           </a:p>
@@ -5322,7 +5364,7 @@
           <a:p>
             <a:fld id="{03F41C87-7AD9-4845-A077-840E4A0F3F06}" type="datetimeFigureOut">
               <a:rPr lang="en-US"/>
-              <a:t>9/10/2016</a:t>
+              <a:t>10/16/16</a:t>
             </a:fld>
             <a:endParaRPr/>
           </a:p>
@@ -5785,7 +5827,7 @@
           <a:p>
             <a:fld id="{03F41C87-7AD9-4845-A077-840E4A0F3F06}" type="datetimeFigureOut">
               <a:rPr lang="en-US"/>
-              <a:t>9/10/2016</a:t>
+              <a:t>10/16/16</a:t>
             </a:fld>
             <a:endParaRPr/>
           </a:p>
@@ -5922,7 +5964,7 @@
           <a:p>
             <a:fld id="{03F41C87-7AD9-4845-A077-840E4A0F3F06}" type="datetimeFigureOut">
               <a:rPr lang="en-US"/>
-              <a:t>9/10/2016</a:t>
+              <a:t>10/16/16</a:t>
             </a:fld>
             <a:endParaRPr/>
           </a:p>
@@ -6066,7 +6108,7 @@
           <a:p>
             <a:fld id="{03F41C87-7AD9-4845-A077-840E4A0F3F06}" type="datetimeFigureOut">
               <a:rPr lang="en-US"/>
-              <a:t>9/10/2016</a:t>
+              <a:t>10/16/16</a:t>
             </a:fld>
             <a:endParaRPr/>
           </a:p>
@@ -6381,7 +6423,7 @@
           <a:p>
             <a:fld id="{03F41C87-7AD9-4845-A077-840E4A0F3F06}" type="datetimeFigureOut">
               <a:rPr lang="en-US"/>
-              <a:t>9/10/2016</a:t>
+              <a:t>10/16/16</a:t>
             </a:fld>
             <a:endParaRPr/>
           </a:p>
@@ -6728,7 +6770,7 @@
             <a:fld id="{03F41C87-7AD9-4845-A077-840E4A0F3F06}" type="datetimeFigureOut">
               <a:rPr lang="en-US"/>
               <a:pPr/>
-              <a:t>9/10/2016</a:t>
+              <a:t>10/16/16</a:t>
             </a:fld>
             <a:endParaRPr/>
           </a:p>
@@ -7084,7 +7126,7 @@
             <a:fld id="{03F41C87-7AD9-4845-A077-840E4A0F3F06}" type="datetimeFigureOut">
               <a:rPr lang="en-US"/>
               <a:pPr/>
-              <a:t>9/10/2016</a:t>
+              <a:t>10/16/16</a:t>
             </a:fld>
             <a:endParaRPr/>
           </a:p>
@@ -9014,8 +9056,26 @@
               <a:buNone/>
             </a:pPr>
             <a:r>
+              <a:rPr lang="en-US" dirty="0"/>
+              <a:t>npm </a:t>
+            </a:r>
+            <a:r>
               <a:rPr lang="en-US" dirty="0" smtClean="0"/>
-              <a:t>npm run mocha</a:t>
+              <a:t>gulp</a:t>
+            </a:r>
+            <a:endParaRPr lang="en-US" dirty="0"/>
+          </a:p>
+          <a:p>
+            <a:pPr marL="0" indent="0">
+              <a:buNone/>
+            </a:pPr>
+            <a:r>
+              <a:rPr lang="en-US" dirty="0" smtClean="0"/>
+              <a:t>npm </a:t>
+            </a:r>
+            <a:r>
+              <a:rPr lang="en-US" dirty="0" smtClean="0"/>
+              <a:t>run mocha</a:t>
             </a:r>
           </a:p>
           <a:p>
@@ -9253,230 +9313,53 @@
         </p:spPr>
         <p:txBody>
           <a:bodyPr>
-            <a:normAutofit lnSpcReduction="10000"/>
+            <a:normAutofit/>
           </a:bodyPr>
           <a:lstStyle/>
           <a:p>
             <a:r>
               <a:rPr lang="en-US" dirty="0" smtClean="0"/>
-              <a:t>Our Application</a:t>
-            </a:r>
-          </a:p>
-          <a:p>
-            <a:pPr lvl="1"/>
-            <a:r>
-              <a:rPr lang="en-US" dirty="0" smtClean="0">
-                <a:solidFill>
-                  <a:schemeClr val="tx1">
-                    <a:lumMod val="75000"/>
-                  </a:schemeClr>
-                </a:solidFill>
-              </a:rPr>
-              <a:t>AngularJS 1.5.x - Components</a:t>
-            </a:r>
-          </a:p>
-          <a:p>
-            <a:pPr lvl="1"/>
-            <a:r>
-              <a:rPr lang="en-US" dirty="0" smtClean="0">
-                <a:solidFill>
-                  <a:schemeClr val="tx1">
-                    <a:lumMod val="75000"/>
-                  </a:schemeClr>
-                </a:solidFill>
-              </a:rPr>
+              <a:t>AngularJS </a:t>
+            </a:r>
+            <a:r>
+              <a:rPr lang="en-US" dirty="0" smtClean="0"/>
+              <a:t>1.5.x - Components</a:t>
+            </a:r>
+          </a:p>
+          <a:p>
+            <a:r>
+              <a:rPr lang="en-US" dirty="0" smtClean="0"/>
               <a:t>ES2015 (ES6)</a:t>
             </a:r>
           </a:p>
           <a:p>
-            <a:pPr lvl="1"/>
-            <a:r>
-              <a:rPr lang="en-US" dirty="0" smtClean="0">
-                <a:solidFill>
-                  <a:schemeClr val="tx1">
-                    <a:lumMod val="75000"/>
-                  </a:schemeClr>
-                </a:solidFill>
-              </a:rPr>
-              <a:t>jspm – package </a:t>
-            </a:r>
-            <a:r>
-              <a:rPr lang="en-US" dirty="0" smtClean="0">
-                <a:solidFill>
-                  <a:schemeClr val="tx1">
-                    <a:lumMod val="75000"/>
-                  </a:schemeClr>
-                </a:solidFill>
-              </a:rPr>
-              <a:t>manager, </a:t>
-            </a:r>
-            <a:r>
-              <a:rPr lang="en-US" dirty="0" smtClean="0">
-                <a:solidFill>
-                  <a:schemeClr val="tx1">
-                    <a:lumMod val="75000"/>
-                  </a:schemeClr>
-                </a:solidFill>
-              </a:rPr>
-              <a:t>bundler, transpiler</a:t>
-            </a:r>
-          </a:p>
-          <a:p>
-            <a:pPr lvl="1"/>
-            <a:r>
-              <a:rPr lang="en-US" dirty="0" smtClean="0">
-                <a:solidFill>
-                  <a:schemeClr val="tx1">
-                    <a:lumMod val="75000"/>
-                  </a:schemeClr>
-                </a:solidFill>
-              </a:rPr>
+            <a:r>
+              <a:rPr lang="en-US" dirty="0" smtClean="0"/>
+              <a:t>jspm – package manager, bundler, transpiler</a:t>
+            </a:r>
+          </a:p>
+          <a:p>
+            <a:r>
+              <a:rPr lang="en-US" dirty="0" smtClean="0"/>
               <a:t>System.js – module loader</a:t>
             </a:r>
           </a:p>
           <a:p>
-            <a:pPr lvl="1"/>
-            <a:r>
-              <a:rPr lang="en-US" dirty="0" smtClean="0">
-                <a:solidFill>
-                  <a:schemeClr val="tx1">
-                    <a:lumMod val="75000"/>
-                  </a:schemeClr>
-                </a:solidFill>
-              </a:rPr>
+            <a:r>
+              <a:rPr lang="en-US" dirty="0" smtClean="0"/>
               <a:t>Bootstraps differently</a:t>
             </a:r>
           </a:p>
           <a:p>
-            <a:pPr lvl="1"/>
-            <a:r>
-              <a:rPr lang="en-US" dirty="0" smtClean="0">
-                <a:solidFill>
-                  <a:schemeClr val="tx1">
-                    <a:lumMod val="75000"/>
-                  </a:schemeClr>
-                </a:solidFill>
-              </a:rPr>
-              <a:t>Why choose this stack to build on?</a:t>
-            </a:r>
-          </a:p>
-          <a:p>
-            <a:pPr lvl="1"/>
+            <a:r>
+              <a:rPr lang="en-US" dirty="0" smtClean="0"/>
+              <a:t>Why choose this stack to build on</a:t>
+            </a:r>
+            <a:r>
+              <a:rPr lang="en-US" dirty="0" smtClean="0"/>
+              <a:t>?</a:t>
+            </a:r>
             <a:endParaRPr lang="en-US" dirty="0" smtClean="0"/>
-          </a:p>
-          <a:p>
-            <a:r>
-              <a:rPr lang="en-US" dirty="0" smtClean="0"/>
-              <a:t>Alternate Choice(s)</a:t>
-            </a:r>
-          </a:p>
-          <a:p>
-            <a:pPr lvl="1"/>
-            <a:r>
-              <a:rPr lang="en-US" dirty="0">
-                <a:solidFill>
-                  <a:schemeClr val="tx1">
-                    <a:lumMod val="75000"/>
-                  </a:schemeClr>
-                </a:solidFill>
-              </a:rPr>
-              <a:t>AngularJS 1.5.x - Components</a:t>
-            </a:r>
-          </a:p>
-          <a:p>
-            <a:pPr lvl="1"/>
-            <a:r>
-              <a:rPr lang="en-US" dirty="0" smtClean="0">
-                <a:solidFill>
-                  <a:schemeClr val="tx1">
-                    <a:lumMod val="75000"/>
-                  </a:schemeClr>
-                </a:solidFill>
-              </a:rPr>
-              <a:t>ES5, TypeScript, or ES2015 </a:t>
-            </a:r>
-            <a:r>
-              <a:rPr lang="en-US" dirty="0">
-                <a:solidFill>
-                  <a:schemeClr val="tx1">
-                    <a:lumMod val="75000"/>
-                  </a:schemeClr>
-                </a:solidFill>
-              </a:rPr>
-              <a:t>(ES6) </a:t>
-            </a:r>
-            <a:r>
-              <a:rPr lang="en-US" dirty="0" smtClean="0">
-                <a:solidFill>
-                  <a:schemeClr val="tx1">
-                    <a:lumMod val="75000"/>
-                  </a:schemeClr>
-                </a:solidFill>
-              </a:rPr>
-              <a:t>– JavaScript</a:t>
-            </a:r>
-          </a:p>
-          <a:p>
-            <a:pPr lvl="1"/>
-            <a:r>
-              <a:rPr lang="en-US" dirty="0" smtClean="0">
-                <a:solidFill>
-                  <a:schemeClr val="tx1">
-                    <a:lumMod val="75000"/>
-                  </a:schemeClr>
-                </a:solidFill>
-              </a:rPr>
-              <a:t>If required use transpiler</a:t>
-            </a:r>
-          </a:p>
-          <a:p>
-            <a:pPr lvl="1"/>
-            <a:r>
-              <a:rPr lang="en-US" dirty="0" smtClean="0">
-                <a:solidFill>
-                  <a:schemeClr val="tx1">
-                    <a:lumMod val="75000"/>
-                  </a:schemeClr>
-                </a:solidFill>
-              </a:rPr>
-              <a:t>Use index.html </a:t>
-            </a:r>
-            <a:r>
-              <a:rPr lang="en-US" dirty="0">
-                <a:solidFill>
-                  <a:schemeClr val="tx1">
-                    <a:lumMod val="75000"/>
-                  </a:schemeClr>
-                </a:solidFill>
-              </a:rPr>
-              <a:t>and script </a:t>
-            </a:r>
-            <a:r>
-              <a:rPr lang="en-US" dirty="0" smtClean="0">
-                <a:solidFill>
-                  <a:schemeClr val="tx1">
-                    <a:lumMod val="75000"/>
-                  </a:schemeClr>
-                </a:solidFill>
-              </a:rPr>
-              <a:t>tags</a:t>
-            </a:r>
-          </a:p>
-          <a:p>
-            <a:pPr lvl="1"/>
-            <a:r>
-              <a:rPr lang="en-US" dirty="0" smtClean="0">
-                <a:solidFill>
-                  <a:schemeClr val="tx1">
-                    <a:lumMod val="75000"/>
-                  </a:schemeClr>
-                </a:solidFill>
-              </a:rPr>
-              <a:t>Typical AngularJS Bootstrapping</a:t>
-            </a:r>
-          </a:p>
-          <a:p>
-            <a:endParaRPr lang="en-US" dirty="0"/>
           </a:p>
         </p:txBody>
       </p:sp>
@@ -9991,7 +9874,23 @@
           <a:p>
             <a:r>
               <a:rPr lang="en-US" dirty="0" smtClean="0"/>
-              <a:t>Mocha, Chai, Sinon, Karma</a:t>
+              <a:t>Mocha</a:t>
+            </a:r>
+            <a:r>
+              <a:rPr lang="en-US" dirty="0" smtClean="0"/>
+              <a:t>, </a:t>
+            </a:r>
+            <a:r>
+              <a:rPr lang="en-US" dirty="0" smtClean="0"/>
+              <a:t>Jasmine, </a:t>
+            </a:r>
+            <a:r>
+              <a:rPr lang="en-US" dirty="0"/>
+              <a:t>Chai</a:t>
+            </a:r>
+            <a:r>
+              <a:rPr lang="en-US" dirty="0" smtClean="0"/>
+              <a:t>, Sinon, Karma</a:t>
             </a:r>
             <a:endParaRPr lang="en-US" dirty="0"/>
           </a:p>
@@ -10015,13 +9914,17 @@
         </p:spPr>
         <p:txBody>
           <a:bodyPr>
-            <a:normAutofit/>
+            <a:normAutofit fontScale="92500" lnSpcReduction="10000"/>
           </a:bodyPr>
           <a:lstStyle/>
           <a:p>
             <a:r>
               <a:rPr lang="en-US" dirty="0" smtClean="0"/>
-              <a:t>Mocha is a Nodejs JavaScript test framework</a:t>
+              <a:t>Mocha </a:t>
+            </a:r>
+            <a:r>
+              <a:rPr lang="en-US" dirty="0" smtClean="0"/>
+              <a:t>is a Nodejs JavaScript test framework</a:t>
             </a:r>
           </a:p>
           <a:p>
@@ -10040,7 +9943,17 @@
           <a:p>
             <a:r>
               <a:rPr lang="en-US" dirty="0" smtClean="0"/>
-              <a:t>Chai is a BDD/TDD assert library </a:t>
+              <a:t>Jasmine is a BDD testing framework for JavaScript</a:t>
+            </a:r>
+          </a:p>
+          <a:p>
+            <a:r>
+              <a:rPr lang="en-US" dirty="0" smtClean="0"/>
+              <a:t>Chai </a:t>
+            </a:r>
+            <a:r>
+              <a:rPr lang="en-US" dirty="0" smtClean="0"/>
+              <a:t>is a BDD/TDD assert library </a:t>
             </a:r>
           </a:p>
           <a:p>
@@ -10065,8 +9978,25 @@
                   </a:schemeClr>
                 </a:solidFill>
               </a:rPr>
-              <a:t>For integration tests (will add these at a later date)</a:t>
-            </a:r>
+              <a:t>Not used </a:t>
+            </a:r>
+            <a:r>
+              <a:rPr lang="en-US" smtClean="0">
+                <a:solidFill>
+                  <a:schemeClr val="tx1">
+                    <a:lumMod val="65000"/>
+                  </a:schemeClr>
+                </a:solidFill>
+              </a:rPr>
+              <a:t>on this project</a:t>
+            </a:r>
+            <a:endParaRPr lang="en-US" dirty="0" smtClean="0">
+              <a:solidFill>
+                <a:schemeClr val="tx1">
+                  <a:lumMod val="65000"/>
+                </a:schemeClr>
+              </a:solidFill>
+            </a:endParaRPr>
           </a:p>
           <a:p>
             <a:pPr marL="0" indent="0">

</xml_diff>

<commit_message>
Updated deck added some comments
</commit_message>
<xml_diff>
--- a/Deck/Testable ES2015 AngularJS 1.5.x Component-based Applications.pptx
+++ b/Deck/Testable ES2015 AngularJS 1.5.x Component-based Applications.pptx
@@ -3517,7 +3517,7 @@
           <a:p>
             <a:fld id="{D0CC69C6-EE0B-4D8B-9C71-C36EFED094F2}" type="datetimeFigureOut">
               <a:rPr lang="en-US"/>
-              <a:t>10/16/16</a:t>
+              <a:t>10/21/16</a:t>
             </a:fld>
             <a:endParaRPr/>
           </a:p>
@@ -3682,7 +3682,7 @@
           <a:p>
             <a:fld id="{3ABD2D7A-D230-4F91-BD59-0A39C2703BA8}" type="datetimeFigureOut">
               <a:rPr lang="en-US"/>
-              <a:t>10/16/16</a:t>
+              <a:t>10/21/16</a:t>
             </a:fld>
             <a:endParaRPr/>
           </a:p>
@@ -4366,7 +4366,7 @@
           <a:p>
             <a:fld id="{03F41C87-7AD9-4845-A077-840E4A0F3F06}" type="datetimeFigureOut">
               <a:rPr lang="en-US"/>
-              <a:t>10/16/16</a:t>
+              <a:t>10/21/16</a:t>
             </a:fld>
             <a:endParaRPr/>
           </a:p>
@@ -4565,7 +4565,7 @@
           <a:p>
             <a:fld id="{03F41C87-7AD9-4845-A077-840E4A0F3F06}" type="datetimeFigureOut">
               <a:rPr lang="en-US"/>
-              <a:t>10/16/16</a:t>
+              <a:t>10/21/16</a:t>
             </a:fld>
             <a:endParaRPr/>
           </a:p>
@@ -4761,7 +4761,7 @@
           <a:p>
             <a:fld id="{03F41C87-7AD9-4845-A077-840E4A0F3F06}" type="datetimeFigureOut">
               <a:rPr lang="en-US"/>
-              <a:t>10/16/16</a:t>
+              <a:t>10/21/16</a:t>
             </a:fld>
             <a:endParaRPr/>
           </a:p>
@@ -5053,7 +5053,7 @@
           <a:p>
             <a:fld id="{03F41C87-7AD9-4845-A077-840E4A0F3F06}" type="datetimeFigureOut">
               <a:rPr lang="en-US"/>
-              <a:t>10/16/16</a:t>
+              <a:t>10/21/16</a:t>
             </a:fld>
             <a:endParaRPr/>
           </a:p>
@@ -5364,7 +5364,7 @@
           <a:p>
             <a:fld id="{03F41C87-7AD9-4845-A077-840E4A0F3F06}" type="datetimeFigureOut">
               <a:rPr lang="en-US"/>
-              <a:t>10/16/16</a:t>
+              <a:t>10/21/16</a:t>
             </a:fld>
             <a:endParaRPr/>
           </a:p>
@@ -5827,7 +5827,7 @@
           <a:p>
             <a:fld id="{03F41C87-7AD9-4845-A077-840E4A0F3F06}" type="datetimeFigureOut">
               <a:rPr lang="en-US"/>
-              <a:t>10/16/16</a:t>
+              <a:t>10/21/16</a:t>
             </a:fld>
             <a:endParaRPr/>
           </a:p>
@@ -5964,7 +5964,7 @@
           <a:p>
             <a:fld id="{03F41C87-7AD9-4845-A077-840E4A0F3F06}" type="datetimeFigureOut">
               <a:rPr lang="en-US"/>
-              <a:t>10/16/16</a:t>
+              <a:t>10/21/16</a:t>
             </a:fld>
             <a:endParaRPr/>
           </a:p>
@@ -6108,7 +6108,7 @@
           <a:p>
             <a:fld id="{03F41C87-7AD9-4845-A077-840E4A0F3F06}" type="datetimeFigureOut">
               <a:rPr lang="en-US"/>
-              <a:t>10/16/16</a:t>
+              <a:t>10/21/16</a:t>
             </a:fld>
             <a:endParaRPr/>
           </a:p>
@@ -6423,7 +6423,7 @@
           <a:p>
             <a:fld id="{03F41C87-7AD9-4845-A077-840E4A0F3F06}" type="datetimeFigureOut">
               <a:rPr lang="en-US"/>
-              <a:t>10/16/16</a:t>
+              <a:t>10/21/16</a:t>
             </a:fld>
             <a:endParaRPr/>
           </a:p>
@@ -6770,7 +6770,7 @@
             <a:fld id="{03F41C87-7AD9-4845-A077-840E4A0F3F06}" type="datetimeFigureOut">
               <a:rPr lang="en-US"/>
               <a:pPr/>
-              <a:t>10/16/16</a:t>
+              <a:t>10/21/16</a:t>
             </a:fld>
             <a:endParaRPr/>
           </a:p>
@@ -7126,7 +7126,7 @@
             <a:fld id="{03F41C87-7AD9-4845-A077-840E4A0F3F06}" type="datetimeFigureOut">
               <a:rPr lang="en-US"/>
               <a:pPr/>
-              <a:t>10/16/16</a:t>
+              <a:t>10/21/16</a:t>
             </a:fld>
             <a:endParaRPr/>
           </a:p>
@@ -8332,29 +8332,7 @@
                   </a:schemeClr>
                 </a:solidFill>
               </a:rPr>
-              <a:t>Use gulp-jspm task </a:t>
-            </a:r>
-            <a:r>
-              <a:rPr lang="en-US" smtClean="0">
-                <a:solidFill>
-                  <a:schemeClr val="accent1">
-                    <a:lumMod val="60000"/>
-                    <a:lumOff val="40000"/>
-                  </a:schemeClr>
-                </a:solidFill>
-              </a:rPr>
-              <a:t>to </a:t>
-            </a:r>
-            <a:r>
-              <a:rPr lang="en-US" smtClean="0">
-                <a:solidFill>
-                  <a:schemeClr val="accent1">
-                    <a:lumMod val="60000"/>
-                    <a:lumOff val="40000"/>
-                  </a:schemeClr>
-                </a:solidFill>
-              </a:rPr>
-              <a:t>perform </a:t>
+              <a:t>Use gulp-jspm task to perform </a:t>
             </a:r>
             <a:r>
               <a:rPr lang="en-US" dirty="0" smtClean="0">
@@ -9089,10 +9067,6 @@
               <a:buNone/>
             </a:pPr>
             <a:r>
-              <a:rPr lang="en-US" dirty="0"/>
-              <a:t>npm </a:t>
-            </a:r>
-            <a:r>
               <a:rPr lang="en-US" dirty="0" smtClean="0"/>
               <a:t>gulp</a:t>
             </a:r>
@@ -9104,8 +9078,13 @@
             </a:pPr>
             <a:r>
               <a:rPr lang="en-US" dirty="0" smtClean="0"/>
-              <a:t>npm run mocha</a:t>
-            </a:r>
+              <a:t>npm run </a:t>
+            </a:r>
+            <a:r>
+              <a:rPr lang="en-US" dirty="0" smtClean="0"/>
+              <a:t>coverage</a:t>
+            </a:r>
+            <a:endParaRPr lang="en-US" dirty="0" smtClean="0"/>
           </a:p>
           <a:p>
             <a:pPr marL="0" indent="0">
@@ -9318,11 +9297,7 @@
           <a:p>
             <a:r>
               <a:rPr lang="en-US" dirty="0" smtClean="0"/>
-              <a:t>High Level </a:t>
-            </a:r>
-            <a:r>
-              <a:rPr lang="en-US" dirty="0" smtClean="0"/>
-              <a:t>Choices</a:t>
+              <a:t>High Level Choices</a:t>
             </a:r>
             <a:endParaRPr lang="en-US" dirty="0"/>
           </a:p>
@@ -9376,8 +9351,13 @@
           <a:p>
             <a:r>
               <a:rPr lang="en-US" dirty="0" smtClean="0"/>
-              <a:t>Bootstraps differently</a:t>
-            </a:r>
+              <a:t>Bootstraps </a:t>
+            </a:r>
+            <a:r>
+              <a:rPr lang="en-US" dirty="0" smtClean="0"/>
+              <a:t>differently than Angular 1.x</a:t>
+            </a:r>
+            <a:endParaRPr lang="en-US" dirty="0" smtClean="0"/>
           </a:p>
           <a:p>
             <a:r>

</xml_diff>

<commit_message>
modified deck and added comments
</commit_message>
<xml_diff>
--- a/Deck/Testable ES2015 AngularJS 1.5.x Component-based Applications.pptx
+++ b/Deck/Testable ES2015 AngularJS 1.5.x Component-based Applications.pptx
@@ -9078,13 +9078,8 @@
             </a:pPr>
             <a:r>
               <a:rPr lang="en-US" dirty="0" smtClean="0"/>
-              <a:t>npm run </a:t>
-            </a:r>
-            <a:r>
-              <a:rPr lang="en-US" dirty="0" smtClean="0"/>
-              <a:t>coverage</a:t>
-            </a:r>
-            <a:endParaRPr lang="en-US" dirty="0" smtClean="0"/>
+              <a:t>npm run coverage</a:t>
+            </a:r>
           </a:p>
           <a:p>
             <a:pPr marL="0" indent="0">
@@ -9355,7 +9350,7 @@
             </a:r>
             <a:r>
               <a:rPr lang="en-US" dirty="0" smtClean="0"/>
-              <a:t>differently than Angular 1.x</a:t>
+              <a:t>manually</a:t>
             </a:r>
             <a:endParaRPr lang="en-US" dirty="0" smtClean="0"/>
           </a:p>

</xml_diff>